<commit_message>
Update Präsentation + Aufteilung (Folie 2)
</commit_message>
<xml_diff>
--- a/06_Praesentation/Praesentation_Mangel_Manager.pptx
+++ b/06_Praesentation/Praesentation_Mangel_Manager.pptx
@@ -6,19 +6,24 @@
   </p:sldMasterIdLst>
   <p:sldIdLst>
     <p:sldId id="256" r:id="rId2"/>
-    <p:sldId id="257" r:id="rId3"/>
-    <p:sldId id="258" r:id="rId4"/>
-    <p:sldId id="259" r:id="rId5"/>
-    <p:sldId id="260" r:id="rId6"/>
-    <p:sldId id="265" r:id="rId7"/>
-    <p:sldId id="271" r:id="rId8"/>
-    <p:sldId id="261" r:id="rId9"/>
-    <p:sldId id="264" r:id="rId10"/>
-    <p:sldId id="266" r:id="rId11"/>
-    <p:sldId id="267" r:id="rId12"/>
-    <p:sldId id="268" r:id="rId13"/>
-    <p:sldId id="269" r:id="rId14"/>
-    <p:sldId id="262" r:id="rId15"/>
+    <p:sldId id="276" r:id="rId3"/>
+    <p:sldId id="257" r:id="rId4"/>
+    <p:sldId id="273" r:id="rId5"/>
+    <p:sldId id="274" r:id="rId6"/>
+    <p:sldId id="260" r:id="rId7"/>
+    <p:sldId id="258" r:id="rId8"/>
+    <p:sldId id="275" r:id="rId9"/>
+    <p:sldId id="272" r:id="rId10"/>
+    <p:sldId id="259" r:id="rId11"/>
+    <p:sldId id="265" r:id="rId12"/>
+    <p:sldId id="271" r:id="rId13"/>
+    <p:sldId id="261" r:id="rId14"/>
+    <p:sldId id="264" r:id="rId15"/>
+    <p:sldId id="266" r:id="rId16"/>
+    <p:sldId id="267" r:id="rId17"/>
+    <p:sldId id="268" r:id="rId18"/>
+    <p:sldId id="269" r:id="rId19"/>
+    <p:sldId id="262" r:id="rId20"/>
   </p:sldIdLst>
   <p:sldSz cx="12192000" cy="6858000"/>
   <p:notesSz cx="6858000" cy="9144000"/>
@@ -6094,13 +6099,8 @@
           <a:p>
             <a:r>
               <a:rPr lang="de-DE" sz="1400" dirty="0" smtClean="0"/>
-              <a:t>Wirtschaftsinformatik, Vollzeitstudium,  </a:t>
-            </a:r>
-            <a:r>
-              <a:rPr lang="de-DE" sz="1400" dirty="0" smtClean="0"/>
-              <a:t>Frühlingssemester 2015</a:t>
-            </a:r>
-            <a:endParaRPr lang="de-DE" sz="1400" dirty="0" smtClean="0"/>
+              <a:t>Wirtschaftsinformatik, Vollzeitstudium,  Frühlingssemester 2015</a:t>
+            </a:r>
           </a:p>
         </p:txBody>
       </p:sp>
@@ -6157,17 +6157,31 @@
           <a:lstStyle/>
           <a:p>
             <a:r>
-              <a:rPr lang="de-CH" dirty="0" err="1" smtClean="0"/>
-              <a:t>Lessons</a:t>
+              <a:rPr lang="de-CH" dirty="0"/>
+              <a:t>Mängel-Manager </a:t>
             </a:r>
             <a:r>
               <a:rPr lang="de-CH" dirty="0" smtClean="0"/>
-              <a:t> </a:t>
-            </a:r>
-            <a:r>
-              <a:rPr lang="de-CH" dirty="0" err="1" smtClean="0"/>
-              <a:t>Learned</a:t>
-            </a:r>
+              <a:t>Hands-on</a:t>
+            </a:r>
+            <a:br>
+              <a:rPr lang="de-CH" dirty="0" smtClean="0"/>
+            </a:br>
+            <a:r>
+              <a:rPr lang="de-CH" sz="2800" dirty="0"/>
+              <a:t>BackOffice </a:t>
+            </a:r>
+            <a:r>
+              <a:rPr lang="de-CH" sz="2800" dirty="0" smtClean="0"/>
+              <a:t>GU Intern </a:t>
+            </a:r>
+            <a:r>
+              <a:rPr lang="de-CH" sz="2800" dirty="0"/>
+              <a:t>Client</a:t>
+            </a:r>
+            <a:br>
+              <a:rPr lang="de-CH" sz="2800" dirty="0"/>
+            </a:br>
             <a:endParaRPr lang="de-CH" dirty="0"/>
           </a:p>
         </p:txBody>
@@ -6184,17 +6198,73 @@
         </p:nvSpPr>
         <p:spPr/>
         <p:txBody>
-          <a:bodyPr/>
-          <a:lstStyle/>
+          <a:bodyPr>
+            <a:normAutofit fontScale="92500" lnSpcReduction="20000"/>
+          </a:bodyPr>
+          <a:lstStyle/>
+          <a:p>
+            <a:r>
+              <a:rPr lang="de-CH" dirty="0" smtClean="0"/>
+              <a:t>Unternehmen erfassen</a:t>
+            </a:r>
+          </a:p>
           <a:p>
             <a:endParaRPr lang="de-CH" dirty="0"/>
+          </a:p>
+          <a:p>
+            <a:r>
+              <a:rPr lang="de-CH" dirty="0" smtClean="0"/>
+              <a:t>Person erfassen</a:t>
+            </a:r>
+          </a:p>
+          <a:p>
+            <a:endParaRPr lang="de-CH" dirty="0"/>
+          </a:p>
+          <a:p>
+            <a:r>
+              <a:rPr lang="de-CH" dirty="0" smtClean="0"/>
+              <a:t>Projekt erfassen (Suchfunktion, Detailansicht)</a:t>
+            </a:r>
+          </a:p>
+          <a:p>
+            <a:endParaRPr lang="de-CH" dirty="0"/>
+          </a:p>
+          <a:p>
+            <a:r>
+              <a:rPr lang="de-CH" dirty="0" smtClean="0"/>
+              <a:t>Mangel zu Projekt erfassen</a:t>
+            </a:r>
+          </a:p>
+          <a:p>
+            <a:endParaRPr lang="de-CH" dirty="0"/>
+          </a:p>
+          <a:p>
+            <a:r>
+              <a:rPr lang="de-CH" dirty="0" smtClean="0"/>
+              <a:t>Meldung zu Mangel erfassen</a:t>
+            </a:r>
+          </a:p>
+          <a:p>
+            <a:endParaRPr lang="de-CH" dirty="0"/>
+          </a:p>
+          <a:p>
+            <a:r>
+              <a:rPr lang="de-CH" dirty="0" smtClean="0"/>
+              <a:t>Mängelliste drucken</a:t>
+            </a:r>
+          </a:p>
+          <a:p>
+            <a:pPr marL="0" indent="0">
+              <a:buNone/>
+            </a:pPr>
+            <a:endParaRPr lang="de-CH" dirty="0" smtClean="0"/>
           </a:p>
         </p:txBody>
       </p:sp>
     </p:spTree>
     <p:extLst>
       <p:ext uri="{BB962C8B-B14F-4D97-AF65-F5344CB8AC3E}">
-        <p14:creationId xmlns:p14="http://schemas.microsoft.com/office/powerpoint/2010/main" val="2733050563"/>
+        <p14:creationId xmlns:p14="http://schemas.microsoft.com/office/powerpoint/2010/main" val="485883327"/>
       </p:ext>
     </p:extLst>
   </p:cSld>
@@ -6244,16 +6314,8 @@
           <a:lstStyle/>
           <a:p>
             <a:r>
-              <a:rPr lang="de-CH" dirty="0" err="1" smtClean="0"/>
-              <a:t>Lessons</a:t>
-            </a:r>
-            <a:r>
               <a:rPr lang="de-CH" dirty="0" smtClean="0"/>
-              <a:t> </a:t>
-            </a:r>
-            <a:r>
-              <a:rPr lang="de-CH" dirty="0" err="1" smtClean="0"/>
-              <a:t>Learned</a:t>
+              <a:t>Funktionale Tests</a:t>
             </a:r>
             <a:endParaRPr lang="de-CH" dirty="0"/>
           </a:p>
@@ -6274,6 +6336,10 @@
           <a:bodyPr/>
           <a:lstStyle/>
           <a:p>
+            <a:r>
+              <a:rPr lang="de-CH" dirty="0" smtClean="0"/>
+              <a:t>TO DO MIKE ITEN</a:t>
+            </a:r>
             <a:endParaRPr lang="de-CH" dirty="0"/>
           </a:p>
         </p:txBody>
@@ -6281,7 +6347,7 @@
     </p:spTree>
     <p:extLst>
       <p:ext uri="{BB962C8B-B14F-4D97-AF65-F5344CB8AC3E}">
-        <p14:creationId xmlns:p14="http://schemas.microsoft.com/office/powerpoint/2010/main" val="492210921"/>
+        <p14:creationId xmlns:p14="http://schemas.microsoft.com/office/powerpoint/2010/main" val="3285288541"/>
       </p:ext>
     </p:extLst>
   </p:cSld>
@@ -6332,35 +6398,56 @@
           <a:p>
             <a:r>
               <a:rPr lang="de-CH" dirty="0" err="1" smtClean="0"/>
-              <a:t>Lessons</a:t>
+              <a:t>Junit</a:t>
             </a:r>
             <a:r>
               <a:rPr lang="de-CH" dirty="0" smtClean="0"/>
-              <a:t> </a:t>
+              <a:t> Tests</a:t>
+            </a:r>
+            <a:endParaRPr lang="de-CH" dirty="0"/>
+          </a:p>
+        </p:txBody>
+      </p:sp>
+      <p:sp>
+        <p:nvSpPr>
+          <p:cNvPr id="3" name="Inhaltsplatzhalter 2"/>
+          <p:cNvSpPr>
+            <a:spLocks noGrp="1"/>
+          </p:cNvSpPr>
+          <p:nvPr>
+            <p:ph idx="1"/>
+          </p:nvPr>
+        </p:nvSpPr>
+        <p:spPr/>
+        <p:txBody>
+          <a:bodyPr/>
+          <a:lstStyle/>
+          <a:p>
+            <a:r>
+              <a:rPr lang="de-CH" dirty="0" smtClean="0"/>
+              <a:t>Test </a:t>
             </a:r>
             <a:r>
               <a:rPr lang="de-CH" dirty="0" err="1" smtClean="0"/>
-              <a:t>Learned</a:t>
-            </a:r>
+              <a:t>Driven</a:t>
+            </a:r>
+            <a:r>
+              <a:rPr lang="de-CH" dirty="0" smtClean="0"/>
+              <a:t> Development</a:t>
+            </a:r>
+          </a:p>
+          <a:p>
             <a:endParaRPr lang="de-CH" dirty="0"/>
           </a:p>
-        </p:txBody>
-      </p:sp>
-      <p:sp>
-        <p:nvSpPr>
-          <p:cNvPr id="3" name="Inhaltsplatzhalter 2"/>
-          <p:cNvSpPr>
-            <a:spLocks noGrp="1"/>
-          </p:cNvSpPr>
-          <p:nvPr>
-            <p:ph idx="1"/>
-          </p:nvPr>
-        </p:nvSpPr>
-        <p:spPr/>
-        <p:txBody>
-          <a:bodyPr/>
-          <a:lstStyle/>
-          <a:p>
+          <a:p>
+            <a:r>
+              <a:rPr lang="de-CH" dirty="0" err="1" smtClean="0"/>
+              <a:t>Persister</a:t>
+            </a:r>
+            <a:r>
+              <a:rPr lang="de-CH" dirty="0" smtClean="0"/>
+              <a:t> / Client</a:t>
+            </a:r>
             <a:endParaRPr lang="de-CH" dirty="0"/>
           </a:p>
         </p:txBody>
@@ -6368,7 +6455,7 @@
     </p:spTree>
     <p:extLst>
       <p:ext uri="{BB962C8B-B14F-4D97-AF65-F5344CB8AC3E}">
-        <p14:creationId xmlns:p14="http://schemas.microsoft.com/office/powerpoint/2010/main" val="401769967"/>
+        <p14:creationId xmlns:p14="http://schemas.microsoft.com/office/powerpoint/2010/main" val="4174650671"/>
       </p:ext>
     </p:extLst>
   </p:cSld>
@@ -6418,44 +6505,100 @@
           <a:lstStyle/>
           <a:p>
             <a:r>
+              <a:rPr lang="de-CH" dirty="0" smtClean="0"/>
+              <a:t>Komplikationen</a:t>
+            </a:r>
+            <a:endParaRPr lang="de-CH" dirty="0"/>
+          </a:p>
+        </p:txBody>
+      </p:sp>
+      <p:sp>
+        <p:nvSpPr>
+          <p:cNvPr id="3" name="Inhaltsplatzhalter 2"/>
+          <p:cNvSpPr>
+            <a:spLocks noGrp="1"/>
+          </p:cNvSpPr>
+          <p:nvPr>
+            <p:ph idx="1"/>
+          </p:nvPr>
+        </p:nvSpPr>
+        <p:spPr/>
+        <p:txBody>
+          <a:bodyPr/>
+          <a:lstStyle/>
+          <a:p>
+            <a:r>
+              <a:rPr lang="de-CH" dirty="0" smtClean="0"/>
+              <a:t>Austritt des </a:t>
+            </a:r>
+            <a:r>
+              <a:rPr lang="de-CH" dirty="0" smtClean="0"/>
+              <a:t>Projektleiters</a:t>
+            </a:r>
+          </a:p>
+          <a:p>
+            <a:endParaRPr lang="de-CH" dirty="0" smtClean="0"/>
+          </a:p>
+          <a:p>
+            <a:r>
+              <a:rPr lang="de-CH" dirty="0"/>
+              <a:t>Bidirektionale </a:t>
+            </a:r>
+            <a:r>
+              <a:rPr lang="de-CH" dirty="0" smtClean="0"/>
+              <a:t>Beziehungen</a:t>
+            </a:r>
+          </a:p>
+          <a:p>
+            <a:endParaRPr lang="de-CH" dirty="0"/>
+          </a:p>
+          <a:p>
+            <a:r>
+              <a:rPr lang="de-CH" dirty="0" smtClean="0"/>
+              <a:t>GUI-Skalierbarkeit mittels </a:t>
+            </a:r>
+            <a:r>
               <a:rPr lang="de-CH" dirty="0" err="1" smtClean="0"/>
-              <a:t>Lessons</a:t>
+              <a:t>GridPanes</a:t>
+            </a:r>
+            <a:endParaRPr lang="de-CH" dirty="0"/>
+          </a:p>
+          <a:p>
+            <a:endParaRPr lang="de-CH" dirty="0" smtClean="0"/>
+          </a:p>
+          <a:p>
+            <a:r>
+              <a:rPr lang="de-CH" dirty="0" err="1" smtClean="0"/>
+              <a:t>TomCat</a:t>
             </a:r>
             <a:r>
               <a:rPr lang="de-CH" dirty="0" smtClean="0"/>
               <a:t> </a:t>
             </a:r>
             <a:r>
+              <a:rPr lang="de-CH" dirty="0" smtClean="0"/>
+              <a:t>Installation</a:t>
+            </a:r>
+          </a:p>
+          <a:p>
+            <a:pPr marL="0" indent="0">
+              <a:buNone/>
+            </a:pPr>
+            <a:endParaRPr lang="de-CH" dirty="0"/>
+          </a:p>
+          <a:p>
+            <a:r>
               <a:rPr lang="de-CH" dirty="0" err="1" smtClean="0"/>
-              <a:t>Learned</a:t>
-            </a:r>
-            <a:endParaRPr lang="de-CH" dirty="0"/>
-          </a:p>
-        </p:txBody>
-      </p:sp>
-      <p:sp>
-        <p:nvSpPr>
-          <p:cNvPr id="3" name="Inhaltsplatzhalter 2"/>
-          <p:cNvSpPr>
-            <a:spLocks noGrp="1"/>
-          </p:cNvSpPr>
-          <p:nvPr>
-            <p:ph idx="1"/>
-          </p:nvPr>
-        </p:nvSpPr>
-        <p:spPr/>
-        <p:txBody>
-          <a:bodyPr/>
-          <a:lstStyle/>
-          <a:p>
-            <a:endParaRPr lang="de-CH" dirty="0"/>
+              <a:t>Deployment</a:t>
+            </a:r>
+            <a:endParaRPr lang="de-CH" dirty="0" smtClean="0"/>
           </a:p>
         </p:txBody>
       </p:sp>
     </p:spTree>
     <p:extLst>
       <p:ext uri="{BB962C8B-B14F-4D97-AF65-F5344CB8AC3E}">
-        <p14:creationId xmlns:p14="http://schemas.microsoft.com/office/powerpoint/2010/main" val="986281354"/>
+        <p14:creationId xmlns:p14="http://schemas.microsoft.com/office/powerpoint/2010/main" val="447635669"/>
       </p:ext>
     </p:extLst>
   </p:cSld>
@@ -6491,6 +6634,461 @@
       </p:grpSpPr>
       <p:sp>
         <p:nvSpPr>
+          <p:cNvPr id="2" name="Titel 1"/>
+          <p:cNvSpPr>
+            <a:spLocks noGrp="1"/>
+          </p:cNvSpPr>
+          <p:nvPr>
+            <p:ph type="title"/>
+          </p:nvPr>
+        </p:nvSpPr>
+        <p:spPr/>
+        <p:txBody>
+          <a:bodyPr/>
+          <a:lstStyle/>
+          <a:p>
+            <a:r>
+              <a:rPr lang="de-CH" dirty="0" err="1" smtClean="0"/>
+              <a:t>Lessons</a:t>
+            </a:r>
+            <a:r>
+              <a:rPr lang="de-CH" dirty="0" smtClean="0"/>
+              <a:t> </a:t>
+            </a:r>
+            <a:r>
+              <a:rPr lang="de-CH" dirty="0" err="1" smtClean="0"/>
+              <a:t>Learned</a:t>
+            </a:r>
+            <a:endParaRPr lang="de-CH" dirty="0"/>
+          </a:p>
+        </p:txBody>
+      </p:sp>
+      <p:sp>
+        <p:nvSpPr>
+          <p:cNvPr id="3" name="Inhaltsplatzhalter 2"/>
+          <p:cNvSpPr>
+            <a:spLocks noGrp="1"/>
+          </p:cNvSpPr>
+          <p:nvPr>
+            <p:ph idx="1"/>
+          </p:nvPr>
+        </p:nvSpPr>
+        <p:spPr/>
+        <p:txBody>
+          <a:bodyPr/>
+          <a:lstStyle/>
+          <a:p>
+            <a:r>
+              <a:rPr lang="de-CH" dirty="0" smtClean="0"/>
+              <a:t>Luca Kündig</a:t>
+            </a:r>
+            <a:endParaRPr lang="de-CH" dirty="0"/>
+          </a:p>
+        </p:txBody>
+      </p:sp>
+    </p:spTree>
+    <p:extLst>
+      <p:ext uri="{BB962C8B-B14F-4D97-AF65-F5344CB8AC3E}">
+        <p14:creationId xmlns:p14="http://schemas.microsoft.com/office/powerpoint/2010/main" val="256452221"/>
+      </p:ext>
+    </p:extLst>
+  </p:cSld>
+  <p:clrMapOvr>
+    <a:masterClrMapping/>
+  </p:clrMapOvr>
+  <p:timing>
+    <p:tnLst>
+      <p:par>
+        <p:cTn id="1" dur="indefinite" restart="never" nodeType="tmRoot"/>
+      </p:par>
+    </p:tnLst>
+  </p:timing>
+</p:sld>
+</file>
+
+<file path=ppt/slides/slide15.xml><?xml version="1.0" encoding="utf-8"?>
+<p:sld xmlns:a="http://schemas.openxmlformats.org/drawingml/2006/main" xmlns:r="http://schemas.openxmlformats.org/officeDocument/2006/relationships" xmlns:p="http://schemas.openxmlformats.org/presentationml/2006/main">
+  <p:cSld>
+    <p:spTree>
+      <p:nvGrpSpPr>
+        <p:cNvPr id="1" name=""/>
+        <p:cNvGrpSpPr/>
+        <p:nvPr/>
+      </p:nvGrpSpPr>
+      <p:grpSpPr>
+        <a:xfrm>
+          <a:off x="0" y="0"/>
+          <a:ext cx="0" cy="0"/>
+          <a:chOff x="0" y="0"/>
+          <a:chExt cx="0" cy="0"/>
+        </a:xfrm>
+      </p:grpSpPr>
+      <p:sp>
+        <p:nvSpPr>
+          <p:cNvPr id="2" name="Titel 1"/>
+          <p:cNvSpPr>
+            <a:spLocks noGrp="1"/>
+          </p:cNvSpPr>
+          <p:nvPr>
+            <p:ph type="title"/>
+          </p:nvPr>
+        </p:nvSpPr>
+        <p:spPr/>
+        <p:txBody>
+          <a:bodyPr/>
+          <a:lstStyle/>
+          <a:p>
+            <a:r>
+              <a:rPr lang="de-CH" dirty="0" err="1" smtClean="0"/>
+              <a:t>Lessons</a:t>
+            </a:r>
+            <a:r>
+              <a:rPr lang="de-CH" dirty="0" smtClean="0"/>
+              <a:t> </a:t>
+            </a:r>
+            <a:r>
+              <a:rPr lang="de-CH" dirty="0" err="1" smtClean="0"/>
+              <a:t>Learned</a:t>
+            </a:r>
+            <a:endParaRPr lang="de-CH" dirty="0"/>
+          </a:p>
+        </p:txBody>
+      </p:sp>
+      <p:sp>
+        <p:nvSpPr>
+          <p:cNvPr id="3" name="Inhaltsplatzhalter 2"/>
+          <p:cNvSpPr>
+            <a:spLocks noGrp="1"/>
+          </p:cNvSpPr>
+          <p:nvPr>
+            <p:ph idx="1"/>
+          </p:nvPr>
+        </p:nvSpPr>
+        <p:spPr/>
+        <p:txBody>
+          <a:bodyPr/>
+          <a:lstStyle/>
+          <a:p>
+            <a:r>
+              <a:rPr lang="de-CH" dirty="0" smtClean="0"/>
+              <a:t>Sandro Ritz</a:t>
+            </a:r>
+            <a:endParaRPr lang="de-CH" dirty="0"/>
+          </a:p>
+        </p:txBody>
+      </p:sp>
+    </p:spTree>
+    <p:extLst>
+      <p:ext uri="{BB962C8B-B14F-4D97-AF65-F5344CB8AC3E}">
+        <p14:creationId xmlns:p14="http://schemas.microsoft.com/office/powerpoint/2010/main" val="2733050563"/>
+      </p:ext>
+    </p:extLst>
+  </p:cSld>
+  <p:clrMapOvr>
+    <a:masterClrMapping/>
+  </p:clrMapOvr>
+  <p:timing>
+    <p:tnLst>
+      <p:par>
+        <p:cTn id="1" dur="indefinite" restart="never" nodeType="tmRoot"/>
+      </p:par>
+    </p:tnLst>
+  </p:timing>
+</p:sld>
+</file>
+
+<file path=ppt/slides/slide16.xml><?xml version="1.0" encoding="utf-8"?>
+<p:sld xmlns:a="http://schemas.openxmlformats.org/drawingml/2006/main" xmlns:r="http://schemas.openxmlformats.org/officeDocument/2006/relationships" xmlns:p="http://schemas.openxmlformats.org/presentationml/2006/main">
+  <p:cSld>
+    <p:spTree>
+      <p:nvGrpSpPr>
+        <p:cNvPr id="1" name=""/>
+        <p:cNvGrpSpPr/>
+        <p:nvPr/>
+      </p:nvGrpSpPr>
+      <p:grpSpPr>
+        <a:xfrm>
+          <a:off x="0" y="0"/>
+          <a:ext cx="0" cy="0"/>
+          <a:chOff x="0" y="0"/>
+          <a:chExt cx="0" cy="0"/>
+        </a:xfrm>
+      </p:grpSpPr>
+      <p:sp>
+        <p:nvSpPr>
+          <p:cNvPr id="2" name="Titel 1"/>
+          <p:cNvSpPr>
+            <a:spLocks noGrp="1"/>
+          </p:cNvSpPr>
+          <p:nvPr>
+            <p:ph type="title"/>
+          </p:nvPr>
+        </p:nvSpPr>
+        <p:spPr/>
+        <p:txBody>
+          <a:bodyPr/>
+          <a:lstStyle/>
+          <a:p>
+            <a:r>
+              <a:rPr lang="de-CH" dirty="0" err="1" smtClean="0"/>
+              <a:t>Lessons</a:t>
+            </a:r>
+            <a:r>
+              <a:rPr lang="de-CH" dirty="0" smtClean="0"/>
+              <a:t> </a:t>
+            </a:r>
+            <a:r>
+              <a:rPr lang="de-CH" dirty="0" err="1" smtClean="0"/>
+              <a:t>Learned</a:t>
+            </a:r>
+            <a:endParaRPr lang="de-CH" dirty="0"/>
+          </a:p>
+        </p:txBody>
+      </p:sp>
+      <p:sp>
+        <p:nvSpPr>
+          <p:cNvPr id="3" name="Inhaltsplatzhalter 2"/>
+          <p:cNvSpPr>
+            <a:spLocks noGrp="1"/>
+          </p:cNvSpPr>
+          <p:nvPr>
+            <p:ph idx="1"/>
+          </p:nvPr>
+        </p:nvSpPr>
+        <p:spPr/>
+        <p:txBody>
+          <a:bodyPr/>
+          <a:lstStyle/>
+          <a:p>
+            <a:r>
+              <a:rPr lang="de-CH" dirty="0" smtClean="0"/>
+              <a:t>Mike Monticoli</a:t>
+            </a:r>
+            <a:endParaRPr lang="de-CH" dirty="0"/>
+          </a:p>
+        </p:txBody>
+      </p:sp>
+    </p:spTree>
+    <p:extLst>
+      <p:ext uri="{BB962C8B-B14F-4D97-AF65-F5344CB8AC3E}">
+        <p14:creationId xmlns:p14="http://schemas.microsoft.com/office/powerpoint/2010/main" val="492210921"/>
+      </p:ext>
+    </p:extLst>
+  </p:cSld>
+  <p:clrMapOvr>
+    <a:masterClrMapping/>
+  </p:clrMapOvr>
+  <p:timing>
+    <p:tnLst>
+      <p:par>
+        <p:cTn id="1" dur="indefinite" restart="never" nodeType="tmRoot"/>
+      </p:par>
+    </p:tnLst>
+  </p:timing>
+</p:sld>
+</file>
+
+<file path=ppt/slides/slide17.xml><?xml version="1.0" encoding="utf-8"?>
+<p:sld xmlns:a="http://schemas.openxmlformats.org/drawingml/2006/main" xmlns:r="http://schemas.openxmlformats.org/officeDocument/2006/relationships" xmlns:p="http://schemas.openxmlformats.org/presentationml/2006/main">
+  <p:cSld>
+    <p:spTree>
+      <p:nvGrpSpPr>
+        <p:cNvPr id="1" name=""/>
+        <p:cNvGrpSpPr/>
+        <p:nvPr/>
+      </p:nvGrpSpPr>
+      <p:grpSpPr>
+        <a:xfrm>
+          <a:off x="0" y="0"/>
+          <a:ext cx="0" cy="0"/>
+          <a:chOff x="0" y="0"/>
+          <a:chExt cx="0" cy="0"/>
+        </a:xfrm>
+      </p:grpSpPr>
+      <p:sp>
+        <p:nvSpPr>
+          <p:cNvPr id="2" name="Titel 1"/>
+          <p:cNvSpPr>
+            <a:spLocks noGrp="1"/>
+          </p:cNvSpPr>
+          <p:nvPr>
+            <p:ph type="title"/>
+          </p:nvPr>
+        </p:nvSpPr>
+        <p:spPr/>
+        <p:txBody>
+          <a:bodyPr/>
+          <a:lstStyle/>
+          <a:p>
+            <a:r>
+              <a:rPr lang="de-CH" dirty="0" err="1" smtClean="0"/>
+              <a:t>Lessons</a:t>
+            </a:r>
+            <a:r>
+              <a:rPr lang="de-CH" dirty="0" smtClean="0"/>
+              <a:t> </a:t>
+            </a:r>
+            <a:r>
+              <a:rPr lang="de-CH" dirty="0" err="1" smtClean="0"/>
+              <a:t>Learned</a:t>
+            </a:r>
+            <a:endParaRPr lang="de-CH" dirty="0"/>
+          </a:p>
+        </p:txBody>
+      </p:sp>
+      <p:sp>
+        <p:nvSpPr>
+          <p:cNvPr id="3" name="Inhaltsplatzhalter 2"/>
+          <p:cNvSpPr>
+            <a:spLocks noGrp="1"/>
+          </p:cNvSpPr>
+          <p:nvPr>
+            <p:ph idx="1"/>
+          </p:nvPr>
+        </p:nvSpPr>
+        <p:spPr/>
+        <p:txBody>
+          <a:bodyPr/>
+          <a:lstStyle/>
+          <a:p>
+            <a:r>
+              <a:rPr lang="de-CH" dirty="0" smtClean="0"/>
+              <a:t>Cihan Demir</a:t>
+            </a:r>
+            <a:endParaRPr lang="de-CH" dirty="0"/>
+          </a:p>
+        </p:txBody>
+      </p:sp>
+    </p:spTree>
+    <p:extLst>
+      <p:ext uri="{BB962C8B-B14F-4D97-AF65-F5344CB8AC3E}">
+        <p14:creationId xmlns:p14="http://schemas.microsoft.com/office/powerpoint/2010/main" val="401769967"/>
+      </p:ext>
+    </p:extLst>
+  </p:cSld>
+  <p:clrMapOvr>
+    <a:masterClrMapping/>
+  </p:clrMapOvr>
+  <p:timing>
+    <p:tnLst>
+      <p:par>
+        <p:cTn id="1" dur="indefinite" restart="never" nodeType="tmRoot"/>
+      </p:par>
+    </p:tnLst>
+  </p:timing>
+</p:sld>
+</file>
+
+<file path=ppt/slides/slide18.xml><?xml version="1.0" encoding="utf-8"?>
+<p:sld xmlns:a="http://schemas.openxmlformats.org/drawingml/2006/main" xmlns:r="http://schemas.openxmlformats.org/officeDocument/2006/relationships" xmlns:p="http://schemas.openxmlformats.org/presentationml/2006/main">
+  <p:cSld>
+    <p:spTree>
+      <p:nvGrpSpPr>
+        <p:cNvPr id="1" name=""/>
+        <p:cNvGrpSpPr/>
+        <p:nvPr/>
+      </p:nvGrpSpPr>
+      <p:grpSpPr>
+        <a:xfrm>
+          <a:off x="0" y="0"/>
+          <a:ext cx="0" cy="0"/>
+          <a:chOff x="0" y="0"/>
+          <a:chExt cx="0" cy="0"/>
+        </a:xfrm>
+      </p:grpSpPr>
+      <p:sp>
+        <p:nvSpPr>
+          <p:cNvPr id="2" name="Titel 1"/>
+          <p:cNvSpPr>
+            <a:spLocks noGrp="1"/>
+          </p:cNvSpPr>
+          <p:nvPr>
+            <p:ph type="title"/>
+          </p:nvPr>
+        </p:nvSpPr>
+        <p:spPr/>
+        <p:txBody>
+          <a:bodyPr/>
+          <a:lstStyle/>
+          <a:p>
+            <a:r>
+              <a:rPr lang="de-CH" dirty="0" err="1" smtClean="0"/>
+              <a:t>Lessons</a:t>
+            </a:r>
+            <a:r>
+              <a:rPr lang="de-CH" dirty="0" smtClean="0"/>
+              <a:t> </a:t>
+            </a:r>
+            <a:r>
+              <a:rPr lang="de-CH" dirty="0" err="1" smtClean="0"/>
+              <a:t>Learned</a:t>
+            </a:r>
+            <a:endParaRPr lang="de-CH" dirty="0"/>
+          </a:p>
+        </p:txBody>
+      </p:sp>
+      <p:sp>
+        <p:nvSpPr>
+          <p:cNvPr id="3" name="Inhaltsplatzhalter 2"/>
+          <p:cNvSpPr>
+            <a:spLocks noGrp="1"/>
+          </p:cNvSpPr>
+          <p:nvPr>
+            <p:ph idx="1"/>
+          </p:nvPr>
+        </p:nvSpPr>
+        <p:spPr/>
+        <p:txBody>
+          <a:bodyPr/>
+          <a:lstStyle/>
+          <a:p>
+            <a:r>
+              <a:rPr lang="de-CH" dirty="0" smtClean="0"/>
+              <a:t>Mike Iten</a:t>
+            </a:r>
+            <a:endParaRPr lang="de-CH" dirty="0"/>
+          </a:p>
+        </p:txBody>
+      </p:sp>
+    </p:spTree>
+    <p:extLst>
+      <p:ext uri="{BB962C8B-B14F-4D97-AF65-F5344CB8AC3E}">
+        <p14:creationId xmlns:p14="http://schemas.microsoft.com/office/powerpoint/2010/main" val="986281354"/>
+      </p:ext>
+    </p:extLst>
+  </p:cSld>
+  <p:clrMapOvr>
+    <a:masterClrMapping/>
+  </p:clrMapOvr>
+  <p:timing>
+    <p:tnLst>
+      <p:par>
+        <p:cTn id="1" dur="indefinite" restart="never" nodeType="tmRoot"/>
+      </p:par>
+    </p:tnLst>
+  </p:timing>
+</p:sld>
+</file>
+
+<file path=ppt/slides/slide19.xml><?xml version="1.0" encoding="utf-8"?>
+<p:sld xmlns:a="http://schemas.openxmlformats.org/drawingml/2006/main" xmlns:r="http://schemas.openxmlformats.org/officeDocument/2006/relationships" xmlns:p="http://schemas.openxmlformats.org/presentationml/2006/main">
+  <p:cSld>
+    <p:spTree>
+      <p:nvGrpSpPr>
+        <p:cNvPr id="1" name=""/>
+        <p:cNvGrpSpPr/>
+        <p:nvPr/>
+      </p:nvGrpSpPr>
+      <p:grpSpPr>
+        <a:xfrm>
+          <a:off x="0" y="0"/>
+          <a:ext cx="0" cy="0"/>
+          <a:chOff x="0" y="0"/>
+          <a:chExt cx="0" cy="0"/>
+        </a:xfrm>
+      </p:grpSpPr>
+      <p:sp>
+        <p:nvSpPr>
           <p:cNvPr id="4" name="Titel 3"/>
           <p:cNvSpPr>
             <a:spLocks noGrp="1"/>
@@ -6529,13 +7127,8 @@
           <a:p>
             <a:r>
               <a:rPr lang="de-CH" dirty="0" smtClean="0"/>
-              <a:t>Fragen</a:t>
-            </a:r>
-            <a:r>
-              <a:rPr lang="de-CH" dirty="0" smtClean="0"/>
-              <a:t>?</a:t>
-            </a:r>
-            <a:endParaRPr lang="de-CH" dirty="0" smtClean="0"/>
+              <a:t>Fragen?</a:t>
+            </a:r>
           </a:p>
         </p:txBody>
       </p:sp>
@@ -6593,7 +7186,7 @@
           <a:p>
             <a:r>
               <a:rPr lang="de-CH" dirty="0" smtClean="0"/>
-              <a:t>Einleitung</a:t>
+              <a:t>TO BE DELETED AUFTEILUNG	</a:t>
             </a:r>
             <a:endParaRPr lang="de-CH" dirty="0"/>
           </a:p>
@@ -6609,139 +7202,68 @@
             <p:ph idx="1"/>
           </p:nvPr>
         </p:nvSpPr>
-        <p:spPr>
-          <a:xfrm>
-            <a:off x="1103312" y="1673356"/>
-            <a:ext cx="8946541" cy="4195481"/>
-          </a:xfrm>
-        </p:spPr>
-        <p:txBody>
-          <a:bodyPr>
-            <a:normAutofit fontScale="25000" lnSpcReduction="20000"/>
-          </a:bodyPr>
-          <a:lstStyle/>
-          <a:p>
+        <p:spPr/>
+        <p:txBody>
+          <a:bodyPr/>
+          <a:lstStyle/>
+          <a:p>
+            <a:r>
+              <a:rPr lang="de-CH" dirty="0" smtClean="0"/>
+              <a:t>Iten Qualitätsziele / </a:t>
+            </a:r>
+            <a:r>
+              <a:rPr lang="de-CH" dirty="0" err="1" smtClean="0"/>
+              <a:t>Funktionaletests</a:t>
+            </a:r>
             <a:endParaRPr lang="de-CH" dirty="0" smtClean="0"/>
           </a:p>
           <a:p>
+            <a:r>
+              <a:rPr lang="de-CH" dirty="0" smtClean="0"/>
+              <a:t>Monticoli Design / JDD / </a:t>
+            </a:r>
+            <a:r>
+              <a:rPr lang="de-CH" dirty="0" err="1" smtClean="0"/>
+              <a:t>Junit</a:t>
+            </a:r>
             <a:endParaRPr lang="de-CH" dirty="0" smtClean="0"/>
           </a:p>
           <a:p>
             <a:r>
-              <a:rPr lang="de-CH" sz="4800" dirty="0" smtClean="0"/>
-              <a:t>Architektur &amp; Lösung</a:t>
-            </a:r>
-          </a:p>
-          <a:p>
-            <a:endParaRPr lang="de-CH" sz="4800" dirty="0" smtClean="0"/>
-          </a:p>
-          <a:p>
-            <a:r>
-              <a:rPr lang="de-CH" sz="4800" dirty="0"/>
-              <a:t>Verwendete </a:t>
-            </a:r>
-            <a:r>
-              <a:rPr lang="de-CH" sz="4800" dirty="0" smtClean="0"/>
-              <a:t>Technologien</a:t>
-            </a:r>
-            <a:endParaRPr lang="de-CH" sz="4800" dirty="0" smtClean="0"/>
-          </a:p>
-          <a:p>
-            <a:endParaRPr lang="de-CH" sz="4800" dirty="0" smtClean="0"/>
-          </a:p>
-          <a:p>
-            <a:r>
-              <a:rPr lang="de-CH" sz="4800" dirty="0"/>
-              <a:t>Mängel-Manager </a:t>
-            </a:r>
-            <a:r>
-              <a:rPr lang="de-CH" sz="4800" dirty="0" smtClean="0"/>
-              <a:t>Hands-on</a:t>
-            </a:r>
-          </a:p>
-          <a:p>
-            <a:pPr marL="0" indent="0">
-              <a:buNone/>
-            </a:pPr>
-            <a:endParaRPr lang="de-CH" sz="4800" dirty="0"/>
-          </a:p>
-          <a:p>
-            <a:r>
-              <a:rPr lang="de-CH" sz="4800" dirty="0" err="1" smtClean="0"/>
-              <a:t>Junit</a:t>
-            </a:r>
-            <a:r>
-              <a:rPr lang="de-CH" sz="4800" dirty="0" smtClean="0"/>
-              <a:t> Tests</a:t>
-            </a:r>
-            <a:endParaRPr lang="de-CH" sz="4800" dirty="0" smtClean="0"/>
-          </a:p>
-          <a:p>
-            <a:endParaRPr lang="de-CH" sz="4800" dirty="0" smtClean="0"/>
-          </a:p>
-          <a:p>
-            <a:r>
-              <a:rPr lang="de-CH" sz="4800" dirty="0" smtClean="0"/>
-              <a:t>Funktionale Test</a:t>
-            </a:r>
-            <a:endParaRPr lang="de-CH" sz="4800" dirty="0"/>
-          </a:p>
-          <a:p>
-            <a:endParaRPr lang="de-CH" sz="4800" dirty="0"/>
-          </a:p>
-          <a:p>
-            <a:r>
-              <a:rPr lang="de-CH" sz="4800" dirty="0" smtClean="0"/>
-              <a:t>Komplikationen</a:t>
-            </a:r>
-          </a:p>
-          <a:p>
-            <a:endParaRPr lang="de-CH" sz="4800" dirty="0"/>
-          </a:p>
-          <a:p>
-            <a:r>
-              <a:rPr lang="de-CH" sz="4800" dirty="0" err="1" smtClean="0"/>
-              <a:t>Lessons</a:t>
-            </a:r>
-            <a:r>
-              <a:rPr lang="de-CH" sz="4800" dirty="0" smtClean="0"/>
-              <a:t> </a:t>
-            </a:r>
-            <a:r>
-              <a:rPr lang="de-CH" sz="4800" dirty="0" err="1" smtClean="0"/>
-              <a:t>Learned</a:t>
-            </a:r>
-            <a:endParaRPr lang="de-CH" sz="4800" dirty="0" smtClean="0"/>
-          </a:p>
-          <a:p>
-            <a:endParaRPr lang="de-CH" sz="4800" dirty="0"/>
-          </a:p>
-          <a:p>
-            <a:r>
-              <a:rPr lang="de-CH" sz="4800" dirty="0" smtClean="0"/>
-              <a:t>THE END</a:t>
-            </a:r>
-            <a:endParaRPr lang="de-CH" sz="4800" dirty="0"/>
+              <a:rPr lang="de-CH" dirty="0" smtClean="0"/>
+              <a:t>Sandro Architektur / </a:t>
+            </a:r>
+            <a:r>
+              <a:rPr lang="de-CH" dirty="0" err="1" smtClean="0"/>
+              <a:t>Komplikaton</a:t>
+            </a:r>
+            <a:endParaRPr lang="de-CH" dirty="0" smtClean="0"/>
+          </a:p>
+          <a:p>
+            <a:r>
+              <a:rPr lang="de-CH" dirty="0" smtClean="0"/>
+              <a:t>Cihan Einleitung / Vorgehen?? / Verwendetes</a:t>
+            </a:r>
+          </a:p>
+          <a:p>
+            <a:r>
+              <a:rPr lang="de-CH" dirty="0" smtClean="0"/>
+              <a:t>Luca Vorgehen ?? / Demo</a:t>
+            </a:r>
+            <a:endParaRPr lang="de-CH" dirty="0"/>
           </a:p>
         </p:txBody>
       </p:sp>
     </p:spTree>
     <p:extLst>
       <p:ext uri="{BB962C8B-B14F-4D97-AF65-F5344CB8AC3E}">
-        <p14:creationId xmlns:p14="http://schemas.microsoft.com/office/powerpoint/2010/main" val="1999583844"/>
+        <p14:creationId xmlns:p14="http://schemas.microsoft.com/office/powerpoint/2010/main" val="505444965"/>
       </p:ext>
     </p:extLst>
   </p:cSld>
   <p:clrMapOvr>
     <a:masterClrMapping/>
   </p:clrMapOvr>
-  <p:timing>
-    <p:tnLst>
-      <p:par>
-        <p:cTn id="1" dur="indefinite" restart="never" nodeType="tmRoot"/>
-      </p:par>
-    </p:tnLst>
-  </p:timing>
 </p:sld>
 </file>
 
@@ -6779,56 +7301,106 @@
           <a:p>
             <a:r>
               <a:rPr lang="de-CH" dirty="0" smtClean="0"/>
-              <a:t>Architektur &amp; Lösung</a:t>
+              <a:t>Einleitung</a:t>
             </a:r>
             <a:endParaRPr lang="de-CH" dirty="0"/>
           </a:p>
         </p:txBody>
       </p:sp>
-      <p:pic>
-        <p:nvPicPr>
-          <p:cNvPr id="6" name="Grafik 5"/>
-          <p:cNvPicPr>
-            <a:picLocks noChangeAspect="1"/>
-          </p:cNvPicPr>
-          <p:nvPr/>
-        </p:nvPicPr>
-        <p:blipFill>
-          <a:blip r:embed="rId2"/>
-          <a:stretch>
-            <a:fillRect/>
-          </a:stretch>
-        </p:blipFill>
+      <p:sp>
+        <p:nvSpPr>
+          <p:cNvPr id="3" name="Inhaltsplatzhalter 2"/>
+          <p:cNvSpPr>
+            <a:spLocks noGrp="1"/>
+          </p:cNvSpPr>
+          <p:nvPr>
+            <p:ph idx="1"/>
+          </p:nvPr>
+        </p:nvSpPr>
         <p:spPr>
           <a:xfrm>
-            <a:off x="759123" y="1338229"/>
-            <a:ext cx="9605326" cy="5252351"/>
+            <a:off x="1103312" y="1673356"/>
+            <a:ext cx="8946541" cy="4195481"/>
           </a:xfrm>
-          <a:prstGeom prst="round2DiagRect">
-            <a:avLst>
-              <a:gd name="adj1" fmla="val 16667"/>
-              <a:gd name="adj2" fmla="val 0"/>
-            </a:avLst>
-          </a:prstGeom>
-          <a:ln w="88900" cap="sq">
-            <a:solidFill>
-              <a:srgbClr val="FFFFFF"/>
-            </a:solidFill>
-            <a:miter lim="800000"/>
-          </a:ln>
-          <a:effectLst>
-            <a:outerShdw blurRad="254000" algn="tl" rotWithShape="0">
-              <a:srgbClr val="000000">
-                <a:alpha val="43000"/>
-              </a:srgbClr>
-            </a:outerShdw>
-          </a:effectLst>
         </p:spPr>
-      </p:pic>
+        <p:txBody>
+          <a:bodyPr>
+            <a:noAutofit/>
+          </a:bodyPr>
+          <a:lstStyle/>
+          <a:p>
+            <a:r>
+              <a:rPr lang="de-CH" sz="2200" dirty="0" smtClean="0"/>
+              <a:t>Vorgehen</a:t>
+            </a:r>
+          </a:p>
+          <a:p>
+            <a:r>
+              <a:rPr lang="de-CH" sz="2200" dirty="0" smtClean="0"/>
+              <a:t>Qualitätsziele</a:t>
+            </a:r>
+            <a:endParaRPr lang="de-CH" sz="2200" dirty="0"/>
+          </a:p>
+          <a:p>
+            <a:r>
+              <a:rPr lang="de-CH" sz="2200" dirty="0" smtClean="0"/>
+              <a:t>Architektur &amp; Lösung</a:t>
+            </a:r>
+            <a:endParaRPr lang="de-CH" sz="2200" dirty="0" smtClean="0"/>
+          </a:p>
+          <a:p>
+            <a:r>
+              <a:rPr lang="de-CH" sz="2200" dirty="0"/>
+              <a:t>Mängel-Manager </a:t>
+            </a:r>
+            <a:r>
+              <a:rPr lang="de-CH" sz="2200" dirty="0" smtClean="0"/>
+              <a:t>Hands-on</a:t>
+            </a:r>
+            <a:endParaRPr lang="de-CH" sz="2200" dirty="0"/>
+          </a:p>
+          <a:p>
+            <a:r>
+              <a:rPr lang="de-CH" sz="2200" dirty="0" smtClean="0"/>
+              <a:t>Tests</a:t>
+            </a:r>
+            <a:endParaRPr lang="de-CH" sz="2200" dirty="0"/>
+          </a:p>
+          <a:p>
+            <a:r>
+              <a:rPr lang="de-CH" sz="2200" dirty="0" smtClean="0"/>
+              <a:t>Komplikationen</a:t>
+            </a:r>
+            <a:endParaRPr lang="de-CH" sz="2200" dirty="0"/>
+          </a:p>
+          <a:p>
+            <a:r>
+              <a:rPr lang="de-CH" sz="2200" dirty="0" err="1" smtClean="0"/>
+              <a:t>Lessons</a:t>
+            </a:r>
+            <a:r>
+              <a:rPr lang="de-CH" sz="2200" dirty="0" smtClean="0"/>
+              <a:t> </a:t>
+            </a:r>
+            <a:r>
+              <a:rPr lang="de-CH" sz="2200" dirty="0" err="1" smtClean="0"/>
+              <a:t>Learned</a:t>
+            </a:r>
+            <a:endParaRPr lang="de-CH" sz="2200" dirty="0"/>
+          </a:p>
+          <a:p>
+            <a:r>
+              <a:rPr lang="de-CH" sz="2200" dirty="0" smtClean="0"/>
+              <a:t>THE END</a:t>
+            </a:r>
+            <a:endParaRPr lang="de-CH" sz="2200" dirty="0"/>
+          </a:p>
+        </p:txBody>
+      </p:sp>
     </p:spTree>
     <p:extLst>
       <p:ext uri="{BB962C8B-B14F-4D97-AF65-F5344CB8AC3E}">
-        <p14:creationId xmlns:p14="http://schemas.microsoft.com/office/powerpoint/2010/main" val="1766252366"/>
+        <p14:creationId xmlns:p14="http://schemas.microsoft.com/office/powerpoint/2010/main" val="1999583844"/>
       </p:ext>
     </p:extLst>
   </p:cSld>
@@ -6878,31 +7450,12 @@
           <a:lstStyle/>
           <a:p>
             <a:r>
-              <a:rPr lang="de-CH" dirty="0"/>
-              <a:t>Mängel-Manager </a:t>
-            </a:r>
-            <a:r>
               <a:rPr lang="de-CH" dirty="0" smtClean="0"/>
-              <a:t>Hands-on</a:t>
+              <a:t>Vorgehen</a:t>
             </a:r>
             <a:br>
               <a:rPr lang="de-CH" dirty="0" smtClean="0"/>
             </a:br>
-            <a:r>
-              <a:rPr lang="de-CH" sz="2800" dirty="0"/>
-              <a:t>BackOffice </a:t>
-            </a:r>
-            <a:r>
-              <a:rPr lang="de-CH" sz="2800" dirty="0" smtClean="0"/>
-              <a:t>GU Intern </a:t>
-            </a:r>
-            <a:r>
-              <a:rPr lang="de-CH" sz="2800" dirty="0"/>
-              <a:t>Client</a:t>
-            </a:r>
-            <a:br>
-              <a:rPr lang="de-CH" sz="2800" dirty="0"/>
-            </a:br>
             <a:endParaRPr lang="de-CH" dirty="0"/>
           </a:p>
         </p:txBody>
@@ -6919,74 +7472,109 @@
         </p:nvSpPr>
         <p:spPr/>
         <p:txBody>
-          <a:bodyPr>
-            <a:normAutofit fontScale="92500" lnSpcReduction="20000"/>
-          </a:bodyPr>
+          <a:bodyPr/>
           <a:lstStyle/>
           <a:p>
             <a:r>
               <a:rPr lang="de-CH" dirty="0" smtClean="0"/>
-              <a:t>Unternehmen erfassen</a:t>
-            </a:r>
-          </a:p>
-          <a:p>
-            <a:endParaRPr lang="de-CH" dirty="0"/>
-          </a:p>
-          <a:p>
+              <a:t>Grobaufteilung der Zuständigkeiten</a:t>
+            </a:r>
+          </a:p>
+          <a:p>
+            <a:r>
+              <a:rPr lang="de-CH" dirty="0"/>
+              <a:t>Wöchentliche </a:t>
+            </a:r>
             <a:r>
               <a:rPr lang="de-CH" dirty="0" smtClean="0"/>
-              <a:t>Person erfassen</a:t>
-            </a:r>
-          </a:p>
-          <a:p>
-            <a:endParaRPr lang="de-CH" dirty="0"/>
-          </a:p>
-          <a:p>
+              <a:t>Sitzungen</a:t>
+            </a:r>
+          </a:p>
+          <a:p>
+            <a:r>
+              <a:rPr lang="de-CH" dirty="0" err="1" smtClean="0"/>
+              <a:t>Requirements</a:t>
+            </a:r>
             <a:r>
               <a:rPr lang="de-CH" dirty="0" smtClean="0"/>
-              <a:t>Projekt erfassen (Suchfunktion, Detailansicht)</a:t>
-            </a:r>
-          </a:p>
-          <a:p>
-            <a:endParaRPr lang="de-CH" dirty="0"/>
-          </a:p>
-          <a:p>
+              <a:t> definieren</a:t>
+            </a:r>
+          </a:p>
+          <a:p>
+            <a:r>
+              <a:rPr lang="de-CH" dirty="0" err="1" smtClean="0"/>
+              <a:t>UseCase</a:t>
+            </a:r>
             <a:r>
               <a:rPr lang="de-CH" dirty="0" smtClean="0"/>
-              <a:t>Mangel zu Projekt erfassen</a:t>
-            </a:r>
-          </a:p>
-          <a:p>
-            <a:endParaRPr lang="de-CH" dirty="0"/>
+              <a:t> &amp; </a:t>
+            </a:r>
+            <a:r>
+              <a:rPr lang="de-CH" dirty="0" err="1" smtClean="0"/>
+              <a:t>Activity-Diagram</a:t>
+            </a:r>
+            <a:endParaRPr lang="de-CH" dirty="0" smtClean="0"/>
           </a:p>
           <a:p>
             <a:r>
               <a:rPr lang="de-CH" dirty="0" smtClean="0"/>
-              <a:t>Meldung zu Mangel erfassen</a:t>
-            </a:r>
-          </a:p>
-          <a:p>
-            <a:endParaRPr lang="de-CH" dirty="0"/>
+              <a:t>ERD &amp; Klassenkonzept</a:t>
+            </a:r>
           </a:p>
           <a:p>
             <a:r>
               <a:rPr lang="de-CH" dirty="0" smtClean="0"/>
-              <a:t>Mängelliste drucken</a:t>
-            </a:r>
+              <a:t>Softwarearchitektur</a:t>
+            </a:r>
+          </a:p>
+          <a:p>
+            <a:r>
+              <a:rPr lang="de-CH" dirty="0" smtClean="0"/>
+              <a:t>Weiterarbeit mit Waffle.io</a:t>
+            </a:r>
+          </a:p>
+          <a:p>
             <a:endParaRPr lang="de-CH" dirty="0" smtClean="0"/>
           </a:p>
-          <a:p>
-            <a:pPr marL="0" indent="0">
-              <a:buNone/>
-            </a:pPr>
-            <a:endParaRPr lang="de-CH" dirty="0" smtClean="0"/>
-          </a:p>
-        </p:txBody>
-      </p:sp>
+        </p:txBody>
+      </p:sp>
+      <p:pic>
+        <p:nvPicPr>
+          <p:cNvPr id="4" name="Grafik 3" descr="C:\Users\tickstero\Documents\Github\INM21_Group_B\01_Planung\01_Dokumente\Diagramme\UseCase\UseCase_Bilder\UseCase002.bmp"/>
+          <p:cNvPicPr/>
+          <p:nvPr/>
+        </p:nvPicPr>
+        <p:blipFill>
+          <a:blip r:embed="rId2">
+            <a:extLst>
+              <a:ext uri="{28A0092B-C50C-407E-A947-70E740481C1C}">
+                <a14:useLocalDpi xmlns:a14="http://schemas.microsoft.com/office/drawing/2010/main" val="0"/>
+              </a:ext>
+            </a:extLst>
+          </a:blip>
+          <a:srcRect/>
+          <a:stretch>
+            <a:fillRect/>
+          </a:stretch>
+        </p:blipFill>
+        <p:spPr bwMode="auto">
+          <a:xfrm>
+            <a:off x="6194966" y="2026919"/>
+            <a:ext cx="5777865" cy="4221480"/>
+          </a:xfrm>
+          <a:prstGeom prst="rect">
+            <a:avLst/>
+          </a:prstGeom>
+          <a:noFill/>
+          <a:ln>
+            <a:noFill/>
+          </a:ln>
+        </p:spPr>
+      </p:pic>
     </p:spTree>
     <p:extLst>
       <p:ext uri="{BB962C8B-B14F-4D97-AF65-F5344CB8AC3E}">
-        <p14:creationId xmlns:p14="http://schemas.microsoft.com/office/powerpoint/2010/main" val="485883327"/>
+        <p14:creationId xmlns:p14="http://schemas.microsoft.com/office/powerpoint/2010/main" val="1553097806"/>
       </p:ext>
     </p:extLst>
   </p:cSld>
@@ -7004,6 +7592,198 @@
 </file>
 
 <file path=ppt/slides/slide5.xml><?xml version="1.0" encoding="utf-8"?>
+<p:sld xmlns:a="http://schemas.openxmlformats.org/drawingml/2006/main" xmlns:r="http://schemas.openxmlformats.org/officeDocument/2006/relationships" xmlns:p="http://schemas.openxmlformats.org/presentationml/2006/main">
+  <p:cSld>
+    <p:spTree>
+      <p:nvGrpSpPr>
+        <p:cNvPr id="1" name=""/>
+        <p:cNvGrpSpPr/>
+        <p:nvPr/>
+      </p:nvGrpSpPr>
+      <p:grpSpPr>
+        <a:xfrm>
+          <a:off x="0" y="0"/>
+          <a:ext cx="0" cy="0"/>
+          <a:chOff x="0" y="0"/>
+          <a:chExt cx="0" cy="0"/>
+        </a:xfrm>
+      </p:grpSpPr>
+      <p:sp>
+        <p:nvSpPr>
+          <p:cNvPr id="2" name="Titel 1"/>
+          <p:cNvSpPr>
+            <a:spLocks noGrp="1"/>
+          </p:cNvSpPr>
+          <p:nvPr>
+            <p:ph type="title"/>
+          </p:nvPr>
+        </p:nvSpPr>
+        <p:spPr/>
+        <p:txBody>
+          <a:bodyPr/>
+          <a:lstStyle/>
+          <a:p>
+            <a:r>
+              <a:rPr lang="de-CH" dirty="0" smtClean="0"/>
+              <a:t>Qualitätsziele</a:t>
+            </a:r>
+            <a:endParaRPr lang="de-CH" dirty="0"/>
+          </a:p>
+        </p:txBody>
+      </p:sp>
+      <p:sp>
+        <p:nvSpPr>
+          <p:cNvPr id="10" name="Rectangle 8"/>
+          <p:cNvSpPr>
+            <a:spLocks noChangeArrowheads="1"/>
+          </p:cNvSpPr>
+          <p:nvPr/>
+        </p:nvSpPr>
+        <p:spPr bwMode="auto">
+          <a:xfrm flipV="1">
+            <a:off x="907307" y="3886199"/>
+            <a:ext cx="22267990" cy="45719"/>
+          </a:xfrm>
+          <a:prstGeom prst="rect">
+            <a:avLst/>
+          </a:prstGeom>
+          <a:noFill/>
+          <a:ln>
+            <a:noFill/>
+          </a:ln>
+          <a:effectLst/>
+          <a:extLst>
+            <a:ext uri="{909E8E84-426E-40DD-AFC4-6F175D3DCCD1}">
+              <a14:hiddenFill xmlns:a14="http://schemas.microsoft.com/office/drawing/2010/main">
+                <a:solidFill>
+                  <a:schemeClr val="accent1"/>
+                </a:solidFill>
+              </a14:hiddenFill>
+            </a:ext>
+            <a:ext uri="{91240B29-F687-4F45-9708-019B960494DF}">
+              <a14:hiddenLine xmlns:a14="http://schemas.microsoft.com/office/drawing/2010/main" w="9525">
+                <a:solidFill>
+                  <a:schemeClr val="tx1"/>
+                </a:solidFill>
+                <a:miter lim="800000"/>
+                <a:headEnd/>
+                <a:tailEnd/>
+              </a14:hiddenLine>
+            </a:ext>
+            <a:ext uri="{AF507438-7753-43E0-B8FC-AC1667EBCBE1}">
+              <a14:hiddenEffects xmlns:a14="http://schemas.microsoft.com/office/drawing/2010/main">
+                <a:effectLst>
+                  <a:outerShdw dist="35921" dir="2700000" algn="ctr" rotWithShape="0">
+                    <a:schemeClr val="bg2"/>
+                  </a:outerShdw>
+                </a:effectLst>
+              </a14:hiddenEffects>
+            </a:ext>
+          </a:extLst>
+        </p:spPr>
+        <p:txBody>
+          <a:bodyPr vert="horz" wrap="square" lIns="91440" tIns="45720" rIns="91440" bIns="45720" numCol="1" anchor="ctr" anchorCtr="0" compatLnSpc="1">
+            <a:prstTxWarp prst="textNoShape">
+              <a:avLst/>
+            </a:prstTxWarp>
+            <a:spAutoFit/>
+          </a:bodyPr>
+          <a:lstStyle/>
+          <a:p>
+            <a:endParaRPr lang="de-CH"/>
+          </a:p>
+        </p:txBody>
+      </p:sp>
+      <p:graphicFrame>
+        <p:nvGraphicFramePr>
+          <p:cNvPr id="11" name="Objekt 10"/>
+          <p:cNvGraphicFramePr>
+            <a:graphicFrameLocks noChangeAspect="1"/>
+          </p:cNvGraphicFramePr>
+          <p:nvPr>
+            <p:extLst>
+              <p:ext uri="{D42A27DB-BD31-4B8C-83A1-F6EECF244321}">
+                <p14:modId xmlns:p14="http://schemas.microsoft.com/office/powerpoint/2010/main" val="2564298710"/>
+              </p:ext>
+            </p:extLst>
+          </p:nvPr>
+        </p:nvGraphicFramePr>
+        <p:xfrm>
+          <a:off x="1435534" y="1642212"/>
+          <a:ext cx="7825876" cy="4922728"/>
+        </p:xfrm>
+        <a:graphic>
+          <a:graphicData uri="http://schemas.openxmlformats.org/presentationml/2006/ole">
+            <mc:AlternateContent xmlns:mc="http://schemas.openxmlformats.org/markup-compatibility/2006">
+              <mc:Choice xmlns:v="urn:schemas-microsoft-com:vml" Requires="v">
+                <p:oleObj spid="_x0000_s1039" r:id="rId3" imgW="7715267" imgH="4810050" progId="Visio.Drawing.15">
+                  <p:embed/>
+                </p:oleObj>
+              </mc:Choice>
+              <mc:Fallback>
+                <p:oleObj r:id="rId3" imgW="7715267" imgH="4810050" progId="Visio.Drawing.15">
+                  <p:embed/>
+                  <p:pic>
+                    <p:nvPicPr>
+                      <p:cNvPr id="0" name="Object 7"/>
+                      <p:cNvPicPr>
+                        <a:picLocks noChangeAspect="1" noChangeArrowheads="1"/>
+                      </p:cNvPicPr>
+                      <p:nvPr/>
+                    </p:nvPicPr>
+                    <p:blipFill>
+                      <a:blip r:embed="rId4">
+                        <a:extLst>
+                          <a:ext uri="{28A0092B-C50C-407E-A947-70E740481C1C}">
+                            <a14:useLocalDpi xmlns:a14="http://schemas.microsoft.com/office/drawing/2010/main" val="0"/>
+                          </a:ext>
+                        </a:extLst>
+                      </a:blip>
+                      <a:srcRect/>
+                      <a:stretch>
+                        <a:fillRect/>
+                      </a:stretch>
+                    </p:blipFill>
+                    <p:spPr bwMode="auto">
+                      <a:xfrm>
+                        <a:off x="1435534" y="1642212"/>
+                        <a:ext cx="7825876" cy="4922728"/>
+                      </a:xfrm>
+                      <a:prstGeom prst="rect">
+                        <a:avLst/>
+                      </a:prstGeom>
+                      <a:solidFill>
+                        <a:schemeClr val="tx1"/>
+                      </a:solidFill>
+                    </p:spPr>
+                  </p:pic>
+                </p:oleObj>
+              </mc:Fallback>
+            </mc:AlternateContent>
+          </a:graphicData>
+        </a:graphic>
+      </p:graphicFrame>
+    </p:spTree>
+    <p:extLst>
+      <p:ext uri="{BB962C8B-B14F-4D97-AF65-F5344CB8AC3E}">
+        <p14:creationId xmlns:p14="http://schemas.microsoft.com/office/powerpoint/2010/main" val="755259514"/>
+      </p:ext>
+    </p:extLst>
+  </p:cSld>
+  <p:clrMapOvr>
+    <a:masterClrMapping/>
+  </p:clrMapOvr>
+  <p:timing>
+    <p:tnLst>
+      <p:par>
+        <p:cTn id="1" dur="indefinite" restart="never" nodeType="tmRoot"/>
+      </p:par>
+    </p:tnLst>
+  </p:timing>
+</p:sld>
+</file>
+
+<file path=ppt/slides/slide6.xml><?xml version="1.0" encoding="utf-8"?>
 <p:sld xmlns:a="http://schemas.openxmlformats.org/drawingml/2006/main" xmlns:r="http://schemas.openxmlformats.org/officeDocument/2006/relationships" xmlns:p="http://schemas.openxmlformats.org/presentationml/2006/main">
   <p:cSld>
     <p:spTree>
@@ -7676,85 +8456,6 @@
 </p:sld>
 </file>
 
-<file path=ppt/slides/slide6.xml><?xml version="1.0" encoding="utf-8"?>
-<p:sld xmlns:a="http://schemas.openxmlformats.org/drawingml/2006/main" xmlns:r="http://schemas.openxmlformats.org/officeDocument/2006/relationships" xmlns:p="http://schemas.openxmlformats.org/presentationml/2006/main">
-  <p:cSld>
-    <p:spTree>
-      <p:nvGrpSpPr>
-        <p:cNvPr id="1" name=""/>
-        <p:cNvGrpSpPr/>
-        <p:nvPr/>
-      </p:nvGrpSpPr>
-      <p:grpSpPr>
-        <a:xfrm>
-          <a:off x="0" y="0"/>
-          <a:ext cx="0" cy="0"/>
-          <a:chOff x="0" y="0"/>
-          <a:chExt cx="0" cy="0"/>
-        </a:xfrm>
-      </p:grpSpPr>
-      <p:sp>
-        <p:nvSpPr>
-          <p:cNvPr id="2" name="Titel 1"/>
-          <p:cNvSpPr>
-            <a:spLocks noGrp="1"/>
-          </p:cNvSpPr>
-          <p:nvPr>
-            <p:ph type="title"/>
-          </p:nvPr>
-        </p:nvSpPr>
-        <p:spPr/>
-        <p:txBody>
-          <a:bodyPr/>
-          <a:lstStyle/>
-          <a:p>
-            <a:r>
-              <a:rPr lang="de-CH" dirty="0" smtClean="0"/>
-              <a:t>Funktionale Tests</a:t>
-            </a:r>
-            <a:endParaRPr lang="de-CH" dirty="0"/>
-          </a:p>
-        </p:txBody>
-      </p:sp>
-      <p:sp>
-        <p:nvSpPr>
-          <p:cNvPr id="3" name="Inhaltsplatzhalter 2"/>
-          <p:cNvSpPr>
-            <a:spLocks noGrp="1"/>
-          </p:cNvSpPr>
-          <p:nvPr>
-            <p:ph idx="1"/>
-          </p:nvPr>
-        </p:nvSpPr>
-        <p:spPr/>
-        <p:txBody>
-          <a:bodyPr/>
-          <a:lstStyle/>
-          <a:p>
-            <a:endParaRPr lang="de-CH" dirty="0"/>
-          </a:p>
-        </p:txBody>
-      </p:sp>
-    </p:spTree>
-    <p:extLst>
-      <p:ext uri="{BB962C8B-B14F-4D97-AF65-F5344CB8AC3E}">
-        <p14:creationId xmlns:p14="http://schemas.microsoft.com/office/powerpoint/2010/main" val="3285288541"/>
-      </p:ext>
-    </p:extLst>
-  </p:cSld>
-  <p:clrMapOvr>
-    <a:masterClrMapping/>
-  </p:clrMapOvr>
-  <p:timing>
-    <p:tnLst>
-      <p:par>
-        <p:cTn id="1" dur="indefinite" restart="never" nodeType="tmRoot"/>
-      </p:par>
-    </p:tnLst>
-  </p:timing>
-</p:sld>
-</file>
-
 <file path=ppt/slides/slide7.xml><?xml version="1.0" encoding="utf-8"?>
 <p:sld xmlns:a="http://schemas.openxmlformats.org/drawingml/2006/main" xmlns:r="http://schemas.openxmlformats.org/officeDocument/2006/relationships" xmlns:p="http://schemas.openxmlformats.org/presentationml/2006/main">
   <p:cSld>
@@ -7788,65 +8489,57 @@
           <a:lstStyle/>
           <a:p>
             <a:r>
-              <a:rPr lang="de-CH" dirty="0" err="1" smtClean="0"/>
-              <a:t>Junit</a:t>
-            </a:r>
-            <a:r>
               <a:rPr lang="de-CH" dirty="0" smtClean="0"/>
-              <a:t> Tests</a:t>
+              <a:t>Architektur &amp; Lösung</a:t>
             </a:r>
             <a:endParaRPr lang="de-CH" dirty="0"/>
           </a:p>
         </p:txBody>
       </p:sp>
-      <p:sp>
-        <p:nvSpPr>
-          <p:cNvPr id="3" name="Inhaltsplatzhalter 2"/>
-          <p:cNvSpPr>
-            <a:spLocks noGrp="1"/>
-          </p:cNvSpPr>
-          <p:nvPr>
-            <p:ph idx="1"/>
-          </p:nvPr>
-        </p:nvSpPr>
-        <p:spPr/>
-        <p:txBody>
-          <a:bodyPr/>
-          <a:lstStyle/>
-          <a:p>
-            <a:r>
-              <a:rPr lang="de-CH" dirty="0" smtClean="0"/>
-              <a:t>Test </a:t>
-            </a:r>
-            <a:r>
-              <a:rPr lang="de-CH" dirty="0" err="1" smtClean="0"/>
-              <a:t>Driven</a:t>
-            </a:r>
-            <a:r>
-              <a:rPr lang="de-CH" dirty="0" smtClean="0"/>
-              <a:t> Development</a:t>
-            </a:r>
-          </a:p>
-          <a:p>
-            <a:endParaRPr lang="de-CH" dirty="0"/>
-          </a:p>
-          <a:p>
-            <a:r>
-              <a:rPr lang="de-CH" dirty="0" err="1" smtClean="0"/>
-              <a:t>Persister</a:t>
-            </a:r>
-            <a:r>
-              <a:rPr lang="de-CH" dirty="0" smtClean="0"/>
-              <a:t> / Client</a:t>
-            </a:r>
-            <a:endParaRPr lang="de-CH" dirty="0"/>
-          </a:p>
-        </p:txBody>
-      </p:sp>
+      <p:pic>
+        <p:nvPicPr>
+          <p:cNvPr id="6" name="Grafik 5"/>
+          <p:cNvPicPr>
+            <a:picLocks noChangeAspect="1"/>
+          </p:cNvPicPr>
+          <p:nvPr/>
+        </p:nvPicPr>
+        <p:blipFill>
+          <a:blip r:embed="rId2"/>
+          <a:stretch>
+            <a:fillRect/>
+          </a:stretch>
+        </p:blipFill>
+        <p:spPr>
+          <a:xfrm>
+            <a:off x="759123" y="1338229"/>
+            <a:ext cx="9605326" cy="5252351"/>
+          </a:xfrm>
+          <a:prstGeom prst="round2DiagRect">
+            <a:avLst>
+              <a:gd name="adj1" fmla="val 16667"/>
+              <a:gd name="adj2" fmla="val 0"/>
+            </a:avLst>
+          </a:prstGeom>
+          <a:ln w="88900" cap="sq">
+            <a:solidFill>
+              <a:srgbClr val="FFFFFF"/>
+            </a:solidFill>
+            <a:miter lim="800000"/>
+          </a:ln>
+          <a:effectLst>
+            <a:outerShdw blurRad="254000" algn="tl" rotWithShape="0">
+              <a:srgbClr val="000000">
+                <a:alpha val="43000"/>
+              </a:srgbClr>
+            </a:outerShdw>
+          </a:effectLst>
+        </p:spPr>
+      </p:pic>
     </p:spTree>
     <p:extLst>
       <p:ext uri="{BB962C8B-B14F-4D97-AF65-F5344CB8AC3E}">
-        <p14:creationId xmlns:p14="http://schemas.microsoft.com/office/powerpoint/2010/main" val="4174650671"/>
+        <p14:creationId xmlns:p14="http://schemas.microsoft.com/office/powerpoint/2010/main" val="1766252366"/>
       </p:ext>
     </p:extLst>
   </p:cSld>
@@ -7897,7 +8590,7 @@
           <a:p>
             <a:r>
               <a:rPr lang="de-CH" dirty="0" smtClean="0"/>
-              <a:t>Komplikationen</a:t>
+              <a:t>Laufzeit-Sicht</a:t>
             </a:r>
             <a:endParaRPr lang="de-CH" dirty="0"/>
           </a:p>
@@ -7905,54 +8598,138 @@
       </p:sp>
       <p:sp>
         <p:nvSpPr>
-          <p:cNvPr id="3" name="Inhaltsplatzhalter 2"/>
-          <p:cNvSpPr>
-            <a:spLocks noGrp="1"/>
-          </p:cNvSpPr>
-          <p:nvPr>
-            <p:ph idx="1"/>
-          </p:nvPr>
-        </p:nvSpPr>
-        <p:spPr/>
-        <p:txBody>
-          <a:bodyPr/>
-          <a:lstStyle/>
-          <a:p>
-            <a:r>
-              <a:rPr lang="de-CH" dirty="0" smtClean="0"/>
-              <a:t>Austritt des Projektleiters</a:t>
-            </a:r>
-          </a:p>
-          <a:p>
-            <a:endParaRPr lang="de-CH" dirty="0" smtClean="0"/>
-          </a:p>
-          <a:p>
-            <a:r>
-              <a:rPr lang="de-CH" dirty="0" err="1" smtClean="0"/>
-              <a:t>TomCat</a:t>
-            </a:r>
-            <a:r>
-              <a:rPr lang="de-CH" dirty="0" smtClean="0"/>
-              <a:t> Installation</a:t>
-            </a:r>
-            <a:endParaRPr lang="de-CH" dirty="0"/>
-          </a:p>
-          <a:p>
-            <a:endParaRPr lang="de-CH" dirty="0"/>
-          </a:p>
-          <a:p>
-            <a:r>
-              <a:rPr lang="de-CH" dirty="0" err="1" smtClean="0"/>
-              <a:t>Deployment</a:t>
-            </a:r>
-            <a:endParaRPr lang="de-CH" dirty="0" smtClean="0"/>
-          </a:p>
-        </p:txBody>
-      </p:sp>
+          <p:cNvPr id="6" name="Rectangle 4"/>
+          <p:cNvSpPr>
+            <a:spLocks noChangeArrowheads="1"/>
+          </p:cNvSpPr>
+          <p:nvPr/>
+        </p:nvSpPr>
+        <p:spPr bwMode="auto">
+          <a:xfrm>
+            <a:off x="646110" y="3200400"/>
+            <a:ext cx="16580939" cy="0"/>
+          </a:xfrm>
+          <a:prstGeom prst="rect">
+            <a:avLst/>
+          </a:prstGeom>
+          <a:noFill/>
+          <a:ln>
+            <a:noFill/>
+          </a:ln>
+          <a:effectLst/>
+          <a:extLst>
+            <a:ext uri="{909E8E84-426E-40DD-AFC4-6F175D3DCCD1}">
+              <a14:hiddenFill xmlns:a14="http://schemas.microsoft.com/office/drawing/2010/main">
+                <a:solidFill>
+                  <a:schemeClr val="accent1"/>
+                </a:solidFill>
+              </a14:hiddenFill>
+            </a:ext>
+            <a:ext uri="{91240B29-F687-4F45-9708-019B960494DF}">
+              <a14:hiddenLine xmlns:a14="http://schemas.microsoft.com/office/drawing/2010/main" w="9525">
+                <a:solidFill>
+                  <a:schemeClr val="tx1"/>
+                </a:solidFill>
+                <a:miter lim="800000"/>
+                <a:headEnd/>
+                <a:tailEnd/>
+              </a14:hiddenLine>
+            </a:ext>
+            <a:ext uri="{AF507438-7753-43E0-B8FC-AC1667EBCBE1}">
+              <a14:hiddenEffects xmlns:a14="http://schemas.microsoft.com/office/drawing/2010/main">
+                <a:effectLst>
+                  <a:outerShdw dist="35921" dir="2700000" algn="ctr" rotWithShape="0">
+                    <a:schemeClr val="bg2"/>
+                  </a:outerShdw>
+                </a:effectLst>
+              </a14:hiddenEffects>
+            </a:ext>
+          </a:extLst>
+        </p:spPr>
+        <p:txBody>
+          <a:bodyPr vert="horz" wrap="square" lIns="91440" tIns="45720" rIns="91440" bIns="45720" numCol="1" anchor="ctr" anchorCtr="0" compatLnSpc="1">
+            <a:prstTxWarp prst="textNoShape">
+              <a:avLst/>
+            </a:prstTxWarp>
+            <a:spAutoFit/>
+          </a:bodyPr>
+          <a:lstStyle/>
+          <a:p>
+            <a:endParaRPr lang="de-CH"/>
+          </a:p>
+        </p:txBody>
+      </p:sp>
+      <p:graphicFrame>
+        <p:nvGraphicFramePr>
+          <p:cNvPr id="7" name="Objekt 6"/>
+          <p:cNvGraphicFramePr>
+            <a:graphicFrameLocks noChangeAspect="1"/>
+          </p:cNvGraphicFramePr>
+          <p:nvPr>
+            <p:extLst>
+              <p:ext uri="{D42A27DB-BD31-4B8C-83A1-F6EECF244321}">
+                <p14:modId xmlns:p14="http://schemas.microsoft.com/office/powerpoint/2010/main" val="1713720256"/>
+              </p:ext>
+            </p:extLst>
+          </p:nvPr>
+        </p:nvGraphicFramePr>
+        <p:xfrm>
+          <a:off x="898821" y="1595671"/>
+          <a:ext cx="8899301" cy="4974282"/>
+        </p:xfrm>
+        <a:graphic>
+          <a:graphicData uri="http://schemas.openxmlformats.org/presentationml/2006/ole">
+            <mc:AlternateContent xmlns:mc="http://schemas.openxmlformats.org/markup-compatibility/2006">
+              <mc:Choice xmlns:v="urn:schemas-microsoft-com:vml" Requires="v">
+                <p:oleObj spid="_x0000_s2058" r:id="rId3" imgW="12788744" imgH="7785285" progId="Visio.Drawing.15">
+                  <p:embed/>
+                </p:oleObj>
+              </mc:Choice>
+              <mc:Fallback>
+                <p:oleObj r:id="rId3" imgW="12788744" imgH="7785285" progId="Visio.Drawing.15">
+                  <p:embed/>
+                  <p:pic>
+                    <p:nvPicPr>
+                      <p:cNvPr id="0" name="Object 3"/>
+                      <p:cNvPicPr>
+                        <a:picLocks noChangeAspect="1" noChangeArrowheads="1"/>
+                      </p:cNvPicPr>
+                      <p:nvPr/>
+                    </p:nvPicPr>
+                    <p:blipFill>
+                      <a:blip r:embed="rId4">
+                        <a:extLst>
+                          <a:ext uri="{28A0092B-C50C-407E-A947-70E740481C1C}">
+                            <a14:useLocalDpi xmlns:a14="http://schemas.microsoft.com/office/drawing/2010/main" val="0"/>
+                          </a:ext>
+                        </a:extLst>
+                      </a:blip>
+                      <a:srcRect/>
+                      <a:stretch>
+                        <a:fillRect/>
+                      </a:stretch>
+                    </p:blipFill>
+                    <p:spPr bwMode="auto">
+                      <a:xfrm>
+                        <a:off x="898821" y="1595671"/>
+                        <a:ext cx="8899301" cy="4974282"/>
+                      </a:xfrm>
+                      <a:prstGeom prst="rect">
+                        <a:avLst/>
+                      </a:prstGeom>
+                      <a:noFill/>
+                    </p:spPr>
+                  </p:pic>
+                </p:oleObj>
+              </mc:Fallback>
+            </mc:AlternateContent>
+          </a:graphicData>
+        </a:graphic>
+      </p:graphicFrame>
     </p:spTree>
     <p:extLst>
       <p:ext uri="{BB962C8B-B14F-4D97-AF65-F5344CB8AC3E}">
-        <p14:creationId xmlns:p14="http://schemas.microsoft.com/office/powerpoint/2010/main" val="447635669"/>
+        <p14:creationId xmlns:p14="http://schemas.microsoft.com/office/powerpoint/2010/main" val="3481766385"/>
       </p:ext>
     </p:extLst>
   </p:cSld>
@@ -8002,44 +8779,95 @@
           <a:lstStyle/>
           <a:p>
             <a:r>
+              <a:rPr lang="de-CH" dirty="0" smtClean="0"/>
+              <a:t>Design</a:t>
+            </a:r>
+            <a:br>
+              <a:rPr lang="de-CH" dirty="0" smtClean="0"/>
+            </a:br>
+            <a:endParaRPr lang="de-CH" dirty="0"/>
+          </a:p>
+        </p:txBody>
+      </p:sp>
+      <p:sp>
+        <p:nvSpPr>
+          <p:cNvPr id="3" name="Inhaltsplatzhalter 2"/>
+          <p:cNvSpPr>
+            <a:spLocks noGrp="1"/>
+          </p:cNvSpPr>
+          <p:nvPr>
+            <p:ph idx="1"/>
+          </p:nvPr>
+        </p:nvSpPr>
+        <p:spPr/>
+        <p:txBody>
+          <a:bodyPr/>
+          <a:lstStyle/>
+          <a:p>
+            <a:r>
               <a:rPr lang="de-CH" dirty="0" err="1" smtClean="0"/>
-              <a:t>Lessons</a:t>
-            </a:r>
+              <a:t>Moqup</a:t>
+            </a:r>
+            <a:endParaRPr lang="de-CH" dirty="0" smtClean="0"/>
+          </a:p>
+          <a:p>
+            <a:r>
+              <a:rPr lang="de-CH" dirty="0" err="1" smtClean="0"/>
+              <a:t>Scenebuilder</a:t>
+            </a:r>
+            <a:endParaRPr lang="de-CH" dirty="0" smtClean="0"/>
+          </a:p>
+          <a:p>
             <a:r>
               <a:rPr lang="de-CH" dirty="0" smtClean="0"/>
-              <a:t> </a:t>
-            </a:r>
-            <a:r>
-              <a:rPr lang="de-CH" dirty="0" err="1" smtClean="0"/>
-              <a:t>Learned</a:t>
-            </a:r>
+              <a:t>3 View-Schicht</a:t>
+            </a:r>
+          </a:p>
+          <a:p>
+            <a:r>
+              <a:rPr lang="de-CH" dirty="0" smtClean="0"/>
+              <a:t>Designentscheide</a:t>
+            </a:r>
+          </a:p>
+          <a:p>
             <a:endParaRPr lang="de-CH" dirty="0"/>
           </a:p>
         </p:txBody>
       </p:sp>
-      <p:sp>
-        <p:nvSpPr>
-          <p:cNvPr id="3" name="Inhaltsplatzhalter 2"/>
-          <p:cNvSpPr>
-            <a:spLocks noGrp="1"/>
-          </p:cNvSpPr>
-          <p:nvPr>
-            <p:ph idx="1"/>
-          </p:nvPr>
-        </p:nvSpPr>
-        <p:spPr/>
-        <p:txBody>
-          <a:bodyPr/>
-          <a:lstStyle/>
-          <a:p>
-            <a:endParaRPr lang="de-CH" dirty="0"/>
-          </a:p>
-        </p:txBody>
-      </p:sp>
+      <p:pic>
+        <p:nvPicPr>
+          <p:cNvPr id="4" name="Grafik 3"/>
+          <p:cNvPicPr>
+            <a:picLocks noChangeAspect="1"/>
+          </p:cNvPicPr>
+          <p:nvPr/>
+        </p:nvPicPr>
+        <p:blipFill>
+          <a:blip r:embed="rId2">
+            <a:extLst>
+              <a:ext uri="{28A0092B-C50C-407E-A947-70E740481C1C}">
+                <a14:useLocalDpi xmlns:a14="http://schemas.microsoft.com/office/drawing/2010/main" val="0"/>
+              </a:ext>
+            </a:extLst>
+          </a:blip>
+          <a:stretch>
+            <a:fillRect/>
+          </a:stretch>
+        </p:blipFill>
+        <p:spPr>
+          <a:xfrm>
+            <a:off x="3978591" y="1269197"/>
+            <a:ext cx="7325747" cy="5401429"/>
+          </a:xfrm>
+          <a:prstGeom prst="rect">
+            <a:avLst/>
+          </a:prstGeom>
+        </p:spPr>
+      </p:pic>
     </p:spTree>
     <p:extLst>
       <p:ext uri="{BB962C8B-B14F-4D97-AF65-F5344CB8AC3E}">
-        <p14:creationId xmlns:p14="http://schemas.microsoft.com/office/powerpoint/2010/main" val="256452221"/>
+        <p14:creationId xmlns:p14="http://schemas.microsoft.com/office/powerpoint/2010/main" val="507733203"/>
       </p:ext>
     </p:extLst>
   </p:cSld>

</xml_diff>

<commit_message>
Updated my part in presentation
</commit_message>
<xml_diff>
--- a/06_Praesentation/Praesentation_Mangel_Manager.pptx
+++ b/06_Praesentation/Praesentation_Mangel_Manager.pptx
@@ -4,6 +4,9 @@
   <p:sldMasterIdLst>
     <p:sldMasterId id="2147483789" r:id="rId1"/>
   </p:sldMasterIdLst>
+  <p:notesMasterIdLst>
+    <p:notesMasterId r:id="rId21"/>
+  </p:notesMasterIdLst>
   <p:sldIdLst>
     <p:sldId id="256" r:id="rId2"/>
     <p:sldId id="276" r:id="rId3"/>
@@ -128,6 +131,556 @@
     </p:ext>
   </p:extLst>
 </p:presentation>
+</file>
+
+<file path=ppt/notesMasters/notesMaster1.xml><?xml version="1.0" encoding="utf-8"?>
+<p:notesMaster xmlns:a="http://schemas.openxmlformats.org/drawingml/2006/main" xmlns:r="http://schemas.openxmlformats.org/officeDocument/2006/relationships" xmlns:p="http://schemas.openxmlformats.org/presentationml/2006/main">
+  <p:cSld>
+    <p:bg>
+      <p:bgRef idx="1001">
+        <a:schemeClr val="bg1"/>
+      </p:bgRef>
+    </p:bg>
+    <p:spTree>
+      <p:nvGrpSpPr>
+        <p:cNvPr id="1" name=""/>
+        <p:cNvGrpSpPr/>
+        <p:nvPr/>
+      </p:nvGrpSpPr>
+      <p:grpSpPr>
+        <a:xfrm>
+          <a:off x="0" y="0"/>
+          <a:ext cx="0" cy="0"/>
+          <a:chOff x="0" y="0"/>
+          <a:chExt cx="0" cy="0"/>
+        </a:xfrm>
+      </p:grpSpPr>
+      <p:sp>
+        <p:nvSpPr>
+          <p:cNvPr id="2" name="Kopfzeilenplatzhalter 1"/>
+          <p:cNvSpPr>
+            <a:spLocks noGrp="1"/>
+          </p:cNvSpPr>
+          <p:nvPr>
+            <p:ph type="hdr" sz="quarter"/>
+          </p:nvPr>
+        </p:nvSpPr>
+        <p:spPr>
+          <a:xfrm>
+            <a:off x="0" y="0"/>
+            <a:ext cx="2971800" cy="458788"/>
+          </a:xfrm>
+          <a:prstGeom prst="rect">
+            <a:avLst/>
+          </a:prstGeom>
+        </p:spPr>
+        <p:txBody>
+          <a:bodyPr vert="horz" lIns="91440" tIns="45720" rIns="91440" bIns="45720" rtlCol="0"/>
+          <a:lstStyle>
+            <a:lvl1pPr algn="l">
+              <a:defRPr sz="1200"/>
+            </a:lvl1pPr>
+          </a:lstStyle>
+          <a:p>
+            <a:endParaRPr lang="de-CH"/>
+          </a:p>
+        </p:txBody>
+      </p:sp>
+      <p:sp>
+        <p:nvSpPr>
+          <p:cNvPr id="3" name="Datumsplatzhalter 2"/>
+          <p:cNvSpPr>
+            <a:spLocks noGrp="1"/>
+          </p:cNvSpPr>
+          <p:nvPr>
+            <p:ph type="dt" idx="1"/>
+          </p:nvPr>
+        </p:nvSpPr>
+        <p:spPr>
+          <a:xfrm>
+            <a:off x="3884613" y="0"/>
+            <a:ext cx="2971800" cy="458788"/>
+          </a:xfrm>
+          <a:prstGeom prst="rect">
+            <a:avLst/>
+          </a:prstGeom>
+        </p:spPr>
+        <p:txBody>
+          <a:bodyPr vert="horz" lIns="91440" tIns="45720" rIns="91440" bIns="45720" rtlCol="0"/>
+          <a:lstStyle>
+            <a:lvl1pPr algn="r">
+              <a:defRPr sz="1200"/>
+            </a:lvl1pPr>
+          </a:lstStyle>
+          <a:p>
+            <a:fld id="{EFC77FAB-06E9-4254-8251-ADEC26580441}" type="datetimeFigureOut">
+              <a:rPr lang="de-CH" smtClean="0"/>
+              <a:t>20.05.2015</a:t>
+            </a:fld>
+            <a:endParaRPr lang="de-CH"/>
+          </a:p>
+        </p:txBody>
+      </p:sp>
+      <p:sp>
+        <p:nvSpPr>
+          <p:cNvPr id="4" name="Folienbildplatzhalter 3"/>
+          <p:cNvSpPr>
+            <a:spLocks noGrp="1" noRot="1" noChangeAspect="1"/>
+          </p:cNvSpPr>
+          <p:nvPr>
+            <p:ph type="sldImg" idx="2"/>
+          </p:nvPr>
+        </p:nvSpPr>
+        <p:spPr>
+          <a:xfrm>
+            <a:off x="685800" y="1143000"/>
+            <a:ext cx="5486400" cy="3086100"/>
+          </a:xfrm>
+          <a:prstGeom prst="rect">
+            <a:avLst/>
+          </a:prstGeom>
+          <a:noFill/>
+          <a:ln w="12700">
+            <a:solidFill>
+              <a:prstClr val="black"/>
+            </a:solidFill>
+          </a:ln>
+        </p:spPr>
+        <p:txBody>
+          <a:bodyPr vert="horz" lIns="91440" tIns="45720" rIns="91440" bIns="45720" rtlCol="0" anchor="ctr"/>
+          <a:lstStyle/>
+          <a:p>
+            <a:endParaRPr lang="de-CH"/>
+          </a:p>
+        </p:txBody>
+      </p:sp>
+      <p:sp>
+        <p:nvSpPr>
+          <p:cNvPr id="5" name="Notizenplatzhalter 4"/>
+          <p:cNvSpPr>
+            <a:spLocks noGrp="1"/>
+          </p:cNvSpPr>
+          <p:nvPr>
+            <p:ph type="body" sz="quarter" idx="3"/>
+          </p:nvPr>
+        </p:nvSpPr>
+        <p:spPr>
+          <a:xfrm>
+            <a:off x="685800" y="4400550"/>
+            <a:ext cx="5486400" cy="3600450"/>
+          </a:xfrm>
+          <a:prstGeom prst="rect">
+            <a:avLst/>
+          </a:prstGeom>
+        </p:spPr>
+        <p:txBody>
+          <a:bodyPr vert="horz" lIns="91440" tIns="45720" rIns="91440" bIns="45720" rtlCol="0"/>
+          <a:lstStyle/>
+          <a:p>
+            <a:pPr lvl="0"/>
+            <a:r>
+              <a:rPr lang="de-DE" smtClean="0"/>
+              <a:t>Textmasterformat bearbeiten</a:t>
+            </a:r>
+          </a:p>
+          <a:p>
+            <a:pPr lvl="1"/>
+            <a:r>
+              <a:rPr lang="de-DE" smtClean="0"/>
+              <a:t>Zweite Ebene</a:t>
+            </a:r>
+          </a:p>
+          <a:p>
+            <a:pPr lvl="2"/>
+            <a:r>
+              <a:rPr lang="de-DE" smtClean="0"/>
+              <a:t>Dritte Ebene</a:t>
+            </a:r>
+          </a:p>
+          <a:p>
+            <a:pPr lvl="3"/>
+            <a:r>
+              <a:rPr lang="de-DE" smtClean="0"/>
+              <a:t>Vierte Ebene</a:t>
+            </a:r>
+          </a:p>
+          <a:p>
+            <a:pPr lvl="4"/>
+            <a:r>
+              <a:rPr lang="de-DE" smtClean="0"/>
+              <a:t>Fünfte Ebene</a:t>
+            </a:r>
+            <a:endParaRPr lang="de-CH"/>
+          </a:p>
+        </p:txBody>
+      </p:sp>
+      <p:sp>
+        <p:nvSpPr>
+          <p:cNvPr id="6" name="Fußzeilenplatzhalter 5"/>
+          <p:cNvSpPr>
+            <a:spLocks noGrp="1"/>
+          </p:cNvSpPr>
+          <p:nvPr>
+            <p:ph type="ftr" sz="quarter" idx="4"/>
+          </p:nvPr>
+        </p:nvSpPr>
+        <p:spPr>
+          <a:xfrm>
+            <a:off x="0" y="8685213"/>
+            <a:ext cx="2971800" cy="458787"/>
+          </a:xfrm>
+          <a:prstGeom prst="rect">
+            <a:avLst/>
+          </a:prstGeom>
+        </p:spPr>
+        <p:txBody>
+          <a:bodyPr vert="horz" lIns="91440" tIns="45720" rIns="91440" bIns="45720" rtlCol="0" anchor="b"/>
+          <a:lstStyle>
+            <a:lvl1pPr algn="l">
+              <a:defRPr sz="1200"/>
+            </a:lvl1pPr>
+          </a:lstStyle>
+          <a:p>
+            <a:endParaRPr lang="de-CH"/>
+          </a:p>
+        </p:txBody>
+      </p:sp>
+      <p:sp>
+        <p:nvSpPr>
+          <p:cNvPr id="7" name="Foliennummernplatzhalter 6"/>
+          <p:cNvSpPr>
+            <a:spLocks noGrp="1"/>
+          </p:cNvSpPr>
+          <p:nvPr>
+            <p:ph type="sldNum" sz="quarter" idx="5"/>
+          </p:nvPr>
+        </p:nvSpPr>
+        <p:spPr>
+          <a:xfrm>
+            <a:off x="3884613" y="8685213"/>
+            <a:ext cx="2971800" cy="458787"/>
+          </a:xfrm>
+          <a:prstGeom prst="rect">
+            <a:avLst/>
+          </a:prstGeom>
+        </p:spPr>
+        <p:txBody>
+          <a:bodyPr vert="horz" lIns="91440" tIns="45720" rIns="91440" bIns="45720" rtlCol="0" anchor="b"/>
+          <a:lstStyle>
+            <a:lvl1pPr algn="r">
+              <a:defRPr sz="1200"/>
+            </a:lvl1pPr>
+          </a:lstStyle>
+          <a:p>
+            <a:fld id="{50EF5B9A-1C2F-4BD4-8982-7B41D9614058}" type="slidenum">
+              <a:rPr lang="de-CH" smtClean="0"/>
+              <a:t>‹Nr.›</a:t>
+            </a:fld>
+            <a:endParaRPr lang="de-CH"/>
+          </a:p>
+        </p:txBody>
+      </p:sp>
+    </p:spTree>
+    <p:extLst>
+      <p:ext uri="{BB962C8B-B14F-4D97-AF65-F5344CB8AC3E}">
+        <p14:creationId xmlns:p14="http://schemas.microsoft.com/office/powerpoint/2010/main" val="893150527"/>
+      </p:ext>
+    </p:extLst>
+  </p:cSld>
+  <p:clrMap bg1="lt1" tx1="dk1" bg2="lt2" tx2="dk2" accent1="accent1" accent2="accent2" accent3="accent3" accent4="accent4" accent5="accent5" accent6="accent6" hlink="hlink" folHlink="folHlink"/>
+  <p:notesStyle>
+    <a:lvl1pPr marL="0" algn="l" defTabSz="914400" rtl="0" eaLnBrk="1" latinLnBrk="0" hangingPunct="1">
+      <a:defRPr sz="1200" kern="1200">
+        <a:solidFill>
+          <a:schemeClr val="tx1"/>
+        </a:solidFill>
+        <a:latin typeface="+mn-lt"/>
+        <a:ea typeface="+mn-ea"/>
+        <a:cs typeface="+mn-cs"/>
+      </a:defRPr>
+    </a:lvl1pPr>
+    <a:lvl2pPr marL="457200" algn="l" defTabSz="914400" rtl="0" eaLnBrk="1" latinLnBrk="0" hangingPunct="1">
+      <a:defRPr sz="1200" kern="1200">
+        <a:solidFill>
+          <a:schemeClr val="tx1"/>
+        </a:solidFill>
+        <a:latin typeface="+mn-lt"/>
+        <a:ea typeface="+mn-ea"/>
+        <a:cs typeface="+mn-cs"/>
+      </a:defRPr>
+    </a:lvl2pPr>
+    <a:lvl3pPr marL="914400" algn="l" defTabSz="914400" rtl="0" eaLnBrk="1" latinLnBrk="0" hangingPunct="1">
+      <a:defRPr sz="1200" kern="1200">
+        <a:solidFill>
+          <a:schemeClr val="tx1"/>
+        </a:solidFill>
+        <a:latin typeface="+mn-lt"/>
+        <a:ea typeface="+mn-ea"/>
+        <a:cs typeface="+mn-cs"/>
+      </a:defRPr>
+    </a:lvl3pPr>
+    <a:lvl4pPr marL="1371600" algn="l" defTabSz="914400" rtl="0" eaLnBrk="1" latinLnBrk="0" hangingPunct="1">
+      <a:defRPr sz="1200" kern="1200">
+        <a:solidFill>
+          <a:schemeClr val="tx1"/>
+        </a:solidFill>
+        <a:latin typeface="+mn-lt"/>
+        <a:ea typeface="+mn-ea"/>
+        <a:cs typeface="+mn-cs"/>
+      </a:defRPr>
+    </a:lvl4pPr>
+    <a:lvl5pPr marL="1828800" algn="l" defTabSz="914400" rtl="0" eaLnBrk="1" latinLnBrk="0" hangingPunct="1">
+      <a:defRPr sz="1200" kern="1200">
+        <a:solidFill>
+          <a:schemeClr val="tx1"/>
+        </a:solidFill>
+        <a:latin typeface="+mn-lt"/>
+        <a:ea typeface="+mn-ea"/>
+        <a:cs typeface="+mn-cs"/>
+      </a:defRPr>
+    </a:lvl5pPr>
+    <a:lvl6pPr marL="2286000" algn="l" defTabSz="914400" rtl="0" eaLnBrk="1" latinLnBrk="0" hangingPunct="1">
+      <a:defRPr sz="1200" kern="1200">
+        <a:solidFill>
+          <a:schemeClr val="tx1"/>
+        </a:solidFill>
+        <a:latin typeface="+mn-lt"/>
+        <a:ea typeface="+mn-ea"/>
+        <a:cs typeface="+mn-cs"/>
+      </a:defRPr>
+    </a:lvl6pPr>
+    <a:lvl7pPr marL="2743200" algn="l" defTabSz="914400" rtl="0" eaLnBrk="1" latinLnBrk="0" hangingPunct="1">
+      <a:defRPr sz="1200" kern="1200">
+        <a:solidFill>
+          <a:schemeClr val="tx1"/>
+        </a:solidFill>
+        <a:latin typeface="+mn-lt"/>
+        <a:ea typeface="+mn-ea"/>
+        <a:cs typeface="+mn-cs"/>
+      </a:defRPr>
+    </a:lvl7pPr>
+    <a:lvl8pPr marL="3200400" algn="l" defTabSz="914400" rtl="0" eaLnBrk="1" latinLnBrk="0" hangingPunct="1">
+      <a:defRPr sz="1200" kern="1200">
+        <a:solidFill>
+          <a:schemeClr val="tx1"/>
+        </a:solidFill>
+        <a:latin typeface="+mn-lt"/>
+        <a:ea typeface="+mn-ea"/>
+        <a:cs typeface="+mn-cs"/>
+      </a:defRPr>
+    </a:lvl8pPr>
+    <a:lvl9pPr marL="3657600" algn="l" defTabSz="914400" rtl="0" eaLnBrk="1" latinLnBrk="0" hangingPunct="1">
+      <a:defRPr sz="1200" kern="1200">
+        <a:solidFill>
+          <a:schemeClr val="tx1"/>
+        </a:solidFill>
+        <a:latin typeface="+mn-lt"/>
+        <a:ea typeface="+mn-ea"/>
+        <a:cs typeface="+mn-cs"/>
+      </a:defRPr>
+    </a:lvl9pPr>
+  </p:notesStyle>
+</p:notesMaster>
+</file>
+
+<file path=ppt/notesSlides/notesSlide1.xml><?xml version="1.0" encoding="utf-8"?>
+<p:notes xmlns:a="http://schemas.openxmlformats.org/drawingml/2006/main" xmlns:r="http://schemas.openxmlformats.org/officeDocument/2006/relationships" xmlns:p="http://schemas.openxmlformats.org/presentationml/2006/main">
+  <p:cSld>
+    <p:spTree>
+      <p:nvGrpSpPr>
+        <p:cNvPr id="1" name=""/>
+        <p:cNvGrpSpPr/>
+        <p:nvPr/>
+      </p:nvGrpSpPr>
+      <p:grpSpPr>
+        <a:xfrm>
+          <a:off x="0" y="0"/>
+          <a:ext cx="0" cy="0"/>
+          <a:chOff x="0" y="0"/>
+          <a:chExt cx="0" cy="0"/>
+        </a:xfrm>
+      </p:grpSpPr>
+      <p:sp>
+        <p:nvSpPr>
+          <p:cNvPr id="2" name="Folienbildplatzhalter 1"/>
+          <p:cNvSpPr>
+            <a:spLocks noGrp="1" noRot="1" noChangeAspect="1"/>
+          </p:cNvSpPr>
+          <p:nvPr>
+            <p:ph type="sldImg"/>
+          </p:nvPr>
+        </p:nvSpPr>
+        <p:spPr/>
+      </p:sp>
+      <p:sp>
+        <p:nvSpPr>
+          <p:cNvPr id="3" name="Notizenplatzhalter 2"/>
+          <p:cNvSpPr>
+            <a:spLocks noGrp="1"/>
+          </p:cNvSpPr>
+          <p:nvPr>
+            <p:ph type="body" idx="1"/>
+          </p:nvPr>
+        </p:nvSpPr>
+        <p:spPr/>
+        <p:txBody>
+          <a:bodyPr/>
+          <a:lstStyle/>
+          <a:p>
+            <a:r>
+              <a:rPr lang="de-CH" dirty="0" smtClean="0"/>
+              <a:t>Für unsere</a:t>
+            </a:r>
+            <a:r>
+              <a:rPr lang="de-CH" baseline="0" dirty="0" smtClean="0"/>
+              <a:t> </a:t>
+            </a:r>
+            <a:r>
+              <a:rPr lang="de-CH" baseline="0" dirty="0" err="1" smtClean="0"/>
+              <a:t>MangelManager</a:t>
+            </a:r>
+            <a:r>
+              <a:rPr lang="de-CH" baseline="0" dirty="0" smtClean="0"/>
+              <a:t> Software </a:t>
+            </a:r>
+            <a:r>
+              <a:rPr lang="de-CH" dirty="0" smtClean="0"/>
+              <a:t>verwendeten wir eine 4-Tier Architektur. Diese stützten</a:t>
+            </a:r>
+            <a:r>
+              <a:rPr lang="de-CH" baseline="0" dirty="0" smtClean="0"/>
+              <a:t> wird auf das Referenzprojekt. Sie besteht aus den Komponenten: Client Intern &amp; Extern, RMI-Server, Business, Persister , Webservice und einer Datenbank.</a:t>
+            </a:r>
+            <a:endParaRPr lang="de-CH" dirty="0"/>
+          </a:p>
+        </p:txBody>
+      </p:sp>
+      <p:sp>
+        <p:nvSpPr>
+          <p:cNvPr id="4" name="Foliennummernplatzhalter 3"/>
+          <p:cNvSpPr>
+            <a:spLocks noGrp="1"/>
+          </p:cNvSpPr>
+          <p:nvPr>
+            <p:ph type="sldNum" sz="quarter" idx="10"/>
+          </p:nvPr>
+        </p:nvSpPr>
+        <p:spPr/>
+        <p:txBody>
+          <a:bodyPr/>
+          <a:lstStyle/>
+          <a:p>
+            <a:fld id="{50EF5B9A-1C2F-4BD4-8982-7B41D9614058}" type="slidenum">
+              <a:rPr lang="de-CH" smtClean="0"/>
+              <a:t>7</a:t>
+            </a:fld>
+            <a:endParaRPr lang="de-CH"/>
+          </a:p>
+        </p:txBody>
+      </p:sp>
+    </p:spTree>
+    <p:extLst>
+      <p:ext uri="{BB962C8B-B14F-4D97-AF65-F5344CB8AC3E}">
+        <p14:creationId xmlns:p14="http://schemas.microsoft.com/office/powerpoint/2010/main" val="809808215"/>
+      </p:ext>
+    </p:extLst>
+  </p:cSld>
+  <p:clrMapOvr>
+    <a:masterClrMapping/>
+  </p:clrMapOvr>
+</p:notes>
+</file>
+
+<file path=ppt/notesSlides/notesSlide2.xml><?xml version="1.0" encoding="utf-8"?>
+<p:notes xmlns:a="http://schemas.openxmlformats.org/drawingml/2006/main" xmlns:r="http://schemas.openxmlformats.org/officeDocument/2006/relationships" xmlns:p="http://schemas.openxmlformats.org/presentationml/2006/main">
+  <p:cSld>
+    <p:spTree>
+      <p:nvGrpSpPr>
+        <p:cNvPr id="1" name=""/>
+        <p:cNvGrpSpPr/>
+        <p:nvPr/>
+      </p:nvGrpSpPr>
+      <p:grpSpPr>
+        <a:xfrm>
+          <a:off x="0" y="0"/>
+          <a:ext cx="0" cy="0"/>
+          <a:chOff x="0" y="0"/>
+          <a:chExt cx="0" cy="0"/>
+        </a:xfrm>
+      </p:grpSpPr>
+      <p:sp>
+        <p:nvSpPr>
+          <p:cNvPr id="2" name="Folienbildplatzhalter 1"/>
+          <p:cNvSpPr>
+            <a:spLocks noGrp="1" noRot="1" noChangeAspect="1"/>
+          </p:cNvSpPr>
+          <p:nvPr>
+            <p:ph type="sldImg"/>
+          </p:nvPr>
+        </p:nvSpPr>
+        <p:spPr/>
+      </p:sp>
+      <p:sp>
+        <p:nvSpPr>
+          <p:cNvPr id="3" name="Notizenplatzhalter 2"/>
+          <p:cNvSpPr>
+            <a:spLocks noGrp="1"/>
+          </p:cNvSpPr>
+          <p:nvPr>
+            <p:ph type="body" idx="1"/>
+          </p:nvPr>
+        </p:nvSpPr>
+        <p:spPr/>
+        <p:txBody>
+          <a:bodyPr/>
+          <a:lstStyle/>
+          <a:p>
+            <a:r>
+              <a:rPr lang="de-CH" dirty="0" smtClean="0"/>
+              <a:t>Am</a:t>
+            </a:r>
+            <a:r>
+              <a:rPr lang="de-CH" baseline="0" dirty="0" smtClean="0"/>
+              <a:t> Beispiel eines Mangels welchen wir erfassen möchten, zeige ich wie die verschiedenen Schnittstellen miteinander interagieren.</a:t>
+            </a:r>
+            <a:endParaRPr lang="de-CH" dirty="0"/>
+          </a:p>
+        </p:txBody>
+      </p:sp>
+      <p:sp>
+        <p:nvSpPr>
+          <p:cNvPr id="4" name="Foliennummernplatzhalter 3"/>
+          <p:cNvSpPr>
+            <a:spLocks noGrp="1"/>
+          </p:cNvSpPr>
+          <p:nvPr>
+            <p:ph type="sldNum" sz="quarter" idx="10"/>
+          </p:nvPr>
+        </p:nvSpPr>
+        <p:spPr/>
+        <p:txBody>
+          <a:bodyPr/>
+          <a:lstStyle/>
+          <a:p>
+            <a:fld id="{50EF5B9A-1C2F-4BD4-8982-7B41D9614058}" type="slidenum">
+              <a:rPr lang="de-CH" smtClean="0"/>
+              <a:t>8</a:t>
+            </a:fld>
+            <a:endParaRPr lang="de-CH"/>
+          </a:p>
+        </p:txBody>
+      </p:sp>
+    </p:spTree>
+    <p:extLst>
+      <p:ext uri="{BB962C8B-B14F-4D97-AF65-F5344CB8AC3E}">
+        <p14:creationId xmlns:p14="http://schemas.microsoft.com/office/powerpoint/2010/main" val="2584635178"/>
+      </p:ext>
+    </p:extLst>
+  </p:cSld>
+  <p:clrMapOvr>
+    <a:masterClrMapping/>
+  </p:clrMapOvr>
+</p:notes>
 </file>
 
 <file path=ppt/slideLayouts/slideLayout1.xml><?xml version="1.0" encoding="utf-8"?>
@@ -6441,12 +6994,8 @@
           </a:p>
           <a:p>
             <a:r>
-              <a:rPr lang="de-CH" dirty="0" err="1" smtClean="0"/>
-              <a:t>Persister</a:t>
-            </a:r>
-            <a:r>
               <a:rPr lang="de-CH" dirty="0" smtClean="0"/>
-              <a:t> / Client</a:t>
+              <a:t>Persister / Client</a:t>
             </a:r>
             <a:endParaRPr lang="de-CH" dirty="0"/>
           </a:p>
@@ -6524,20 +7073,48 @@
         </p:nvSpPr>
         <p:spPr/>
         <p:txBody>
-          <a:bodyPr/>
+          <a:bodyPr>
+            <a:normAutofit/>
+          </a:bodyPr>
           <a:lstStyle/>
           <a:p>
             <a:r>
               <a:rPr lang="de-CH" dirty="0" smtClean="0"/>
-              <a:t>Austritt des </a:t>
-            </a:r>
+              <a:t>Austritt des Projektleiters</a:t>
+            </a:r>
+          </a:p>
+          <a:p>
+            <a:pPr marL="0" indent="0">
+              <a:buNone/>
+            </a:pPr>
+            <a:endParaRPr lang="de-CH" dirty="0"/>
+          </a:p>
+          <a:p>
             <a:r>
               <a:rPr lang="de-CH" dirty="0" smtClean="0"/>
-              <a:t>Projektleiters</a:t>
-            </a:r>
+              <a:t>GUI-Skalierbarkeit mittels </a:t>
+            </a:r>
+            <a:r>
+              <a:rPr lang="de-CH" dirty="0" err="1" smtClean="0"/>
+              <a:t>GridPanes</a:t>
+            </a:r>
+            <a:endParaRPr lang="de-CH" dirty="0"/>
           </a:p>
           <a:p>
             <a:endParaRPr lang="de-CH" dirty="0" smtClean="0"/>
+          </a:p>
+          <a:p>
+            <a:r>
+              <a:rPr lang="de-CH" dirty="0" err="1" smtClean="0"/>
+              <a:t>TomEE</a:t>
+            </a:r>
+            <a:r>
+              <a:rPr lang="de-CH" dirty="0" smtClean="0"/>
+              <a:t> Installation – Library-Überschneidungen</a:t>
+            </a:r>
+          </a:p>
+          <a:p>
+            <a:endParaRPr lang="de-CH" dirty="0"/>
           </a:p>
           <a:p>
             <a:r>
@@ -6548,37 +7125,7 @@
               <a:rPr lang="de-CH" dirty="0" smtClean="0"/>
               <a:t>Beziehungen</a:t>
             </a:r>
-          </a:p>
-          <a:p>
-            <a:endParaRPr lang="de-CH" dirty="0"/>
-          </a:p>
-          <a:p>
-            <a:r>
-              <a:rPr lang="de-CH" dirty="0" smtClean="0"/>
-              <a:t>GUI-Skalierbarkeit mittels </a:t>
-            </a:r>
-            <a:r>
-              <a:rPr lang="de-CH" dirty="0" err="1" smtClean="0"/>
-              <a:t>GridPanes</a:t>
-            </a:r>
-            <a:endParaRPr lang="de-CH" dirty="0"/>
-          </a:p>
-          <a:p>
             <a:endParaRPr lang="de-CH" dirty="0" smtClean="0"/>
-          </a:p>
-          <a:p>
-            <a:r>
-              <a:rPr lang="de-CH" dirty="0" err="1" smtClean="0"/>
-              <a:t>TomCat</a:t>
-            </a:r>
-            <a:r>
-              <a:rPr lang="de-CH" dirty="0" smtClean="0"/>
-              <a:t> </a:t>
-            </a:r>
-            <a:r>
-              <a:rPr lang="de-CH" dirty="0" smtClean="0"/>
-              <a:t>Installation</a:t>
-            </a:r>
           </a:p>
           <a:p>
             <a:pPr marL="0" indent="0">
@@ -6771,7 +7318,131 @@
           <a:p>
             <a:r>
               <a:rPr lang="de-CH" dirty="0" smtClean="0"/>
-              <a:t>Sandro Ritz</a:t>
+              <a:t>Attribute aus mehreren Models in der Tabelle (setCellValueFactory)</a:t>
+            </a:r>
+          </a:p>
+          <a:p>
+            <a:r>
+              <a:rPr lang="de-CH" dirty="0" smtClean="0"/>
+              <a:t>Objekt in ComboBox laden, </a:t>
+            </a:r>
+            <a:r>
+              <a:rPr lang="de-CH" dirty="0" err="1" smtClean="0"/>
+              <a:t>toString</a:t>
+            </a:r>
+            <a:r>
+              <a:rPr lang="de-CH" dirty="0" smtClean="0"/>
+              <a:t>()</a:t>
+            </a:r>
+          </a:p>
+          <a:p>
+            <a:r>
+              <a:rPr lang="de-CH" dirty="0"/>
+              <a:t>Vererbungsproblem </a:t>
+            </a:r>
+            <a:r>
+              <a:rPr lang="de-CH" dirty="0" smtClean="0"/>
+              <a:t>Personen: Child-Attribute (check </a:t>
+            </a:r>
+            <a:r>
+              <a:rPr lang="de-CH" dirty="0" err="1" smtClean="0"/>
+              <a:t>instanceof</a:t>
+            </a:r>
+            <a:r>
+              <a:rPr lang="de-CH" dirty="0" smtClean="0"/>
+              <a:t>())</a:t>
+            </a:r>
+          </a:p>
+          <a:p>
+            <a:r>
+              <a:rPr lang="de-CH" dirty="0" smtClean="0"/>
+              <a:t>View </a:t>
+            </a:r>
+            <a:r>
+              <a:rPr lang="de-CH" dirty="0" err="1" smtClean="0"/>
+              <a:t>Navigationen</a:t>
+            </a:r>
+            <a:r>
+              <a:rPr lang="de-CH" dirty="0" smtClean="0"/>
+              <a:t> – </a:t>
+            </a:r>
+            <a:r>
+              <a:rPr lang="de-CH" b="1" dirty="0" smtClean="0"/>
+              <a:t>Referenz</a:t>
+            </a:r>
+            <a:r>
+              <a:rPr lang="de-CH" dirty="0" smtClean="0"/>
+              <a:t> auf </a:t>
+            </a:r>
+            <a:r>
+              <a:rPr lang="de-CH" dirty="0" err="1" smtClean="0"/>
+              <a:t>RootController</a:t>
+            </a:r>
+            <a:endParaRPr lang="de-CH" dirty="0" smtClean="0"/>
+          </a:p>
+          <a:p>
+            <a:r>
+              <a:rPr lang="de-CH" dirty="0" smtClean="0"/>
+              <a:t>Abspeichern von </a:t>
+            </a:r>
+            <a:r>
+              <a:rPr lang="de-CH" dirty="0" err="1" smtClean="0"/>
+              <a:t>GregorianCalender</a:t>
+            </a:r>
+            <a:r>
+              <a:rPr lang="de-CH" dirty="0" smtClean="0"/>
+              <a:t> Datum (</a:t>
+            </a:r>
+            <a:r>
+              <a:rPr lang="de-CH" dirty="0" err="1" smtClean="0"/>
+              <a:t>getMonthValue</a:t>
+            </a:r>
+            <a:r>
+              <a:rPr lang="de-CH" dirty="0" smtClean="0"/>
+              <a:t> +1)</a:t>
+            </a:r>
+          </a:p>
+          <a:p>
+            <a:r>
+              <a:rPr lang="de-CH" b="1" dirty="0" err="1" smtClean="0"/>
+              <a:t>Singelton</a:t>
+            </a:r>
+            <a:r>
+              <a:rPr lang="de-CH" dirty="0" smtClean="0"/>
+              <a:t> Zugriff auf </a:t>
+            </a:r>
+            <a:r>
+              <a:rPr lang="de-CH" dirty="0" err="1" smtClean="0"/>
+              <a:t>RMIClient</a:t>
+            </a:r>
+            <a:r>
+              <a:rPr lang="de-CH" dirty="0" smtClean="0"/>
+              <a:t> in Controllern</a:t>
+            </a:r>
+          </a:p>
+          <a:p>
+            <a:r>
+              <a:rPr lang="de-CH" dirty="0" err="1" smtClean="0"/>
+              <a:t>FetchType.</a:t>
+            </a:r>
+            <a:r>
+              <a:rPr lang="de-CH" b="1" dirty="0" err="1" smtClean="0"/>
+              <a:t>EAGER</a:t>
+            </a:r>
+            <a:endParaRPr lang="de-CH" b="1" dirty="0" smtClean="0"/>
+          </a:p>
+          <a:p>
+            <a:r>
+              <a:rPr lang="de-CH" dirty="0" smtClean="0"/>
+              <a:t>Objektorientiertes Denken bei </a:t>
+            </a:r>
+            <a:r>
+              <a:rPr lang="de-CH" b="1" dirty="0" err="1" smtClean="0"/>
+              <a:t>NamedQueries</a:t>
+            </a:r>
+            <a:r>
+              <a:rPr lang="de-CH" dirty="0" smtClean="0"/>
+              <a:t> für Suchfunktion</a:t>
             </a:r>
             <a:endParaRPr lang="de-CH" dirty="0"/>
           </a:p>
@@ -7346,7 +8017,6 @@
               <a:rPr lang="de-CH" sz="2200" dirty="0" smtClean="0"/>
               <a:t>Architektur &amp; Lösung</a:t>
             </a:r>
-            <a:endParaRPr lang="de-CH" sz="2200" dirty="0" smtClean="0"/>
           </a:p>
           <a:p>
             <a:r>
@@ -7716,7 +8386,7 @@
           <a:graphicData uri="http://schemas.openxmlformats.org/presentationml/2006/ole">
             <mc:AlternateContent xmlns:mc="http://schemas.openxmlformats.org/markup-compatibility/2006">
               <mc:Choice xmlns:v="urn:schemas-microsoft-com:vml" Requires="v">
-                <p:oleObj spid="_x0000_s1039" r:id="rId3" imgW="7715267" imgH="4810050" progId="Visio.Drawing.15">
+                <p:oleObj spid="_x0000_s1051" r:id="rId3" imgW="7715267" imgH="4810050" progId="Visio.Drawing.15">
                   <p:embed/>
                 </p:oleObj>
               </mc:Choice>
@@ -8505,7 +9175,7 @@
           <p:nvPr/>
         </p:nvPicPr>
         <p:blipFill>
-          <a:blip r:embed="rId2"/>
+          <a:blip r:embed="rId3"/>
           <a:stretch>
             <a:fillRect/>
           </a:stretch>
@@ -8681,12 +9351,12 @@
           <a:graphicData uri="http://schemas.openxmlformats.org/presentationml/2006/ole">
             <mc:AlternateContent xmlns:mc="http://schemas.openxmlformats.org/markup-compatibility/2006">
               <mc:Choice xmlns:v="urn:schemas-microsoft-com:vml" Requires="v">
-                <p:oleObj spid="_x0000_s2058" r:id="rId3" imgW="12788744" imgH="7785285" progId="Visio.Drawing.15">
+                <p:oleObj spid="_x0000_s2070" r:id="rId4" imgW="12788744" imgH="7785285" progId="Visio.Drawing.15">
                   <p:embed/>
                 </p:oleObj>
               </mc:Choice>
               <mc:Fallback>
-                <p:oleObj r:id="rId3" imgW="12788744" imgH="7785285" progId="Visio.Drawing.15">
+                <p:oleObj r:id="rId4" imgW="12788744" imgH="7785285" progId="Visio.Drawing.15">
                   <p:embed/>
                   <p:pic>
                     <p:nvPicPr>
@@ -8697,7 +9367,7 @@
                       <p:nvPr/>
                     </p:nvPicPr>
                     <p:blipFill>
-                      <a:blip r:embed="rId4">
+                      <a:blip r:embed="rId5">
                         <a:extLst>
                           <a:ext uri="{28A0092B-C50C-407E-A947-70E740481C1C}">
                             <a14:useLocalDpi xmlns:a14="http://schemas.microsoft.com/office/drawing/2010/main" val="0"/>
@@ -9147,4 +9817,265 @@
     </a:ext>
   </a:extLst>
 </a:theme>
+</file>
+
+<file path=ppt/theme/theme2.xml><?xml version="1.0" encoding="utf-8"?>
+<a:theme xmlns:a="http://schemas.openxmlformats.org/drawingml/2006/main" name="Office Theme">
+  <a:themeElements>
+    <a:clrScheme name="Office">
+      <a:dk1>
+        <a:sysClr val="windowText" lastClr="000000"/>
+      </a:dk1>
+      <a:lt1>
+        <a:sysClr val="window" lastClr="FFFFFF"/>
+      </a:lt1>
+      <a:dk2>
+        <a:srgbClr val="44546A"/>
+      </a:dk2>
+      <a:lt2>
+        <a:srgbClr val="E7E6E6"/>
+      </a:lt2>
+      <a:accent1>
+        <a:srgbClr val="5B9BD5"/>
+      </a:accent1>
+      <a:accent2>
+        <a:srgbClr val="ED7D31"/>
+      </a:accent2>
+      <a:accent3>
+        <a:srgbClr val="A5A5A5"/>
+      </a:accent3>
+      <a:accent4>
+        <a:srgbClr val="FFC000"/>
+      </a:accent4>
+      <a:accent5>
+        <a:srgbClr val="4472C4"/>
+      </a:accent5>
+      <a:accent6>
+        <a:srgbClr val="70AD47"/>
+      </a:accent6>
+      <a:hlink>
+        <a:srgbClr val="0563C1"/>
+      </a:hlink>
+      <a:folHlink>
+        <a:srgbClr val="954F72"/>
+      </a:folHlink>
+    </a:clrScheme>
+    <a:fontScheme name="Office">
+      <a:majorFont>
+        <a:latin typeface="Calibri Light" panose="020F0302020204030204"/>
+        <a:ea typeface=""/>
+        <a:cs typeface=""/>
+        <a:font script="Jpan" typeface="ＭＳ Ｐゴシック"/>
+        <a:font script="Hang" typeface="맑은 고딕"/>
+        <a:font script="Hans" typeface="宋体"/>
+        <a:font script="Hant" typeface="新細明體"/>
+        <a:font script="Arab" typeface="Times New Roman"/>
+        <a:font script="Hebr" typeface="Times New Roman"/>
+        <a:font script="Thai" typeface="Angsana New"/>
+        <a:font script="Ethi" typeface="Nyala"/>
+        <a:font script="Beng" typeface="Vrinda"/>
+        <a:font script="Gujr" typeface="Shruti"/>
+        <a:font script="Khmr" typeface="MoolBoran"/>
+        <a:font script="Knda" typeface="Tunga"/>
+        <a:font script="Guru" typeface="Raavi"/>
+        <a:font script="Cans" typeface="Euphemia"/>
+        <a:font script="Cher" typeface="Plantagenet Cherokee"/>
+        <a:font script="Yiii" typeface="Microsoft Yi Baiti"/>
+        <a:font script="Tibt" typeface="Microsoft Himalaya"/>
+        <a:font script="Thaa" typeface="MV Boli"/>
+        <a:font script="Deva" typeface="Mangal"/>
+        <a:font script="Telu" typeface="Gautami"/>
+        <a:font script="Taml" typeface="Latha"/>
+        <a:font script="Syrc" typeface="Estrangelo Edessa"/>
+        <a:font script="Orya" typeface="Kalinga"/>
+        <a:font script="Mlym" typeface="Kartika"/>
+        <a:font script="Laoo" typeface="DokChampa"/>
+        <a:font script="Sinh" typeface="Iskoola Pota"/>
+        <a:font script="Mong" typeface="Mongolian Baiti"/>
+        <a:font script="Viet" typeface="Times New Roman"/>
+        <a:font script="Uigh" typeface="Microsoft Uighur"/>
+        <a:font script="Geor" typeface="Sylfaen"/>
+      </a:majorFont>
+      <a:minorFont>
+        <a:latin typeface="Calibri" panose="020F0502020204030204"/>
+        <a:ea typeface=""/>
+        <a:cs typeface=""/>
+        <a:font script="Jpan" typeface="ＭＳ Ｐゴシック"/>
+        <a:font script="Hang" typeface="맑은 고딕"/>
+        <a:font script="Hans" typeface="宋体"/>
+        <a:font script="Hant" typeface="新細明體"/>
+        <a:font script="Arab" typeface="Arial"/>
+        <a:font script="Hebr" typeface="Arial"/>
+        <a:font script="Thai" typeface="Cordia New"/>
+        <a:font script="Ethi" typeface="Nyala"/>
+        <a:font script="Beng" typeface="Vrinda"/>
+        <a:font script="Gujr" typeface="Shruti"/>
+        <a:font script="Khmr" typeface="DaunPenh"/>
+        <a:font script="Knda" typeface="Tunga"/>
+        <a:font script="Guru" typeface="Raavi"/>
+        <a:font script="Cans" typeface="Euphemia"/>
+        <a:font script="Cher" typeface="Plantagenet Cherokee"/>
+        <a:font script="Yiii" typeface="Microsoft Yi Baiti"/>
+        <a:font script="Tibt" typeface="Microsoft Himalaya"/>
+        <a:font script="Thaa" typeface="MV Boli"/>
+        <a:font script="Deva" typeface="Mangal"/>
+        <a:font script="Telu" typeface="Gautami"/>
+        <a:font script="Taml" typeface="Latha"/>
+        <a:font script="Syrc" typeface="Estrangelo Edessa"/>
+        <a:font script="Orya" typeface="Kalinga"/>
+        <a:font script="Mlym" typeface="Kartika"/>
+        <a:font script="Laoo" typeface="DokChampa"/>
+        <a:font script="Sinh" typeface="Iskoola Pota"/>
+        <a:font script="Mong" typeface="Mongolian Baiti"/>
+        <a:font script="Viet" typeface="Arial"/>
+        <a:font script="Uigh" typeface="Microsoft Uighur"/>
+        <a:font script="Geor" typeface="Sylfaen"/>
+      </a:minorFont>
+    </a:fontScheme>
+    <a:fmtScheme name="Office">
+      <a:fillStyleLst>
+        <a:solidFill>
+          <a:schemeClr val="phClr"/>
+        </a:solidFill>
+        <a:gradFill rotWithShape="1">
+          <a:gsLst>
+            <a:gs pos="0">
+              <a:schemeClr val="phClr">
+                <a:lumMod val="110000"/>
+                <a:satMod val="105000"/>
+                <a:tint val="67000"/>
+              </a:schemeClr>
+            </a:gs>
+            <a:gs pos="50000">
+              <a:schemeClr val="phClr">
+                <a:lumMod val="105000"/>
+                <a:satMod val="103000"/>
+                <a:tint val="73000"/>
+              </a:schemeClr>
+            </a:gs>
+            <a:gs pos="100000">
+              <a:schemeClr val="phClr">
+                <a:lumMod val="105000"/>
+                <a:satMod val="109000"/>
+                <a:tint val="81000"/>
+              </a:schemeClr>
+            </a:gs>
+          </a:gsLst>
+          <a:lin ang="5400000" scaled="0"/>
+        </a:gradFill>
+        <a:gradFill rotWithShape="1">
+          <a:gsLst>
+            <a:gs pos="0">
+              <a:schemeClr val="phClr">
+                <a:satMod val="103000"/>
+                <a:lumMod val="102000"/>
+                <a:tint val="94000"/>
+              </a:schemeClr>
+            </a:gs>
+            <a:gs pos="50000">
+              <a:schemeClr val="phClr">
+                <a:satMod val="110000"/>
+                <a:lumMod val="100000"/>
+                <a:shade val="100000"/>
+              </a:schemeClr>
+            </a:gs>
+            <a:gs pos="100000">
+              <a:schemeClr val="phClr">
+                <a:lumMod val="99000"/>
+                <a:satMod val="120000"/>
+                <a:shade val="78000"/>
+              </a:schemeClr>
+            </a:gs>
+          </a:gsLst>
+          <a:lin ang="5400000" scaled="0"/>
+        </a:gradFill>
+      </a:fillStyleLst>
+      <a:lnStyleLst>
+        <a:ln w="6350" cap="flat" cmpd="sng" algn="ctr">
+          <a:solidFill>
+            <a:schemeClr val="phClr"/>
+          </a:solidFill>
+          <a:prstDash val="solid"/>
+          <a:miter lim="800000"/>
+        </a:ln>
+        <a:ln w="12700" cap="flat" cmpd="sng" algn="ctr">
+          <a:solidFill>
+            <a:schemeClr val="phClr"/>
+          </a:solidFill>
+          <a:prstDash val="solid"/>
+          <a:miter lim="800000"/>
+        </a:ln>
+        <a:ln w="19050" cap="flat" cmpd="sng" algn="ctr">
+          <a:solidFill>
+            <a:schemeClr val="phClr"/>
+          </a:solidFill>
+          <a:prstDash val="solid"/>
+          <a:miter lim="800000"/>
+        </a:ln>
+      </a:lnStyleLst>
+      <a:effectStyleLst>
+        <a:effectStyle>
+          <a:effectLst/>
+        </a:effectStyle>
+        <a:effectStyle>
+          <a:effectLst/>
+        </a:effectStyle>
+        <a:effectStyle>
+          <a:effectLst>
+            <a:outerShdw blurRad="57150" dist="19050" dir="5400000" algn="ctr" rotWithShape="0">
+              <a:srgbClr val="000000">
+                <a:alpha val="63000"/>
+              </a:srgbClr>
+            </a:outerShdw>
+          </a:effectLst>
+        </a:effectStyle>
+      </a:effectStyleLst>
+      <a:bgFillStyleLst>
+        <a:solidFill>
+          <a:schemeClr val="phClr"/>
+        </a:solidFill>
+        <a:solidFill>
+          <a:schemeClr val="phClr">
+            <a:tint val="95000"/>
+            <a:satMod val="170000"/>
+          </a:schemeClr>
+        </a:solidFill>
+        <a:gradFill rotWithShape="1">
+          <a:gsLst>
+            <a:gs pos="0">
+              <a:schemeClr val="phClr">
+                <a:tint val="93000"/>
+                <a:satMod val="150000"/>
+                <a:shade val="98000"/>
+                <a:lumMod val="102000"/>
+              </a:schemeClr>
+            </a:gs>
+            <a:gs pos="50000">
+              <a:schemeClr val="phClr">
+                <a:tint val="98000"/>
+                <a:satMod val="130000"/>
+                <a:shade val="90000"/>
+                <a:lumMod val="103000"/>
+              </a:schemeClr>
+            </a:gs>
+            <a:gs pos="100000">
+              <a:schemeClr val="phClr">
+                <a:shade val="63000"/>
+                <a:satMod val="120000"/>
+              </a:schemeClr>
+            </a:gs>
+          </a:gsLst>
+          <a:lin ang="5400000" scaled="0"/>
+        </a:gradFill>
+      </a:bgFillStyleLst>
+    </a:fmtScheme>
+  </a:themeElements>
+  <a:objectDefaults/>
+  <a:extraClrSchemeLst/>
+  <a:extLst>
+    <a:ext uri="{05A4C25C-085E-4340-85A3-A5531E510DB2}">
+      <thm15:themeFamily xmlns:thm15="http://schemas.microsoft.com/office/thememl/2012/main" name="Office Theme" id="{62F939B6-93AF-4DB8-9C6B-D6C7DFDC589F}" vid="{4A3C46E8-61CC-4603-A589-7422A47A8E4A}"/>
+    </a:ext>
+  </a:extLst>
+</a:theme>
 </file>
</xml_diff>

<commit_message>
Updated my part in se presentation
</commit_message>
<xml_diff>
--- a/06_Praesentation/Praesentation_Mangel_Manager.pptx
+++ b/06_Praesentation/Praesentation_Mangel_Manager.pptx
@@ -5,28 +5,27 @@
     <p:sldMasterId id="2147483789" r:id="rId1"/>
   </p:sldMasterIdLst>
   <p:notesMasterIdLst>
-    <p:notesMasterId r:id="rId21"/>
+    <p:notesMasterId r:id="rId20"/>
   </p:notesMasterIdLst>
   <p:sldIdLst>
     <p:sldId id="256" r:id="rId2"/>
-    <p:sldId id="276" r:id="rId3"/>
-    <p:sldId id="257" r:id="rId4"/>
-    <p:sldId id="273" r:id="rId5"/>
-    <p:sldId id="274" r:id="rId6"/>
-    <p:sldId id="260" r:id="rId7"/>
-    <p:sldId id="258" r:id="rId8"/>
-    <p:sldId id="275" r:id="rId9"/>
-    <p:sldId id="272" r:id="rId10"/>
-    <p:sldId id="259" r:id="rId11"/>
-    <p:sldId id="265" r:id="rId12"/>
-    <p:sldId id="271" r:id="rId13"/>
-    <p:sldId id="261" r:id="rId14"/>
-    <p:sldId id="264" r:id="rId15"/>
-    <p:sldId id="266" r:id="rId16"/>
-    <p:sldId id="267" r:id="rId17"/>
-    <p:sldId id="268" r:id="rId18"/>
-    <p:sldId id="269" r:id="rId19"/>
-    <p:sldId id="262" r:id="rId20"/>
+    <p:sldId id="257" r:id="rId3"/>
+    <p:sldId id="273" r:id="rId4"/>
+    <p:sldId id="274" r:id="rId5"/>
+    <p:sldId id="260" r:id="rId6"/>
+    <p:sldId id="258" r:id="rId7"/>
+    <p:sldId id="275" r:id="rId8"/>
+    <p:sldId id="272" r:id="rId9"/>
+    <p:sldId id="259" r:id="rId10"/>
+    <p:sldId id="265" r:id="rId11"/>
+    <p:sldId id="271" r:id="rId12"/>
+    <p:sldId id="261" r:id="rId13"/>
+    <p:sldId id="264" r:id="rId14"/>
+    <p:sldId id="266" r:id="rId15"/>
+    <p:sldId id="267" r:id="rId16"/>
+    <p:sldId id="268" r:id="rId17"/>
+    <p:sldId id="269" r:id="rId18"/>
+    <p:sldId id="262" r:id="rId19"/>
   </p:sldIdLst>
   <p:sldSz cx="12192000" cy="6858000"/>
   <p:notesSz cx="6858000" cy="9144000"/>
@@ -215,7 +214,7 @@
           <a:p>
             <a:fld id="{EFC77FAB-06E9-4254-8251-ADEC26580441}" type="datetimeFigureOut">
               <a:rPr lang="de-CH" smtClean="0"/>
-              <a:t>20.05.2015</a:t>
+              <a:t>21.05.2015</a:t>
             </a:fld>
             <a:endParaRPr lang="de-CH"/>
           </a:p>
@@ -572,7 +571,7 @@
           <a:p>
             <a:fld id="{50EF5B9A-1C2F-4BD4-8982-7B41D9614058}" type="slidenum">
               <a:rPr lang="de-CH" smtClean="0"/>
-              <a:t>7</a:t>
+              <a:t>6</a:t>
             </a:fld>
             <a:endParaRPr lang="de-CH"/>
           </a:p>
@@ -664,7 +663,7 @@
           <a:p>
             <a:fld id="{50EF5B9A-1C2F-4BD4-8982-7B41D9614058}" type="slidenum">
               <a:rPr lang="de-CH" smtClean="0"/>
-              <a:t>8</a:t>
+              <a:t>7</a:t>
             </a:fld>
             <a:endParaRPr lang="de-CH"/>
           </a:p>
@@ -866,7 +865,7 @@
           <a:p>
             <a:fld id="{78ABE3C1-DBE1-495D-B57B-2849774B866A}" type="datetimeFigureOut">
               <a:rPr lang="en-US" smtClean="0"/>
-              <a:t>5/20/2015</a:t>
+              <a:t>5/21/2015</a:t>
             </a:fld>
             <a:endParaRPr lang="en-US" dirty="0"/>
           </a:p>
@@ -1141,7 +1140,7 @@
           <a:p>
             <a:fld id="{9D6E9DEC-419B-4CC5-A080-3B06BD5A8291}" type="datetimeFigureOut">
               <a:rPr lang="en-US" smtClean="0"/>
-              <a:t>5/20/2015</a:t>
+              <a:t>5/21/2015</a:t>
             </a:fld>
             <a:endParaRPr lang="en-US" dirty="0"/>
           </a:p>
@@ -1337,7 +1336,7 @@
           <a:p>
             <a:fld id="{9D6E9DEC-419B-4CC5-A080-3B06BD5A8291}" type="datetimeFigureOut">
               <a:rPr lang="en-US" smtClean="0"/>
-              <a:t>5/20/2015</a:t>
+              <a:t>5/21/2015</a:t>
             </a:fld>
             <a:endParaRPr lang="en-US" dirty="0"/>
           </a:p>
@@ -1607,7 +1606,7 @@
           <a:p>
             <a:fld id="{9D6E9DEC-419B-4CC5-A080-3B06BD5A8291}" type="datetimeFigureOut">
               <a:rPr lang="en-US" smtClean="0"/>
-              <a:t>5/20/2015</a:t>
+              <a:t>5/21/2015</a:t>
             </a:fld>
             <a:endParaRPr lang="en-US" dirty="0"/>
           </a:p>
@@ -1941,7 +1940,7 @@
           <a:p>
             <a:fld id="{9D6E9DEC-419B-4CC5-A080-3B06BD5A8291}" type="datetimeFigureOut">
               <a:rPr lang="en-US" smtClean="0"/>
-              <a:t>5/20/2015</a:t>
+              <a:t>5/21/2015</a:t>
             </a:fld>
             <a:endParaRPr lang="en-US" dirty="0"/>
           </a:p>
@@ -2553,7 +2552,7 @@
           <a:p>
             <a:fld id="{9D6E9DEC-419B-4CC5-A080-3B06BD5A8291}" type="datetimeFigureOut">
               <a:rPr lang="en-US" smtClean="0"/>
-              <a:t>5/20/2015</a:t>
+              <a:t>5/21/2015</a:t>
             </a:fld>
             <a:endParaRPr lang="en-US" dirty="0"/>
           </a:p>
@@ -3402,7 +3401,7 @@
           <a:p>
             <a:fld id="{9D6E9DEC-419B-4CC5-A080-3B06BD5A8291}" type="datetimeFigureOut">
               <a:rPr lang="en-US" smtClean="0"/>
-              <a:t>5/20/2015</a:t>
+              <a:t>5/21/2015</a:t>
             </a:fld>
             <a:endParaRPr lang="en-US" dirty="0"/>
           </a:p>
@@ -3574,7 +3573,7 @@
           <a:p>
             <a:fld id="{1FA3F48C-C7C6-4055-9F49-3777875E72AE}" type="datetimeFigureOut">
               <a:rPr lang="en-US" smtClean="0"/>
-              <a:t>5/20/2015</a:t>
+              <a:t>5/21/2015</a:t>
             </a:fld>
             <a:endParaRPr lang="en-US" dirty="0"/>
           </a:p>
@@ -3754,7 +3753,7 @@
           <a:p>
             <a:fld id="{6178E61D-D431-422C-9764-11DAFE33AB63}" type="datetimeFigureOut">
               <a:rPr lang="en-US" smtClean="0"/>
-              <a:t>5/20/2015</a:t>
+              <a:t>5/21/2015</a:t>
             </a:fld>
             <a:endParaRPr lang="en-US" dirty="0"/>
           </a:p>
@@ -3925,7 +3924,7 @@
           <a:p>
             <a:fld id="{12DE42F4-6EEF-4EF7-8ED4-2208F0F89A08}" type="datetimeFigureOut">
               <a:rPr lang="en-US" smtClean="0"/>
-              <a:t>5/20/2015</a:t>
+              <a:t>5/21/2015</a:t>
             </a:fld>
             <a:endParaRPr lang="en-US" dirty="0"/>
           </a:p>
@@ -4169,7 +4168,7 @@
           <a:p>
             <a:fld id="{30578ACC-22D6-47C1-A373-4FD133E34F3C}" type="datetimeFigureOut">
               <a:rPr lang="en-US" smtClean="0"/>
-              <a:t>5/20/2015</a:t>
+              <a:t>5/21/2015</a:t>
             </a:fld>
             <a:endParaRPr lang="en-US" dirty="0"/>
           </a:p>
@@ -4461,7 +4460,7 @@
           <a:p>
             <a:fld id="{4E5A6C69-6797-4E8A-BF37-F2C3751466E9}" type="datetimeFigureOut">
               <a:rPr lang="en-US" smtClean="0"/>
-              <a:t>5/20/2015</a:t>
+              <a:t>5/21/2015</a:t>
             </a:fld>
             <a:endParaRPr lang="en-US" dirty="0"/>
           </a:p>
@@ -4899,7 +4898,7 @@
           <a:p>
             <a:fld id="{D82014A1-A632-4878-A0D3-F52BA7563730}" type="datetimeFigureOut">
               <a:rPr lang="en-US" smtClean="0"/>
-              <a:t>5/20/2015</a:t>
+              <a:t>5/21/2015</a:t>
             </a:fld>
             <a:endParaRPr lang="en-US" dirty="0"/>
           </a:p>
@@ -5017,7 +5016,7 @@
           <a:p>
             <a:fld id="{CE99F462-093F-4566-844B-4C71F2739DA5}" type="datetimeFigureOut">
               <a:rPr lang="en-US" smtClean="0"/>
-              <a:t>5/20/2015</a:t>
+              <a:t>5/21/2015</a:t>
             </a:fld>
             <a:endParaRPr lang="en-US" dirty="0"/>
           </a:p>
@@ -5112,7 +5111,7 @@
           <a:p>
             <a:fld id="{3D24A7AC-904D-4781-85BA-7D10C17ED021}" type="datetimeFigureOut">
               <a:rPr lang="en-US" smtClean="0"/>
-              <a:t>5/20/2015</a:t>
+              <a:t>5/21/2015</a:t>
             </a:fld>
             <a:endParaRPr lang="en-US" dirty="0"/>
           </a:p>
@@ -5391,7 +5390,7 @@
           <a:p>
             <a:fld id="{E331444B-B92B-4E27-8C94-BB93EAF5CB18}" type="datetimeFigureOut">
               <a:rPr lang="en-US" smtClean="0"/>
-              <a:t>5/20/2015</a:t>
+              <a:t>5/21/2015</a:t>
             </a:fld>
             <a:endParaRPr lang="en-US" dirty="0"/>
           </a:p>
@@ -5666,7 +5665,7 @@
           <a:p>
             <a:fld id="{363EFA5E-FA76-400D-B3DC-F0BA90E6D107}" type="datetimeFigureOut">
               <a:rPr lang="en-US" smtClean="0"/>
-              <a:t>5/20/2015</a:t>
+              <a:t>5/21/2015</a:t>
             </a:fld>
             <a:endParaRPr lang="en-US" dirty="0"/>
           </a:p>
@@ -6095,7 +6094,7 @@
           <a:p>
             <a:fld id="{9D6E9DEC-419B-4CC5-A080-3B06BD5A8291}" type="datetimeFigureOut">
               <a:rPr lang="en-US" smtClean="0"/>
-              <a:t>5/20/2015</a:t>
+              <a:t>5/21/2015</a:t>
             </a:fld>
             <a:endParaRPr lang="en-US" dirty="0"/>
           </a:p>
@@ -6710,114 +6709,40 @@
           <a:lstStyle/>
           <a:p>
             <a:r>
-              <a:rPr lang="de-CH" dirty="0"/>
-              <a:t>Mängel-Manager </a:t>
-            </a:r>
-            <a:r>
               <a:rPr lang="de-CH" dirty="0" smtClean="0"/>
-              <a:t>Hands-on</a:t>
-            </a:r>
-            <a:br>
+              <a:t>Funktionale Tests</a:t>
+            </a:r>
+            <a:endParaRPr lang="de-CH" dirty="0"/>
+          </a:p>
+        </p:txBody>
+      </p:sp>
+      <p:sp>
+        <p:nvSpPr>
+          <p:cNvPr id="3" name="Inhaltsplatzhalter 2"/>
+          <p:cNvSpPr>
+            <a:spLocks noGrp="1"/>
+          </p:cNvSpPr>
+          <p:nvPr>
+            <p:ph idx="1"/>
+          </p:nvPr>
+        </p:nvSpPr>
+        <p:spPr/>
+        <p:txBody>
+          <a:bodyPr/>
+          <a:lstStyle/>
+          <a:p>
+            <a:r>
               <a:rPr lang="de-CH" dirty="0" smtClean="0"/>
-            </a:br>
-            <a:r>
-              <a:rPr lang="de-CH" sz="2800" dirty="0"/>
-              <a:t>BackOffice </a:t>
-            </a:r>
-            <a:r>
-              <a:rPr lang="de-CH" sz="2800" dirty="0" smtClean="0"/>
-              <a:t>GU Intern </a:t>
-            </a:r>
-            <a:r>
-              <a:rPr lang="de-CH" sz="2800" dirty="0"/>
-              <a:t>Client</a:t>
-            </a:r>
-            <a:br>
-              <a:rPr lang="de-CH" sz="2800" dirty="0"/>
-            </a:br>
+              <a:t>TO DO MIKE ITEN</a:t>
+            </a:r>
             <a:endParaRPr lang="de-CH" dirty="0"/>
-          </a:p>
-        </p:txBody>
-      </p:sp>
-      <p:sp>
-        <p:nvSpPr>
-          <p:cNvPr id="3" name="Inhaltsplatzhalter 2"/>
-          <p:cNvSpPr>
-            <a:spLocks noGrp="1"/>
-          </p:cNvSpPr>
-          <p:nvPr>
-            <p:ph idx="1"/>
-          </p:nvPr>
-        </p:nvSpPr>
-        <p:spPr/>
-        <p:txBody>
-          <a:bodyPr>
-            <a:normAutofit fontScale="92500" lnSpcReduction="20000"/>
-          </a:bodyPr>
-          <a:lstStyle/>
-          <a:p>
-            <a:r>
-              <a:rPr lang="de-CH" dirty="0" smtClean="0"/>
-              <a:t>Unternehmen erfassen</a:t>
-            </a:r>
-          </a:p>
-          <a:p>
-            <a:endParaRPr lang="de-CH" dirty="0"/>
-          </a:p>
-          <a:p>
-            <a:r>
-              <a:rPr lang="de-CH" dirty="0" smtClean="0"/>
-              <a:t>Person erfassen</a:t>
-            </a:r>
-          </a:p>
-          <a:p>
-            <a:endParaRPr lang="de-CH" dirty="0"/>
-          </a:p>
-          <a:p>
-            <a:r>
-              <a:rPr lang="de-CH" dirty="0" smtClean="0"/>
-              <a:t>Projekt erfassen (Suchfunktion, Detailansicht)</a:t>
-            </a:r>
-          </a:p>
-          <a:p>
-            <a:endParaRPr lang="de-CH" dirty="0"/>
-          </a:p>
-          <a:p>
-            <a:r>
-              <a:rPr lang="de-CH" dirty="0" smtClean="0"/>
-              <a:t>Mangel zu Projekt erfassen</a:t>
-            </a:r>
-          </a:p>
-          <a:p>
-            <a:endParaRPr lang="de-CH" dirty="0"/>
-          </a:p>
-          <a:p>
-            <a:r>
-              <a:rPr lang="de-CH" dirty="0" smtClean="0"/>
-              <a:t>Meldung zu Mangel erfassen</a:t>
-            </a:r>
-          </a:p>
-          <a:p>
-            <a:endParaRPr lang="de-CH" dirty="0"/>
-          </a:p>
-          <a:p>
-            <a:r>
-              <a:rPr lang="de-CH" dirty="0" smtClean="0"/>
-              <a:t>Mängelliste drucken</a:t>
-            </a:r>
-          </a:p>
-          <a:p>
-            <a:pPr marL="0" indent="0">
-              <a:buNone/>
-            </a:pPr>
-            <a:endParaRPr lang="de-CH" dirty="0" smtClean="0"/>
           </a:p>
         </p:txBody>
       </p:sp>
     </p:spTree>
     <p:extLst>
       <p:ext uri="{BB962C8B-B14F-4D97-AF65-F5344CB8AC3E}">
-        <p14:creationId xmlns:p14="http://schemas.microsoft.com/office/powerpoint/2010/main" val="485883327"/>
+        <p14:creationId xmlns:p14="http://schemas.microsoft.com/office/powerpoint/2010/main" val="3285288541"/>
       </p:ext>
     </p:extLst>
   </p:cSld>
@@ -6867,8 +6792,12 @@
           <a:lstStyle/>
           <a:p>
             <a:r>
+              <a:rPr lang="de-CH" dirty="0" err="1" smtClean="0"/>
+              <a:t>Junit</a:t>
+            </a:r>
+            <a:r>
               <a:rPr lang="de-CH" dirty="0" smtClean="0"/>
-              <a:t>Funktionale Tests</a:t>
+              <a:t> Tests</a:t>
             </a:r>
             <a:endParaRPr lang="de-CH" dirty="0"/>
           </a:p>
@@ -6891,16 +6820,121 @@
           <a:p>
             <a:r>
               <a:rPr lang="de-CH" dirty="0" smtClean="0"/>
-              <a:t>TO DO MIKE ITEN</a:t>
-            </a:r>
+              <a:t>Test </a:t>
+            </a:r>
+            <a:r>
+              <a:rPr lang="de-CH" dirty="0" err="1" smtClean="0"/>
+              <a:t>Driven</a:t>
+            </a:r>
+            <a:r>
+              <a:rPr lang="de-CH" dirty="0" smtClean="0"/>
+              <a:t> </a:t>
+            </a:r>
+            <a:r>
+              <a:rPr lang="de-CH" dirty="0" smtClean="0"/>
+              <a:t>Development</a:t>
+            </a:r>
+            <a:br>
+              <a:rPr lang="de-CH" dirty="0" smtClean="0"/>
+            </a:br>
+            <a:endParaRPr lang="de-CH" dirty="0" smtClean="0"/>
+          </a:p>
+          <a:p>
+            <a:r>
+              <a:rPr lang="de-CH" dirty="0" err="1" smtClean="0"/>
+              <a:t>Seed</a:t>
+            </a:r>
+            <a:r>
+              <a:rPr lang="de-CH" dirty="0" smtClean="0"/>
+              <a:t>-File</a:t>
+            </a:r>
+            <a:endParaRPr lang="de-CH" dirty="0" smtClean="0"/>
+          </a:p>
+          <a:p>
             <a:endParaRPr lang="de-CH" dirty="0"/>
           </a:p>
-        </p:txBody>
-      </p:sp>
+          <a:p>
+            <a:r>
+              <a:rPr lang="de-CH" dirty="0" smtClean="0"/>
+              <a:t>JUnit4 Tests</a:t>
+            </a:r>
+            <a:r>
+              <a:rPr lang="de-CH" dirty="0"/>
+              <a:t/>
+            </a:r>
+            <a:br>
+              <a:rPr lang="de-CH" dirty="0"/>
+            </a:br>
+            <a:r>
+              <a:rPr lang="de-CH" dirty="0" err="1" smtClean="0"/>
+              <a:t>Persister</a:t>
+            </a:r>
+            <a:r>
+              <a:rPr lang="de-CH" dirty="0" smtClean="0"/>
+              <a:t/>
+            </a:r>
+            <a:br>
+              <a:rPr lang="de-CH" dirty="0" smtClean="0"/>
+            </a:br>
+            <a:r>
+              <a:rPr lang="de-CH" dirty="0" err="1" smtClean="0"/>
+              <a:t>ClientRMI</a:t>
+            </a:r>
+            <a:endParaRPr lang="de-CH" dirty="0" smtClean="0"/>
+          </a:p>
+          <a:p>
+            <a:endParaRPr lang="de-CH" dirty="0"/>
+          </a:p>
+          <a:p>
+            <a:endParaRPr lang="de-CH" dirty="0" smtClean="0"/>
+          </a:p>
+        </p:txBody>
+      </p:sp>
+      <p:pic>
+        <p:nvPicPr>
+          <p:cNvPr id="3076" name="Picture 4" descr="http://junit.org/images/junit-logo.png"/>
+          <p:cNvPicPr>
+            <a:picLocks noChangeAspect="1" noChangeArrowheads="1"/>
+          </p:cNvPicPr>
+          <p:nvPr/>
+        </p:nvPicPr>
+        <p:blipFill>
+          <a:blip r:embed="rId2">
+            <a:extLst>
+              <a:ext uri="{28A0092B-C50C-407E-A947-70E740481C1C}">
+                <a14:useLocalDpi xmlns:a14="http://schemas.microsoft.com/office/drawing/2010/main" val="0"/>
+              </a:ext>
+            </a:extLst>
+          </a:blip>
+          <a:srcRect/>
+          <a:stretch>
+            <a:fillRect/>
+          </a:stretch>
+        </p:blipFill>
+        <p:spPr bwMode="auto">
+          <a:xfrm>
+            <a:off x="6922136" y="2753266"/>
+            <a:ext cx="3491758" cy="1396703"/>
+          </a:xfrm>
+          <a:prstGeom prst="rect">
+            <a:avLst/>
+          </a:prstGeom>
+          <a:noFill/>
+          <a:extLst>
+            <a:ext uri="{909E8E84-426E-40DD-AFC4-6F175D3DCCD1}">
+              <a14:hiddenFill xmlns:a14="http://schemas.microsoft.com/office/drawing/2010/main">
+                <a:solidFill>
+                  <a:srgbClr val="FFFFFF"/>
+                </a:solidFill>
+              </a14:hiddenFill>
+            </a:ext>
+          </a:extLst>
+        </p:spPr>
+      </p:pic>
     </p:spTree>
     <p:extLst>
       <p:ext uri="{BB962C8B-B14F-4D97-AF65-F5344CB8AC3E}">
-        <p14:creationId xmlns:p14="http://schemas.microsoft.com/office/powerpoint/2010/main" val="3285288541"/>
+        <p14:creationId xmlns:p14="http://schemas.microsoft.com/office/powerpoint/2010/main" val="4174650671"/>
       </p:ext>
     </p:extLst>
   </p:cSld>
@@ -6950,61 +6984,97 @@
           <a:lstStyle/>
           <a:p>
             <a:r>
+              <a:rPr lang="de-CH" dirty="0" smtClean="0"/>
+              <a:t>Komplikationen</a:t>
+            </a:r>
+            <a:endParaRPr lang="de-CH" dirty="0"/>
+          </a:p>
+        </p:txBody>
+      </p:sp>
+      <p:sp>
+        <p:nvSpPr>
+          <p:cNvPr id="3" name="Inhaltsplatzhalter 2"/>
+          <p:cNvSpPr>
+            <a:spLocks noGrp="1"/>
+          </p:cNvSpPr>
+          <p:nvPr>
+            <p:ph idx="1"/>
+          </p:nvPr>
+        </p:nvSpPr>
+        <p:spPr/>
+        <p:txBody>
+          <a:bodyPr>
+            <a:normAutofit/>
+          </a:bodyPr>
+          <a:lstStyle/>
+          <a:p>
+            <a:r>
+              <a:rPr lang="de-CH" dirty="0" smtClean="0"/>
+              <a:t>Austritt des Projektleiters</a:t>
+            </a:r>
+          </a:p>
+          <a:p>
+            <a:pPr marL="0" indent="0">
+              <a:buNone/>
+            </a:pPr>
+            <a:endParaRPr lang="de-CH" dirty="0"/>
+          </a:p>
+          <a:p>
+            <a:r>
+              <a:rPr lang="de-CH" dirty="0" smtClean="0"/>
+              <a:t>GUI-Skalierbarkeit mittels </a:t>
+            </a:r>
+            <a:r>
               <a:rPr lang="de-CH" dirty="0" err="1" smtClean="0"/>
-              <a:t>Junit</a:t>
+              <a:t>GridPanes</a:t>
+            </a:r>
+            <a:endParaRPr lang="de-CH" dirty="0"/>
+          </a:p>
+          <a:p>
+            <a:endParaRPr lang="de-CH" dirty="0" smtClean="0"/>
+          </a:p>
+          <a:p>
+            <a:r>
+              <a:rPr lang="de-CH" dirty="0" err="1" smtClean="0"/>
+              <a:t>TomEE</a:t>
             </a:r>
             <a:r>
               <a:rPr lang="de-CH" dirty="0" smtClean="0"/>
-              <a:t> Tests</a:t>
-            </a:r>
+              <a:t> Installation – Library-Überschneidungen</a:t>
+            </a:r>
+          </a:p>
+          <a:p>
             <a:endParaRPr lang="de-CH" dirty="0"/>
           </a:p>
-        </p:txBody>
-      </p:sp>
-      <p:sp>
-        <p:nvSpPr>
-          <p:cNvPr id="3" name="Inhaltsplatzhalter 2"/>
-          <p:cNvSpPr>
-            <a:spLocks noGrp="1"/>
-          </p:cNvSpPr>
-          <p:nvPr>
-            <p:ph idx="1"/>
-          </p:nvPr>
-        </p:nvSpPr>
-        <p:spPr/>
-        <p:txBody>
-          <a:bodyPr/>
-          <a:lstStyle/>
-          <a:p>
+          <a:p>
+            <a:r>
+              <a:rPr lang="de-CH" dirty="0"/>
+              <a:t>Bidirektionale </a:t>
+            </a:r>
             <a:r>
               <a:rPr lang="de-CH" dirty="0" smtClean="0"/>
-              <a:t>Test </a:t>
-            </a:r>
+              <a:t>Beziehungen</a:t>
+            </a:r>
+          </a:p>
+          <a:p>
+            <a:pPr marL="0" indent="0">
+              <a:buNone/>
+            </a:pPr>
+            <a:endParaRPr lang="de-CH" dirty="0"/>
+          </a:p>
+          <a:p>
             <a:r>
               <a:rPr lang="de-CH" dirty="0" err="1" smtClean="0"/>
-              <a:t>Driven</a:t>
-            </a:r>
-            <a:r>
-              <a:rPr lang="de-CH" dirty="0" smtClean="0"/>
-              <a:t> Development</a:t>
-            </a:r>
-          </a:p>
-          <a:p>
-            <a:endParaRPr lang="de-CH" dirty="0"/>
-          </a:p>
-          <a:p>
-            <a:r>
-              <a:rPr lang="de-CH" dirty="0" smtClean="0"/>
-              <a:t>Persister / Client</a:t>
-            </a:r>
-            <a:endParaRPr lang="de-CH" dirty="0"/>
+              <a:t>Deployment</a:t>
+            </a:r>
+            <a:endParaRPr lang="de-CH" dirty="0" smtClean="0"/>
           </a:p>
         </p:txBody>
       </p:sp>
     </p:spTree>
     <p:extLst>
       <p:ext uri="{BB962C8B-B14F-4D97-AF65-F5344CB8AC3E}">
-        <p14:creationId xmlns:p14="http://schemas.microsoft.com/office/powerpoint/2010/main" val="4174650671"/>
+        <p14:creationId xmlns:p14="http://schemas.microsoft.com/office/powerpoint/2010/main" val="447635669"/>
       </p:ext>
     </p:extLst>
   </p:cSld>
@@ -7054,8 +7124,16 @@
           <a:lstStyle/>
           <a:p>
             <a:r>
+              <a:rPr lang="de-CH" dirty="0" err="1" smtClean="0"/>
+              <a:t>Lessons</a:t>
+            </a:r>
+            <a:r>
               <a:rPr lang="de-CH" dirty="0" smtClean="0"/>
-              <a:t>Komplikationen</a:t>
+              <a:t> </a:t>
+            </a:r>
+            <a:r>
+              <a:rPr lang="de-CH" dirty="0" err="1" smtClean="0"/>
+              <a:t>Learned</a:t>
             </a:r>
             <a:endParaRPr lang="de-CH" dirty="0"/>
           </a:p>
@@ -7073,79 +7151,21 @@
         </p:nvSpPr>
         <p:spPr/>
         <p:txBody>
-          <a:bodyPr>
-            <a:normAutofit/>
-          </a:bodyPr>
+          <a:bodyPr/>
           <a:lstStyle/>
           <a:p>
             <a:r>
               <a:rPr lang="de-CH" dirty="0" smtClean="0"/>
-              <a:t>Austritt des Projektleiters</a:t>
-            </a:r>
-          </a:p>
-          <a:p>
-            <a:pPr marL="0" indent="0">
-              <a:buNone/>
-            </a:pPr>
+              <a:t>Luca Kündig</a:t>
+            </a:r>
             <a:endParaRPr lang="de-CH" dirty="0"/>
-          </a:p>
-          <a:p>
-            <a:r>
-              <a:rPr lang="de-CH" dirty="0" smtClean="0"/>
-              <a:t>GUI-Skalierbarkeit mittels </a:t>
-            </a:r>
-            <a:r>
-              <a:rPr lang="de-CH" dirty="0" err="1" smtClean="0"/>
-              <a:t>GridPanes</a:t>
-            </a:r>
-            <a:endParaRPr lang="de-CH" dirty="0"/>
-          </a:p>
-          <a:p>
-            <a:endParaRPr lang="de-CH" dirty="0" smtClean="0"/>
-          </a:p>
-          <a:p>
-            <a:r>
-              <a:rPr lang="de-CH" dirty="0" err="1" smtClean="0"/>
-              <a:t>TomEE</a:t>
-            </a:r>
-            <a:r>
-              <a:rPr lang="de-CH" dirty="0" smtClean="0"/>
-              <a:t> Installation – Library-Überschneidungen</a:t>
-            </a:r>
-          </a:p>
-          <a:p>
-            <a:endParaRPr lang="de-CH" dirty="0"/>
-          </a:p>
-          <a:p>
-            <a:r>
-              <a:rPr lang="de-CH" dirty="0"/>
-              <a:t>Bidirektionale </a:t>
-            </a:r>
-            <a:r>
-              <a:rPr lang="de-CH" dirty="0" smtClean="0"/>
-              <a:t>Beziehungen</a:t>
-            </a:r>
-            <a:endParaRPr lang="de-CH" dirty="0" smtClean="0"/>
-          </a:p>
-          <a:p>
-            <a:pPr marL="0" indent="0">
-              <a:buNone/>
-            </a:pPr>
-            <a:endParaRPr lang="de-CH" dirty="0"/>
-          </a:p>
-          <a:p>
-            <a:r>
-              <a:rPr lang="de-CH" dirty="0" err="1" smtClean="0"/>
-              <a:t>Deployment</a:t>
-            </a:r>
-            <a:endParaRPr lang="de-CH" dirty="0" smtClean="0"/>
           </a:p>
         </p:txBody>
       </p:sp>
     </p:spTree>
     <p:extLst>
       <p:ext uri="{BB962C8B-B14F-4D97-AF65-F5344CB8AC3E}">
-        <p14:creationId xmlns:p14="http://schemas.microsoft.com/office/powerpoint/2010/main" val="447635669"/>
+        <p14:creationId xmlns:p14="http://schemas.microsoft.com/office/powerpoint/2010/main" val="256452221"/>
       </p:ext>
     </p:extLst>
   </p:cSld>
@@ -7227,7 +7247,131 @@
           <a:p>
             <a:r>
               <a:rPr lang="de-CH" dirty="0" smtClean="0"/>
-              <a:t>Luca Kündig</a:t>
+              <a:t>Attribute aus mehreren Models in der Tabelle (setCellValueFactory)</a:t>
+            </a:r>
+          </a:p>
+          <a:p>
+            <a:r>
+              <a:rPr lang="de-CH" dirty="0" smtClean="0"/>
+              <a:t>Objekt in ComboBox laden, </a:t>
+            </a:r>
+            <a:r>
+              <a:rPr lang="de-CH" dirty="0" err="1" smtClean="0"/>
+              <a:t>toString</a:t>
+            </a:r>
+            <a:r>
+              <a:rPr lang="de-CH" dirty="0" smtClean="0"/>
+              <a:t>()</a:t>
+            </a:r>
+          </a:p>
+          <a:p>
+            <a:r>
+              <a:rPr lang="de-CH" dirty="0"/>
+              <a:t>Vererbungsproblem </a:t>
+            </a:r>
+            <a:r>
+              <a:rPr lang="de-CH" dirty="0" smtClean="0"/>
+              <a:t>Personen: Child-Attribute (check </a:t>
+            </a:r>
+            <a:r>
+              <a:rPr lang="de-CH" dirty="0" err="1" smtClean="0"/>
+              <a:t>instanceof</a:t>
+            </a:r>
+            <a:r>
+              <a:rPr lang="de-CH" dirty="0" smtClean="0"/>
+              <a:t>())</a:t>
+            </a:r>
+          </a:p>
+          <a:p>
+            <a:r>
+              <a:rPr lang="de-CH" dirty="0" smtClean="0"/>
+              <a:t>View </a:t>
+            </a:r>
+            <a:r>
+              <a:rPr lang="de-CH" dirty="0" err="1" smtClean="0"/>
+              <a:t>Navigationen</a:t>
+            </a:r>
+            <a:r>
+              <a:rPr lang="de-CH" dirty="0" smtClean="0"/>
+              <a:t> – </a:t>
+            </a:r>
+            <a:r>
+              <a:rPr lang="de-CH" b="1" dirty="0" smtClean="0"/>
+              <a:t>Referenz</a:t>
+            </a:r>
+            <a:r>
+              <a:rPr lang="de-CH" dirty="0" smtClean="0"/>
+              <a:t> auf </a:t>
+            </a:r>
+            <a:r>
+              <a:rPr lang="de-CH" dirty="0" err="1" smtClean="0"/>
+              <a:t>RootController</a:t>
+            </a:r>
+            <a:endParaRPr lang="de-CH" dirty="0" smtClean="0"/>
+          </a:p>
+          <a:p>
+            <a:r>
+              <a:rPr lang="de-CH" dirty="0" smtClean="0"/>
+              <a:t>Abspeichern von </a:t>
+            </a:r>
+            <a:r>
+              <a:rPr lang="de-CH" dirty="0" err="1" smtClean="0"/>
+              <a:t>GregorianCalender</a:t>
+            </a:r>
+            <a:r>
+              <a:rPr lang="de-CH" dirty="0" smtClean="0"/>
+              <a:t> Datum (</a:t>
+            </a:r>
+            <a:r>
+              <a:rPr lang="de-CH" dirty="0" err="1" smtClean="0"/>
+              <a:t>getMonthValue</a:t>
+            </a:r>
+            <a:r>
+              <a:rPr lang="de-CH" dirty="0" smtClean="0"/>
+              <a:t> +1)</a:t>
+            </a:r>
+          </a:p>
+          <a:p>
+            <a:r>
+              <a:rPr lang="de-CH" b="1" dirty="0" err="1" smtClean="0"/>
+              <a:t>Singelton</a:t>
+            </a:r>
+            <a:r>
+              <a:rPr lang="de-CH" dirty="0" smtClean="0"/>
+              <a:t> Zugriff auf </a:t>
+            </a:r>
+            <a:r>
+              <a:rPr lang="de-CH" dirty="0" err="1" smtClean="0"/>
+              <a:t>RMIClient</a:t>
+            </a:r>
+            <a:r>
+              <a:rPr lang="de-CH" dirty="0" smtClean="0"/>
+              <a:t> in Controllern</a:t>
+            </a:r>
+          </a:p>
+          <a:p>
+            <a:r>
+              <a:rPr lang="de-CH" dirty="0" err="1" smtClean="0"/>
+              <a:t>FetchType.</a:t>
+            </a:r>
+            <a:r>
+              <a:rPr lang="de-CH" b="1" dirty="0" err="1" smtClean="0"/>
+              <a:t>EAGER</a:t>
+            </a:r>
+            <a:endParaRPr lang="de-CH" b="1" dirty="0" smtClean="0"/>
+          </a:p>
+          <a:p>
+            <a:r>
+              <a:rPr lang="de-CH" dirty="0" smtClean="0"/>
+              <a:t>Objektorientiertes Denken bei </a:t>
+            </a:r>
+            <a:r>
+              <a:rPr lang="de-CH" b="1" dirty="0" err="1" smtClean="0"/>
+              <a:t>NamedQueries</a:t>
+            </a:r>
+            <a:r>
+              <a:rPr lang="de-CH" dirty="0" smtClean="0"/>
+              <a:t> für Suchfunktion</a:t>
             </a:r>
             <a:endParaRPr lang="de-CH" dirty="0"/>
           </a:p>
@@ -7236,7 +7380,7 @@
     </p:spTree>
     <p:extLst>
       <p:ext uri="{BB962C8B-B14F-4D97-AF65-F5344CB8AC3E}">
-        <p14:creationId xmlns:p14="http://schemas.microsoft.com/office/powerpoint/2010/main" val="256452221"/>
+        <p14:creationId xmlns:p14="http://schemas.microsoft.com/office/powerpoint/2010/main" val="2733050563"/>
       </p:ext>
     </p:extLst>
   </p:cSld>
@@ -7318,132 +7462,160 @@
           <a:p>
             <a:r>
               <a:rPr lang="de-CH" dirty="0" smtClean="0"/>
-              <a:t>Attribute aus mehreren Models in der Tabelle (setCellValueFactory)</a:t>
-            </a:r>
-          </a:p>
-          <a:p>
+              <a:t>Projektarbeit</a:t>
+            </a:r>
+          </a:p>
+          <a:p>
+            <a:r>
+              <a:rPr lang="de-CH" dirty="0" err="1" smtClean="0"/>
+              <a:t>UseCase</a:t>
+            </a:r>
             <a:r>
               <a:rPr lang="de-CH" dirty="0" smtClean="0"/>
-              <a:t>Objekt in ComboBox laden, </a:t>
+              <a:t> / </a:t>
             </a:r>
             <a:r>
               <a:rPr lang="de-CH" dirty="0" err="1" smtClean="0"/>
-              <a:t>toString</a:t>
+              <a:t>Activity</a:t>
             </a:r>
             <a:r>
               <a:rPr lang="de-CH" dirty="0" smtClean="0"/>
-              <a:t>()</a:t>
-            </a:r>
-          </a:p>
-          <a:p>
+              <a:t> </a:t>
+            </a:r>
+            <a:r>
+              <a:rPr lang="de-CH" dirty="0" err="1" smtClean="0"/>
+              <a:t>Diagram</a:t>
+            </a:r>
+            <a:r>
+              <a:rPr lang="de-CH" dirty="0" smtClean="0"/>
+              <a:t> in Enterprise </a:t>
+            </a:r>
+            <a:r>
+              <a:rPr lang="de-CH" dirty="0" err="1" smtClean="0"/>
+              <a:t>Architect</a:t>
+            </a:r>
+            <a:endParaRPr lang="de-CH" dirty="0" smtClean="0"/>
+          </a:p>
+          <a:p>
+            <a:r>
+              <a:rPr lang="de-CH" dirty="0" smtClean="0"/>
+              <a:t>3-Schichten Modells (</a:t>
+            </a:r>
+            <a:r>
+              <a:rPr lang="de-CH" dirty="0" err="1" smtClean="0"/>
+              <a:t>Buisness</a:t>
+            </a:r>
+            <a:r>
+              <a:rPr lang="de-CH" dirty="0" smtClean="0"/>
+              <a:t>-RMI-</a:t>
+            </a:r>
+            <a:r>
+              <a:rPr lang="de-CH" dirty="0" err="1" smtClean="0"/>
+              <a:t>Persister</a:t>
+            </a:r>
+            <a:r>
+              <a:rPr lang="de-CH" dirty="0" smtClean="0"/>
+              <a:t>) - </a:t>
+            </a:r>
+            <a:r>
+              <a:rPr lang="de-CH" dirty="0" err="1" smtClean="0"/>
+              <a:t>NamedQuerries</a:t>
+            </a:r>
+            <a:endParaRPr lang="de-CH" dirty="0" smtClean="0"/>
+          </a:p>
+          <a:p>
+            <a:r>
+              <a:rPr lang="de-CH" dirty="0" smtClean="0"/>
+              <a:t>Erstellen von </a:t>
+            </a:r>
+            <a:r>
+              <a:rPr lang="de-CH" dirty="0" err="1" smtClean="0"/>
+              <a:t>GUI’s</a:t>
+            </a:r>
             <a:r>
               <a:rPr lang="de-CH" dirty="0"/>
-              <a:t>Vererbungsproblem </a:t>
+              <a:t> </a:t>
             </a:r>
             <a:r>
               <a:rPr lang="de-CH" dirty="0" smtClean="0"/>
-              <a:t>Personen: Child-Attribute (check </a:t>
+              <a:t>– </a:t>
             </a:r>
             <a:r>
               <a:rPr lang="de-CH" dirty="0" err="1" smtClean="0"/>
-              <a:t>instanceof</a:t>
-            </a:r>
-            <a:r>
-              <a:rPr lang="de-CH" dirty="0" smtClean="0"/>
-              <a:t>())</a:t>
-            </a:r>
-          </a:p>
-          <a:p>
-            <a:r>
-              <a:rPr lang="de-CH" dirty="0" smtClean="0"/>
-              <a:t>View </a:t>
-            </a:r>
-            <a:r>
-              <a:rPr lang="de-CH" dirty="0" err="1" smtClean="0"/>
-              <a:t>Navigationen</a:t>
+              <a:t>Scenebuilder</a:t>
             </a:r>
             <a:r>
               <a:rPr lang="de-CH" dirty="0" smtClean="0"/>
               <a:t> – </a:t>
             </a:r>
             <a:r>
-              <a:rPr lang="de-CH" b="1" dirty="0" smtClean="0"/>
-              <a:t>Referenz</a:t>
+              <a:rPr lang="de-CH" dirty="0" err="1" smtClean="0"/>
+              <a:t>GridPane</a:t>
             </a:r>
             <a:r>
               <a:rPr lang="de-CH" dirty="0" smtClean="0"/>
-              <a:t> auf </a:t>
+              <a:t> – </a:t>
             </a:r>
             <a:r>
               <a:rPr lang="de-CH" dirty="0" err="1" smtClean="0"/>
-              <a:t>RootController</a:t>
+              <a:t>AnchorPane</a:t>
             </a:r>
             <a:endParaRPr lang="de-CH" dirty="0" smtClean="0"/>
           </a:p>
           <a:p>
             <a:r>
               <a:rPr lang="de-CH" dirty="0" smtClean="0"/>
-              <a:t>Abspeichern von </a:t>
+              <a:t>Grundlegendes CSS</a:t>
+            </a:r>
+          </a:p>
+          <a:p>
+            <a:r>
+              <a:rPr lang="de-CH" dirty="0" smtClean="0"/>
+              <a:t>GUI-Controller – Laden in </a:t>
             </a:r>
             <a:r>
               <a:rPr lang="de-CH" dirty="0" err="1" smtClean="0"/>
-              <a:t>GregorianCalender</a:t>
+              <a:t>BorderPane</a:t>
             </a:r>
             <a:r>
               <a:rPr lang="de-CH" dirty="0" smtClean="0"/>
-              <a:t> Datum (</a:t>
-            </a:r>
-            <a:r>
-              <a:rPr lang="de-CH" dirty="0" err="1" smtClean="0"/>
-              <a:t>getMonthValue</a:t>
-            </a:r>
+              <a:t> – Aufrufen von Daten</a:t>
+            </a:r>
+          </a:p>
+          <a:p>
             <a:r>
               <a:rPr lang="de-CH" dirty="0" smtClean="0"/>
-              <a:t> +1)</a:t>
-            </a:r>
-          </a:p>
-          <a:p>
-            <a:r>
-              <a:rPr lang="de-CH" b="1" dirty="0" err="1" smtClean="0"/>
-              <a:t>Singelton</a:t>
-            </a:r>
-            <a:r>
-              <a:rPr lang="de-CH" dirty="0" smtClean="0"/>
-              <a:t> Zugriff auf </a:t>
-            </a:r>
-            <a:r>
-              <a:rPr lang="de-CH" dirty="0" err="1" smtClean="0"/>
-              <a:t>RMIClient</a:t>
-            </a:r>
-            <a:r>
-              <a:rPr lang="de-CH" dirty="0" smtClean="0"/>
-              <a:t> in Controllern</a:t>
-            </a:r>
-          </a:p>
-          <a:p>
-            <a:r>
-              <a:rPr lang="de-CH" dirty="0" err="1" smtClean="0"/>
-              <a:t>FetchType.</a:t>
-            </a:r>
-            <a:r>
-              <a:rPr lang="de-CH" b="1" dirty="0" err="1" smtClean="0"/>
-              <a:t>EAGER</a:t>
-            </a:r>
-            <a:endParaRPr lang="de-CH" b="1" dirty="0" smtClean="0"/>
-          </a:p>
-          <a:p>
-            <a:r>
-              <a:rPr lang="de-CH" dirty="0" smtClean="0"/>
-              <a:t>Objektorientiertes Denken bei </a:t>
-            </a:r>
-            <a:r>
-              <a:rPr lang="de-CH" b="1" dirty="0" err="1" smtClean="0"/>
-              <a:t>NamedQueries</a:t>
-            </a:r>
-            <a:r>
-              <a:rPr lang="de-CH" dirty="0" smtClean="0"/>
-              <a:t> für Suchfunktion</a:t>
-            </a:r>
+              <a:t>Junit4 Tests – Mehrere Getter-Methoden</a:t>
+            </a:r>
+          </a:p>
+          <a:p>
+            <a:r>
+              <a:rPr lang="de-CH" dirty="0" err="1"/>
+              <a:t>OpenCSV</a:t>
+            </a:r>
+            <a:r>
+              <a:rPr lang="de-CH" dirty="0"/>
+              <a:t> exportieren und importieren von .</a:t>
+            </a:r>
+            <a:r>
+              <a:rPr lang="de-CH" dirty="0" err="1"/>
+              <a:t>csv</a:t>
+            </a:r>
+            <a:r>
+              <a:rPr lang="de-CH" dirty="0"/>
+              <a:t> Dateien</a:t>
+            </a:r>
+          </a:p>
+          <a:p>
+            <a:endParaRPr lang="de-CH" dirty="0" smtClean="0"/>
+          </a:p>
+          <a:p>
+            <a:endParaRPr lang="de-CH" dirty="0" smtClean="0"/>
+          </a:p>
+          <a:p>
+            <a:endParaRPr lang="de-CH" dirty="0" smtClean="0"/>
+          </a:p>
+          <a:p>
             <a:endParaRPr lang="de-CH" dirty="0"/>
           </a:p>
         </p:txBody>
@@ -7451,7 +7623,7 @@
     </p:spTree>
     <p:extLst>
       <p:ext uri="{BB962C8B-B14F-4D97-AF65-F5344CB8AC3E}">
-        <p14:creationId xmlns:p14="http://schemas.microsoft.com/office/powerpoint/2010/main" val="2733050563"/>
+        <p14:creationId xmlns:p14="http://schemas.microsoft.com/office/powerpoint/2010/main" val="492210921"/>
       </p:ext>
     </p:extLst>
   </p:cSld>
@@ -7533,7 +7705,7 @@
           <a:p>
             <a:r>
               <a:rPr lang="de-CH" dirty="0" smtClean="0"/>
-              <a:t>Mike Monticoli</a:t>
+              <a:t>Cihan Demir</a:t>
             </a:r>
             <a:endParaRPr lang="de-CH" dirty="0"/>
           </a:p>
@@ -7542,7 +7714,7 @@
     </p:spTree>
     <p:extLst>
       <p:ext uri="{BB962C8B-B14F-4D97-AF65-F5344CB8AC3E}">
-        <p14:creationId xmlns:p14="http://schemas.microsoft.com/office/powerpoint/2010/main" val="492210921"/>
+        <p14:creationId xmlns:p14="http://schemas.microsoft.com/office/powerpoint/2010/main" val="401769967"/>
       </p:ext>
     </p:extLst>
   </p:cSld>
@@ -7624,97 +7796,6 @@
           <a:p>
             <a:r>
               <a:rPr lang="de-CH" dirty="0" smtClean="0"/>
-              <a:t>Cihan Demir</a:t>
-            </a:r>
-            <a:endParaRPr lang="de-CH" dirty="0"/>
-          </a:p>
-        </p:txBody>
-      </p:sp>
-    </p:spTree>
-    <p:extLst>
-      <p:ext uri="{BB962C8B-B14F-4D97-AF65-F5344CB8AC3E}">
-        <p14:creationId xmlns:p14="http://schemas.microsoft.com/office/powerpoint/2010/main" val="401769967"/>
-      </p:ext>
-    </p:extLst>
-  </p:cSld>
-  <p:clrMapOvr>
-    <a:masterClrMapping/>
-  </p:clrMapOvr>
-  <p:timing>
-    <p:tnLst>
-      <p:par>
-        <p:cTn id="1" dur="indefinite" restart="never" nodeType="tmRoot"/>
-      </p:par>
-    </p:tnLst>
-  </p:timing>
-</p:sld>
-</file>
-
-<file path=ppt/slides/slide18.xml><?xml version="1.0" encoding="utf-8"?>
-<p:sld xmlns:a="http://schemas.openxmlformats.org/drawingml/2006/main" xmlns:r="http://schemas.openxmlformats.org/officeDocument/2006/relationships" xmlns:p="http://schemas.openxmlformats.org/presentationml/2006/main">
-  <p:cSld>
-    <p:spTree>
-      <p:nvGrpSpPr>
-        <p:cNvPr id="1" name=""/>
-        <p:cNvGrpSpPr/>
-        <p:nvPr/>
-      </p:nvGrpSpPr>
-      <p:grpSpPr>
-        <a:xfrm>
-          <a:off x="0" y="0"/>
-          <a:ext cx="0" cy="0"/>
-          <a:chOff x="0" y="0"/>
-          <a:chExt cx="0" cy="0"/>
-        </a:xfrm>
-      </p:grpSpPr>
-      <p:sp>
-        <p:nvSpPr>
-          <p:cNvPr id="2" name="Titel 1"/>
-          <p:cNvSpPr>
-            <a:spLocks noGrp="1"/>
-          </p:cNvSpPr>
-          <p:nvPr>
-            <p:ph type="title"/>
-          </p:nvPr>
-        </p:nvSpPr>
-        <p:spPr/>
-        <p:txBody>
-          <a:bodyPr/>
-          <a:lstStyle/>
-          <a:p>
-            <a:r>
-              <a:rPr lang="de-CH" dirty="0" err="1" smtClean="0"/>
-              <a:t>Lessons</a:t>
-            </a:r>
-            <a:r>
-              <a:rPr lang="de-CH" dirty="0" smtClean="0"/>
-              <a:t> </a:t>
-            </a:r>
-            <a:r>
-              <a:rPr lang="de-CH" dirty="0" err="1" smtClean="0"/>
-              <a:t>Learned</a:t>
-            </a:r>
-            <a:endParaRPr lang="de-CH" dirty="0"/>
-          </a:p>
-        </p:txBody>
-      </p:sp>
-      <p:sp>
-        <p:nvSpPr>
-          <p:cNvPr id="3" name="Inhaltsplatzhalter 2"/>
-          <p:cNvSpPr>
-            <a:spLocks noGrp="1"/>
-          </p:cNvSpPr>
-          <p:nvPr>
-            <p:ph idx="1"/>
-          </p:nvPr>
-        </p:nvSpPr>
-        <p:spPr/>
-        <p:txBody>
-          <a:bodyPr/>
-          <a:lstStyle/>
-          <a:p>
-            <a:r>
-              <a:rPr lang="de-CH" dirty="0" smtClean="0"/>
               <a:t>Mike Iten</a:t>
             </a:r>
             <a:endParaRPr lang="de-CH" dirty="0"/>
@@ -7741,7 +7822,7 @@
 </p:sld>
 </file>
 
-<file path=ppt/slides/slide19.xml><?xml version="1.0" encoding="utf-8"?>
+<file path=ppt/slides/slide18.xml><?xml version="1.0" encoding="utf-8"?>
 <p:sld xmlns:a="http://schemas.openxmlformats.org/drawingml/2006/main" xmlns:r="http://schemas.openxmlformats.org/officeDocument/2006/relationships" xmlns:p="http://schemas.openxmlformats.org/presentationml/2006/main">
   <p:cSld>
     <p:spTree>
@@ -7857,121 +7938,6 @@
           <a:p>
             <a:r>
               <a:rPr lang="de-CH" dirty="0" smtClean="0"/>
-              <a:t>TO BE DELETED AUFTEILUNG	</a:t>
-            </a:r>
-            <a:endParaRPr lang="de-CH" dirty="0"/>
-          </a:p>
-        </p:txBody>
-      </p:sp>
-      <p:sp>
-        <p:nvSpPr>
-          <p:cNvPr id="3" name="Inhaltsplatzhalter 2"/>
-          <p:cNvSpPr>
-            <a:spLocks noGrp="1"/>
-          </p:cNvSpPr>
-          <p:nvPr>
-            <p:ph idx="1"/>
-          </p:nvPr>
-        </p:nvSpPr>
-        <p:spPr/>
-        <p:txBody>
-          <a:bodyPr/>
-          <a:lstStyle/>
-          <a:p>
-            <a:r>
-              <a:rPr lang="de-CH" dirty="0" smtClean="0"/>
-              <a:t>Iten Qualitätsziele / </a:t>
-            </a:r>
-            <a:r>
-              <a:rPr lang="de-CH" dirty="0" err="1" smtClean="0"/>
-              <a:t>Funktionaletests</a:t>
-            </a:r>
-            <a:endParaRPr lang="de-CH" dirty="0" smtClean="0"/>
-          </a:p>
-          <a:p>
-            <a:r>
-              <a:rPr lang="de-CH" dirty="0" smtClean="0"/>
-              <a:t>Monticoli Design / JDD / </a:t>
-            </a:r>
-            <a:r>
-              <a:rPr lang="de-CH" dirty="0" err="1" smtClean="0"/>
-              <a:t>Junit</a:t>
-            </a:r>
-            <a:endParaRPr lang="de-CH" dirty="0" smtClean="0"/>
-          </a:p>
-          <a:p>
-            <a:r>
-              <a:rPr lang="de-CH" dirty="0" smtClean="0"/>
-              <a:t>Sandro Architektur / </a:t>
-            </a:r>
-            <a:r>
-              <a:rPr lang="de-CH" dirty="0" err="1" smtClean="0"/>
-              <a:t>Komplikaton</a:t>
-            </a:r>
-            <a:endParaRPr lang="de-CH" dirty="0" smtClean="0"/>
-          </a:p>
-          <a:p>
-            <a:r>
-              <a:rPr lang="de-CH" dirty="0" smtClean="0"/>
-              <a:t>Cihan Einleitung / Vorgehen?? / Verwendetes</a:t>
-            </a:r>
-          </a:p>
-          <a:p>
-            <a:r>
-              <a:rPr lang="de-CH" dirty="0" smtClean="0"/>
-              <a:t>Luca Vorgehen ?? / Demo</a:t>
-            </a:r>
-            <a:endParaRPr lang="de-CH" dirty="0"/>
-          </a:p>
-        </p:txBody>
-      </p:sp>
-    </p:spTree>
-    <p:extLst>
-      <p:ext uri="{BB962C8B-B14F-4D97-AF65-F5344CB8AC3E}">
-        <p14:creationId xmlns:p14="http://schemas.microsoft.com/office/powerpoint/2010/main" val="505444965"/>
-      </p:ext>
-    </p:extLst>
-  </p:cSld>
-  <p:clrMapOvr>
-    <a:masterClrMapping/>
-  </p:clrMapOvr>
-</p:sld>
-</file>
-
-<file path=ppt/slides/slide3.xml><?xml version="1.0" encoding="utf-8"?>
-<p:sld xmlns:a="http://schemas.openxmlformats.org/drawingml/2006/main" xmlns:r="http://schemas.openxmlformats.org/officeDocument/2006/relationships" xmlns:p="http://schemas.openxmlformats.org/presentationml/2006/main">
-  <p:cSld>
-    <p:spTree>
-      <p:nvGrpSpPr>
-        <p:cNvPr id="1" name=""/>
-        <p:cNvGrpSpPr/>
-        <p:nvPr/>
-      </p:nvGrpSpPr>
-      <p:grpSpPr>
-        <a:xfrm>
-          <a:off x="0" y="0"/>
-          <a:ext cx="0" cy="0"/>
-          <a:chOff x="0" y="0"/>
-          <a:chExt cx="0" cy="0"/>
-        </a:xfrm>
-      </p:grpSpPr>
-      <p:sp>
-        <p:nvSpPr>
-          <p:cNvPr id="2" name="Titel 1"/>
-          <p:cNvSpPr>
-            <a:spLocks noGrp="1"/>
-          </p:cNvSpPr>
-          <p:nvPr>
-            <p:ph type="title"/>
-          </p:nvPr>
-        </p:nvSpPr>
-        <p:spPr/>
-        <p:txBody>
-          <a:bodyPr/>
-          <a:lstStyle/>
-          <a:p>
-            <a:r>
-              <a:rPr lang="de-CH" dirty="0" smtClean="0"/>
               <a:t>Einleitung</a:t>
             </a:r>
             <a:endParaRPr lang="de-CH" dirty="0"/>
@@ -8087,7 +8053,7 @@
 </p:sld>
 </file>
 
-<file path=ppt/slides/slide4.xml><?xml version="1.0" encoding="utf-8"?>
+<file path=ppt/slides/slide3.xml><?xml version="1.0" encoding="utf-8"?>
 <p:sld xmlns:a="http://schemas.openxmlformats.org/drawingml/2006/main" xmlns:r="http://schemas.openxmlformats.org/officeDocument/2006/relationships" xmlns:p="http://schemas.openxmlformats.org/presentationml/2006/main">
   <p:cSld>
     <p:spTree>
@@ -8261,7 +8227,7 @@
 </p:sld>
 </file>
 
-<file path=ppt/slides/slide5.xml><?xml version="1.0" encoding="utf-8"?>
+<file path=ppt/slides/slide4.xml><?xml version="1.0" encoding="utf-8"?>
 <p:sld xmlns:a="http://schemas.openxmlformats.org/drawingml/2006/main" xmlns:r="http://schemas.openxmlformats.org/officeDocument/2006/relationships" xmlns:p="http://schemas.openxmlformats.org/presentationml/2006/main">
   <p:cSld>
     <p:spTree>
@@ -8386,7 +8352,7 @@
           <a:graphicData uri="http://schemas.openxmlformats.org/presentationml/2006/ole">
             <mc:AlternateContent xmlns:mc="http://schemas.openxmlformats.org/markup-compatibility/2006">
               <mc:Choice xmlns:v="urn:schemas-microsoft-com:vml" Requires="v">
-                <p:oleObj spid="_x0000_s1051" r:id="rId3" imgW="7715267" imgH="4810050" progId="Visio.Drawing.15">
+                <p:oleObj spid="_x0000_s1060" r:id="rId3" imgW="7715267" imgH="4810050" progId="Visio.Drawing.15">
                   <p:embed/>
                 </p:oleObj>
               </mc:Choice>
@@ -8453,7 +8419,7 @@
 </p:sld>
 </file>
 
-<file path=ppt/slides/slide6.xml><?xml version="1.0" encoding="utf-8"?>
+<file path=ppt/slides/slide5.xml><?xml version="1.0" encoding="utf-8"?>
 <p:sld xmlns:a="http://schemas.openxmlformats.org/drawingml/2006/main" xmlns:r="http://schemas.openxmlformats.org/officeDocument/2006/relationships" xmlns:p="http://schemas.openxmlformats.org/presentationml/2006/main">
   <p:cSld>
     <p:spTree>
@@ -9126,7 +9092,7 @@
 </p:sld>
 </file>
 
-<file path=ppt/slides/slide7.xml><?xml version="1.0" encoding="utf-8"?>
+<file path=ppt/slides/slide6.xml><?xml version="1.0" encoding="utf-8"?>
 <p:sld xmlns:a="http://schemas.openxmlformats.org/drawingml/2006/main" xmlns:r="http://schemas.openxmlformats.org/officeDocument/2006/relationships" xmlns:p="http://schemas.openxmlformats.org/presentationml/2006/main">
   <p:cSld>
     <p:spTree>
@@ -9226,7 +9192,7 @@
 </p:sld>
 </file>
 
-<file path=ppt/slides/slide8.xml><?xml version="1.0" encoding="utf-8"?>
+<file path=ppt/slides/slide7.xml><?xml version="1.0" encoding="utf-8"?>
 <p:sld xmlns:a="http://schemas.openxmlformats.org/drawingml/2006/main" xmlns:r="http://schemas.openxmlformats.org/officeDocument/2006/relationships" xmlns:p="http://schemas.openxmlformats.org/presentationml/2006/main">
   <p:cSld>
     <p:spTree>
@@ -9351,7 +9317,7 @@
           <a:graphicData uri="http://schemas.openxmlformats.org/presentationml/2006/ole">
             <mc:AlternateContent xmlns:mc="http://schemas.openxmlformats.org/markup-compatibility/2006">
               <mc:Choice xmlns:v="urn:schemas-microsoft-com:vml" Requires="v">
-                <p:oleObj spid="_x0000_s2070" r:id="rId4" imgW="12788744" imgH="7785285" progId="Visio.Drawing.15">
+                <p:oleObj spid="_x0000_s2079" r:id="rId4" imgW="12788744" imgH="7785285" progId="Visio.Drawing.15">
                   <p:embed/>
                 </p:oleObj>
               </mc:Choice>
@@ -9416,7 +9382,7 @@
 </p:sld>
 </file>
 
-<file path=ppt/slides/slide9.xml><?xml version="1.0" encoding="utf-8"?>
+<file path=ppt/slides/slide8.xml><?xml version="1.0" encoding="utf-8"?>
 <p:sld xmlns:a="http://schemas.openxmlformats.org/drawingml/2006/main" xmlns:r="http://schemas.openxmlformats.org/officeDocument/2006/relationships" xmlns:p="http://schemas.openxmlformats.org/presentationml/2006/main">
   <p:cSld>
     <p:spTree>
@@ -9496,8 +9462,30 @@
           <a:p>
             <a:r>
               <a:rPr lang="de-CH" dirty="0" smtClean="0"/>
-              <a:t>Designentscheide</a:t>
-            </a:r>
+              <a:t>Designentscheide:</a:t>
+            </a:r>
+            <a:br>
+              <a:rPr lang="de-CH" dirty="0" smtClean="0"/>
+            </a:br>
+            <a:r>
+              <a:rPr lang="de-CH" dirty="0" smtClean="0"/>
+              <a:t>Womit erstellen?</a:t>
+            </a:r>
+            <a:br>
+              <a:rPr lang="de-CH" dirty="0" smtClean="0"/>
+            </a:br>
+            <a:r>
+              <a:rPr lang="de-CH" dirty="0" smtClean="0"/>
+              <a:t>Übersichtlich</a:t>
+            </a:r>
+            <a:br>
+              <a:rPr lang="de-CH" dirty="0" smtClean="0"/>
+            </a:br>
+            <a:r>
+              <a:rPr lang="de-CH" dirty="0" smtClean="0"/>
+              <a:t>Schnell erlernbar</a:t>
+            </a:r>
+            <a:endParaRPr lang="de-CH" dirty="0" smtClean="0"/>
           </a:p>
           <a:p>
             <a:endParaRPr lang="de-CH" dirty="0"/>
@@ -9538,6 +9526,163 @@
     <p:extLst>
       <p:ext uri="{BB962C8B-B14F-4D97-AF65-F5344CB8AC3E}">
         <p14:creationId xmlns:p14="http://schemas.microsoft.com/office/powerpoint/2010/main" val="507733203"/>
+      </p:ext>
+    </p:extLst>
+  </p:cSld>
+  <p:clrMapOvr>
+    <a:masterClrMapping/>
+  </p:clrMapOvr>
+  <p:timing>
+    <p:tnLst>
+      <p:par>
+        <p:cTn id="1" dur="indefinite" restart="never" nodeType="tmRoot"/>
+      </p:par>
+    </p:tnLst>
+  </p:timing>
+</p:sld>
+</file>
+
+<file path=ppt/slides/slide9.xml><?xml version="1.0" encoding="utf-8"?>
+<p:sld xmlns:a="http://schemas.openxmlformats.org/drawingml/2006/main" xmlns:r="http://schemas.openxmlformats.org/officeDocument/2006/relationships" xmlns:p="http://schemas.openxmlformats.org/presentationml/2006/main">
+  <p:cSld>
+    <p:spTree>
+      <p:nvGrpSpPr>
+        <p:cNvPr id="1" name=""/>
+        <p:cNvGrpSpPr/>
+        <p:nvPr/>
+      </p:nvGrpSpPr>
+      <p:grpSpPr>
+        <a:xfrm>
+          <a:off x="0" y="0"/>
+          <a:ext cx="0" cy="0"/>
+          <a:chOff x="0" y="0"/>
+          <a:chExt cx="0" cy="0"/>
+        </a:xfrm>
+      </p:grpSpPr>
+      <p:sp>
+        <p:nvSpPr>
+          <p:cNvPr id="2" name="Titel 1"/>
+          <p:cNvSpPr>
+            <a:spLocks noGrp="1"/>
+          </p:cNvSpPr>
+          <p:nvPr>
+            <p:ph type="title"/>
+          </p:nvPr>
+        </p:nvSpPr>
+        <p:spPr/>
+        <p:txBody>
+          <a:bodyPr/>
+          <a:lstStyle/>
+          <a:p>
+            <a:r>
+              <a:rPr lang="de-CH" dirty="0"/>
+              <a:t>Mängel-Manager </a:t>
+            </a:r>
+            <a:r>
+              <a:rPr lang="de-CH" dirty="0" smtClean="0"/>
+              <a:t>Hands-on</a:t>
+            </a:r>
+            <a:br>
+              <a:rPr lang="de-CH" dirty="0" smtClean="0"/>
+            </a:br>
+            <a:r>
+              <a:rPr lang="de-CH" sz="2800" dirty="0"/>
+              <a:t>BackOffice </a:t>
+            </a:r>
+            <a:r>
+              <a:rPr lang="de-CH" sz="2800" dirty="0" smtClean="0"/>
+              <a:t>GU Intern </a:t>
+            </a:r>
+            <a:r>
+              <a:rPr lang="de-CH" sz="2800" dirty="0"/>
+              <a:t>Client</a:t>
+            </a:r>
+            <a:br>
+              <a:rPr lang="de-CH" sz="2800" dirty="0"/>
+            </a:br>
+            <a:endParaRPr lang="de-CH" dirty="0"/>
+          </a:p>
+        </p:txBody>
+      </p:sp>
+      <p:sp>
+        <p:nvSpPr>
+          <p:cNvPr id="3" name="Inhaltsplatzhalter 2"/>
+          <p:cNvSpPr>
+            <a:spLocks noGrp="1"/>
+          </p:cNvSpPr>
+          <p:nvPr>
+            <p:ph idx="1"/>
+          </p:nvPr>
+        </p:nvSpPr>
+        <p:spPr/>
+        <p:txBody>
+          <a:bodyPr>
+            <a:normAutofit fontScale="92500" lnSpcReduction="20000"/>
+          </a:bodyPr>
+          <a:lstStyle/>
+          <a:p>
+            <a:r>
+              <a:rPr lang="de-CH" dirty="0" smtClean="0"/>
+              <a:t>Unternehmen erfassen</a:t>
+            </a:r>
+          </a:p>
+          <a:p>
+            <a:endParaRPr lang="de-CH" dirty="0"/>
+          </a:p>
+          <a:p>
+            <a:r>
+              <a:rPr lang="de-CH" dirty="0" smtClean="0"/>
+              <a:t>Person erfassen</a:t>
+            </a:r>
+          </a:p>
+          <a:p>
+            <a:endParaRPr lang="de-CH" dirty="0"/>
+          </a:p>
+          <a:p>
+            <a:r>
+              <a:rPr lang="de-CH" dirty="0" smtClean="0"/>
+              <a:t>Projekt erfassen (Suchfunktion, Detailansicht)</a:t>
+            </a:r>
+          </a:p>
+          <a:p>
+            <a:endParaRPr lang="de-CH" dirty="0"/>
+          </a:p>
+          <a:p>
+            <a:r>
+              <a:rPr lang="de-CH" dirty="0" smtClean="0"/>
+              <a:t>Mangel zu Projekt erfassen</a:t>
+            </a:r>
+          </a:p>
+          <a:p>
+            <a:endParaRPr lang="de-CH" dirty="0"/>
+          </a:p>
+          <a:p>
+            <a:r>
+              <a:rPr lang="de-CH" dirty="0" smtClean="0"/>
+              <a:t>Meldung zu Mangel erfassen</a:t>
+            </a:r>
+          </a:p>
+          <a:p>
+            <a:endParaRPr lang="de-CH" dirty="0"/>
+          </a:p>
+          <a:p>
+            <a:r>
+              <a:rPr lang="de-CH" dirty="0" smtClean="0"/>
+              <a:t>Mängelliste drucken</a:t>
+            </a:r>
+          </a:p>
+          <a:p>
+            <a:pPr marL="0" indent="0">
+              <a:buNone/>
+            </a:pPr>
+            <a:endParaRPr lang="de-CH" dirty="0" smtClean="0"/>
+          </a:p>
+        </p:txBody>
+      </p:sp>
+    </p:spTree>
+    <p:extLst>
+      <p:ext uri="{BB962C8B-B14F-4D97-AF65-F5344CB8AC3E}">
+        <p14:creationId xmlns:p14="http://schemas.microsoft.com/office/powerpoint/2010/main" val="485883327"/>
       </p:ext>
     </p:extLst>
   </p:cSld>

</xml_diff>

<commit_message>
updated my part presi
</commit_message>
<xml_diff>
--- a/06_Praesentation/Praesentation_Mangel_Manager.pptx
+++ b/06_Praesentation/Praesentation_Mangel_Manager.pptx
@@ -373,7 +373,7 @@
           <a:p>
             <a:fld id="{50EF5B9A-1C2F-4BD4-8982-7B41D9614058}" type="slidenum">
               <a:rPr lang="de-CH" smtClean="0"/>
-              <a:t>‹Nr.›</a:t>
+              <a:t>‹#›</a:t>
             </a:fld>
             <a:endParaRPr lang="de-CH"/>
           </a:p>
@@ -907,7 +907,7 @@
           <a:p>
             <a:fld id="{6D22F896-40B5-4ADD-8801-0D06FADFA095}" type="slidenum">
               <a:rPr lang="en-US" smtClean="0"/>
-              <a:t>‹Nr.›</a:t>
+              <a:t>‹#›</a:t>
             </a:fld>
             <a:endParaRPr lang="en-US" dirty="0"/>
           </a:p>
@@ -1183,7 +1183,7 @@
             <a:fld id="{6D22F896-40B5-4ADD-8801-0D06FADFA095}" type="slidenum">
               <a:rPr lang="en-US" smtClean="0"/>
               <a:pPr/>
-              <a:t>‹Nr.›</a:t>
+              <a:t>‹#›</a:t>
             </a:fld>
             <a:endParaRPr lang="en-US" dirty="0"/>
           </a:p>
@@ -1379,7 +1379,7 @@
             <a:fld id="{6D22F896-40B5-4ADD-8801-0D06FADFA095}" type="slidenum">
               <a:rPr lang="en-US" smtClean="0"/>
               <a:pPr/>
-              <a:t>‹Nr.›</a:t>
+              <a:t>‹#›</a:t>
             </a:fld>
             <a:endParaRPr lang="en-US" dirty="0"/>
           </a:p>
@@ -1649,7 +1649,7 @@
             <a:fld id="{6D22F896-40B5-4ADD-8801-0D06FADFA095}" type="slidenum">
               <a:rPr lang="en-US" smtClean="0"/>
               <a:pPr/>
-              <a:t>‹Nr.›</a:t>
+              <a:t>‹#›</a:t>
             </a:fld>
             <a:endParaRPr lang="en-US" dirty="0"/>
           </a:p>
@@ -1983,7 +1983,7 @@
             <a:fld id="{6D22F896-40B5-4ADD-8801-0D06FADFA095}" type="slidenum">
               <a:rPr lang="en-US" smtClean="0"/>
               <a:pPr/>
-              <a:t>‹Nr.›</a:t>
+              <a:t>‹#›</a:t>
             </a:fld>
             <a:endParaRPr lang="en-US" dirty="0"/>
           </a:p>
@@ -2595,7 +2595,7 @@
             <a:fld id="{6D22F896-40B5-4ADD-8801-0D06FADFA095}" type="slidenum">
               <a:rPr lang="en-US" smtClean="0"/>
               <a:pPr/>
-              <a:t>‹Nr.›</a:t>
+              <a:t>‹#›</a:t>
             </a:fld>
             <a:endParaRPr lang="en-US" dirty="0"/>
           </a:p>
@@ -3444,7 +3444,7 @@
             <a:fld id="{6D22F896-40B5-4ADD-8801-0D06FADFA095}" type="slidenum">
               <a:rPr lang="en-US" smtClean="0"/>
               <a:pPr/>
-              <a:t>‹Nr.›</a:t>
+              <a:t>‹#›</a:t>
             </a:fld>
             <a:endParaRPr lang="en-US" dirty="0"/>
           </a:p>
@@ -3615,7 +3615,7 @@
           <a:p>
             <a:fld id="{6D22F896-40B5-4ADD-8801-0D06FADFA095}" type="slidenum">
               <a:rPr lang="en-US" smtClean="0"/>
-              <a:t>‹Nr.›</a:t>
+              <a:t>‹#›</a:t>
             </a:fld>
             <a:endParaRPr lang="en-US" dirty="0"/>
           </a:p>
@@ -3796,7 +3796,7 @@
             <a:fld id="{6D22F896-40B5-4ADD-8801-0D06FADFA095}" type="slidenum">
               <a:rPr lang="en-US" smtClean="0"/>
               <a:pPr/>
-              <a:t>‹Nr.›</a:t>
+              <a:t>‹#›</a:t>
             </a:fld>
             <a:endParaRPr lang="en-US" dirty="0"/>
           </a:p>
@@ -3966,7 +3966,7 @@
           <a:p>
             <a:fld id="{6D22F896-40B5-4ADD-8801-0D06FADFA095}" type="slidenum">
               <a:rPr lang="en-US" smtClean="0"/>
-              <a:t>‹Nr.›</a:t>
+              <a:t>‹#›</a:t>
             </a:fld>
             <a:endParaRPr lang="en-US" dirty="0"/>
           </a:p>
@@ -4210,7 +4210,7 @@
           <a:p>
             <a:fld id="{6D22F896-40B5-4ADD-8801-0D06FADFA095}" type="slidenum">
               <a:rPr lang="en-US" smtClean="0"/>
-              <a:t>‹Nr.›</a:t>
+              <a:t>‹#›</a:t>
             </a:fld>
             <a:endParaRPr lang="en-US" dirty="0"/>
           </a:p>
@@ -4502,7 +4502,7 @@
           <a:p>
             <a:fld id="{6D22F896-40B5-4ADD-8801-0D06FADFA095}" type="slidenum">
               <a:rPr lang="en-US" smtClean="0"/>
-              <a:t>‹Nr.›</a:t>
+              <a:t>‹#›</a:t>
             </a:fld>
             <a:endParaRPr lang="en-US" dirty="0"/>
           </a:p>
@@ -4940,7 +4940,7 @@
           <a:p>
             <a:fld id="{6D22F896-40B5-4ADD-8801-0D06FADFA095}" type="slidenum">
               <a:rPr lang="en-US" smtClean="0"/>
-              <a:t>‹Nr.›</a:t>
+              <a:t>‹#›</a:t>
             </a:fld>
             <a:endParaRPr lang="en-US" dirty="0"/>
           </a:p>
@@ -5058,7 +5058,7 @@
           <a:p>
             <a:fld id="{6D22F896-40B5-4ADD-8801-0D06FADFA095}" type="slidenum">
               <a:rPr lang="en-US" smtClean="0"/>
-              <a:t>‹Nr.›</a:t>
+              <a:t>‹#›</a:t>
             </a:fld>
             <a:endParaRPr lang="en-US" dirty="0"/>
           </a:p>
@@ -5153,7 +5153,7 @@
           <a:p>
             <a:fld id="{6D22F896-40B5-4ADD-8801-0D06FADFA095}" type="slidenum">
               <a:rPr lang="en-US" smtClean="0"/>
-              <a:t>‹Nr.›</a:t>
+              <a:t>‹#›</a:t>
             </a:fld>
             <a:endParaRPr lang="en-US" dirty="0"/>
           </a:p>
@@ -5432,7 +5432,7 @@
           <a:p>
             <a:fld id="{6D22F896-40B5-4ADD-8801-0D06FADFA095}" type="slidenum">
               <a:rPr lang="en-US" smtClean="0"/>
-              <a:t>‹Nr.›</a:t>
+              <a:t>‹#›</a:t>
             </a:fld>
             <a:endParaRPr lang="en-US" dirty="0"/>
           </a:p>
@@ -5707,7 +5707,7 @@
           <a:p>
             <a:fld id="{6D22F896-40B5-4ADD-8801-0D06FADFA095}" type="slidenum">
               <a:rPr lang="en-US" smtClean="0"/>
-              <a:t>‹Nr.›</a:t>
+              <a:t>‹#›</a:t>
             </a:fld>
             <a:endParaRPr lang="en-US" dirty="0"/>
           </a:p>
@@ -6174,7 +6174,7 @@
             <a:fld id="{6D22F896-40B5-4ADD-8801-0D06FADFA095}" type="slidenum">
               <a:rPr lang="en-US" smtClean="0"/>
               <a:pPr/>
-              <a:t>‹Nr.›</a:t>
+              <a:t>‹#›</a:t>
             </a:fld>
             <a:endParaRPr lang="en-US" dirty="0"/>
           </a:p>
@@ -6733,12 +6733,90 @@
           <a:p>
             <a:r>
               <a:rPr lang="de-CH" dirty="0" smtClean="0"/>
-              <a:t>TO DO MIKE ITEN</a:t>
-            </a:r>
+              <a:t>Standardabläufe</a:t>
+            </a:r>
+          </a:p>
+          <a:p>
             <a:endParaRPr lang="de-CH" dirty="0"/>
           </a:p>
-        </p:txBody>
-      </p:sp>
+          <a:p>
+            <a:endParaRPr lang="de-CH" dirty="0" smtClean="0"/>
+          </a:p>
+          <a:p>
+            <a:endParaRPr lang="de-CH" dirty="0"/>
+          </a:p>
+          <a:p>
+            <a:endParaRPr lang="de-CH" dirty="0" smtClean="0"/>
+          </a:p>
+          <a:p>
+            <a:endParaRPr lang="de-CH" dirty="0"/>
+          </a:p>
+          <a:p>
+            <a:endParaRPr lang="de-CH" dirty="0" smtClean="0"/>
+          </a:p>
+          <a:p>
+            <a:r>
+              <a:rPr lang="de-CH" dirty="0" smtClean="0"/>
+              <a:t>Black-box Tests (aus Sicht des Anwenders)</a:t>
+            </a:r>
+          </a:p>
+          <a:p>
+            <a:r>
+              <a:rPr lang="de-CH" dirty="0" smtClean="0"/>
+              <a:t>Requirements erfüllt?</a:t>
+            </a:r>
+            <a:endParaRPr lang="de-CH" dirty="0"/>
+          </a:p>
+        </p:txBody>
+      </p:sp>
+      <p:pic>
+        <p:nvPicPr>
+          <p:cNvPr id="5" name="Picture 4"/>
+          <p:cNvPicPr>
+            <a:picLocks noChangeAspect="1"/>
+          </p:cNvPicPr>
+          <p:nvPr/>
+        </p:nvPicPr>
+        <p:blipFill>
+          <a:blip r:embed="rId2"/>
+          <a:stretch>
+            <a:fillRect/>
+          </a:stretch>
+        </p:blipFill>
+        <p:spPr>
+          <a:xfrm>
+            <a:off x="1521279" y="2649018"/>
+            <a:ext cx="5753100" cy="1000125"/>
+          </a:xfrm>
+          <a:prstGeom prst="rect">
+            <a:avLst/>
+          </a:prstGeom>
+        </p:spPr>
+      </p:pic>
+      <p:pic>
+        <p:nvPicPr>
+          <p:cNvPr id="8" name="Picture 7"/>
+          <p:cNvPicPr>
+            <a:picLocks noChangeAspect="1"/>
+          </p:cNvPicPr>
+          <p:nvPr/>
+        </p:nvPicPr>
+        <p:blipFill>
+          <a:blip r:embed="rId3"/>
+          <a:stretch>
+            <a:fillRect/>
+          </a:stretch>
+        </p:blipFill>
+        <p:spPr>
+          <a:xfrm>
+            <a:off x="1518738" y="3711843"/>
+            <a:ext cx="5755641" cy="1066800"/>
+          </a:xfrm>
+          <a:prstGeom prst="rect">
+            <a:avLst/>
+          </a:prstGeom>
+        </p:spPr>
+      </p:pic>
     </p:spTree>
     <p:extLst>
       <p:ext uri="{BB962C8B-B14F-4D97-AF65-F5344CB8AC3E}">
@@ -6828,11 +6906,7 @@
             </a:r>
             <a:r>
               <a:rPr lang="de-CH" dirty="0" smtClean="0"/>
-              <a:t> </a:t>
-            </a:r>
-            <a:r>
-              <a:rPr lang="de-CH" dirty="0" smtClean="0"/>
-              <a:t>Development</a:t>
+              <a:t> Development</a:t>
             </a:r>
             <a:br>
               <a:rPr lang="de-CH" dirty="0" smtClean="0"/>
@@ -6848,7 +6922,6 @@
               <a:rPr lang="de-CH" dirty="0" smtClean="0"/>
               <a:t>-File</a:t>
             </a:r>
-            <a:endParaRPr lang="de-CH" dirty="0" smtClean="0"/>
           </a:p>
           <a:p>
             <a:endParaRPr lang="de-CH" dirty="0"/>
@@ -7796,8 +7869,53 @@
           <a:p>
             <a:r>
               <a:rPr lang="de-CH" dirty="0" smtClean="0"/>
-              <a:t>Mike Iten</a:t>
-            </a:r>
+              <a:t>Arc42 Dokumentation</a:t>
+            </a:r>
+          </a:p>
+          <a:p>
+            <a:r>
+              <a:rPr lang="de-CH" dirty="0" smtClean="0"/>
+              <a:t>Risiken (Risikenszenarien vorausplanen und Massnahmen treffen)</a:t>
+            </a:r>
+            <a:endParaRPr lang="de-CH" dirty="0" smtClean="0"/>
+          </a:p>
+          <a:p>
+            <a:r>
+              <a:rPr lang="de-CH" dirty="0" smtClean="0"/>
+              <a:t>UseCase / Activity</a:t>
+            </a:r>
+          </a:p>
+          <a:p>
+            <a:r>
+              <a:rPr lang="de-CH" dirty="0" smtClean="0"/>
+              <a:t>GUI-Moqups</a:t>
+            </a:r>
+          </a:p>
+          <a:p>
+            <a:r>
+              <a:rPr lang="de-CH" dirty="0"/>
+              <a:t>Wichtigkeit der Planung (Requirements,UseCases)</a:t>
+            </a:r>
+          </a:p>
+          <a:p>
+            <a:r>
+              <a:rPr lang="de-CH" dirty="0" smtClean="0"/>
+              <a:t>Funktionales Testing</a:t>
+            </a:r>
+          </a:p>
+          <a:p>
+            <a:r>
+              <a:rPr lang="de-CH" dirty="0" smtClean="0"/>
+              <a:t>Github</a:t>
+            </a:r>
+          </a:p>
+          <a:p>
+            <a:r>
+              <a:rPr lang="de-CH" dirty="0" smtClean="0"/>
+              <a:t>Projekt</a:t>
+            </a:r>
+          </a:p>
+          <a:p>
             <a:endParaRPr lang="de-CH" dirty="0"/>
           </a:p>
         </p:txBody>
@@ -8352,7 +8470,7 @@
           <a:graphicData uri="http://schemas.openxmlformats.org/presentationml/2006/ole">
             <mc:AlternateContent xmlns:mc="http://schemas.openxmlformats.org/markup-compatibility/2006">
               <mc:Choice xmlns:v="urn:schemas-microsoft-com:vml" Requires="v">
-                <p:oleObj spid="_x0000_s1060" r:id="rId3" imgW="7715267" imgH="4810050" progId="Visio.Drawing.15">
+                <p:oleObj spid="_x0000_s1066" r:id="rId3" imgW="7715267" imgH="4810050" progId="Visio.Drawing.15">
                   <p:embed/>
                 </p:oleObj>
               </mc:Choice>
@@ -9317,7 +9435,7 @@
           <a:graphicData uri="http://schemas.openxmlformats.org/presentationml/2006/ole">
             <mc:AlternateContent xmlns:mc="http://schemas.openxmlformats.org/markup-compatibility/2006">
               <mc:Choice xmlns:v="urn:schemas-microsoft-com:vml" Requires="v">
-                <p:oleObj spid="_x0000_s2079" r:id="rId4" imgW="12788744" imgH="7785285" progId="Visio.Drawing.15">
+                <p:oleObj spid="_x0000_s2085" r:id="rId4" imgW="12788744" imgH="7785285" progId="Visio.Drawing.15">
                   <p:embed/>
                 </p:oleObj>
               </mc:Choice>
@@ -9485,7 +9603,6 @@
               <a:rPr lang="de-CH" dirty="0" smtClean="0"/>
               <a:t>Schnell erlernbar</a:t>
             </a:r>
-            <a:endParaRPr lang="de-CH" dirty="0" smtClean="0"/>
           </a:p>
           <a:p>
             <a:endParaRPr lang="de-CH" dirty="0"/>

</xml_diff>